<commit_message>
New handout for 2017 Hackday v2
</commit_message>
<xml_diff>
--- a/guide/2017-HackDay.pptx
+++ b/guide/2017-HackDay.pptx
@@ -3533,148 +3533,6 @@
           </a:p>
         </p:txBody>
       </p:sp>
-      <p:sp>
-        <p:nvSpPr>
-          <p:cNvPr id="4" name="TextBox 3"/>
-          <p:cNvSpPr txBox="1"/>
-          <p:nvPr/>
-        </p:nvSpPr>
-        <p:spPr>
-          <a:xfrm>
-            <a:off x="1447800" y="742795"/>
-            <a:ext cx="5257800" cy="2077492"/>
-          </a:xfrm>
-          <a:prstGeom prst="rect">
-            <a:avLst/>
-          </a:prstGeom>
-          <a:noFill/>
-          <a:ln>
-            <a:solidFill>
-              <a:schemeClr val="tx2"/>
-            </a:solidFill>
-          </a:ln>
-        </p:spPr>
-        <p:txBody>
-          <a:bodyPr wrap="square" tIns="91440" rtlCol="0">
-            <a:spAutoFit/>
-          </a:bodyPr>
-          <a:lstStyle/>
-          <a:p>
-            <a:pPr marL="228600" indent="-228600">
-              <a:buFont typeface="+mj-lt"/>
-              <a:buAutoNum type="arabicPeriod"/>
-            </a:pPr>
-            <a:r>
-              <a:rPr lang="en-US" sz="1400" dirty="0" smtClean="0"/>
-              <a:t>Arduino Nano (CH340)</a:t>
-            </a:r>
-          </a:p>
-          <a:p>
-            <a:pPr marL="228600" indent="-228600">
-              <a:buFont typeface="+mj-lt"/>
-              <a:buAutoNum type="arabicPeriod"/>
-            </a:pPr>
-            <a:r>
-              <a:rPr lang="en-US" sz="1400" dirty="0" smtClean="0"/>
-              <a:t>1/2 breadboard (400 tie points)</a:t>
-            </a:r>
-          </a:p>
-          <a:p>
-            <a:pPr marL="228600" indent="-228600">
-              <a:buFont typeface="+mj-lt"/>
-              <a:buAutoNum type="arabicPeriod"/>
-            </a:pPr>
-            <a:r>
-              <a:rPr lang="en-US" sz="1400" dirty="0" smtClean="0"/>
-              <a:t>330 Ohm Resistor</a:t>
-            </a:r>
-          </a:p>
-          <a:p>
-            <a:pPr marL="228600" indent="-228600">
-              <a:buFont typeface="+mj-lt"/>
-              <a:buAutoNum type="arabicPeriod"/>
-            </a:pPr>
-            <a:r>
-              <a:rPr lang="en-US" sz="1400" dirty="0" smtClean="0"/>
-              <a:t>LED – max current 20ma</a:t>
-            </a:r>
-            <a:endParaRPr lang="en-US" sz="1400" dirty="0"/>
-          </a:p>
-          <a:p>
-            <a:pPr marL="228600" indent="-228600">
-              <a:buFont typeface="+mj-lt"/>
-              <a:buAutoNum type="arabicPeriod"/>
-            </a:pPr>
-            <a:r>
-              <a:rPr lang="en-US" sz="1400" dirty="0" smtClean="0"/>
-              <a:t>USB cable (mini-b)</a:t>
-            </a:r>
-          </a:p>
-          <a:p>
-            <a:pPr marL="228600" indent="-228600">
-              <a:buFont typeface="+mj-lt"/>
-              <a:buAutoNum type="arabicPeriod"/>
-            </a:pPr>
-            <a:r>
-              <a:rPr lang="en-US" sz="1400" dirty="0" smtClean="0"/>
-              <a:t>30</a:t>
-            </a:r>
-            <a:r>
-              <a:rPr lang="en-US" sz="1400" dirty="0" smtClean="0"/>
-              <a:t> </a:t>
-            </a:r>
-            <a:r>
-              <a:rPr lang="en-US" sz="1400" dirty="0" smtClean="0"/>
-              <a:t>pixel NeoPixel strip with GND (black), 5v (red) and data (</a:t>
-            </a:r>
-            <a:r>
-              <a:rPr lang="en-US" sz="1400" dirty="0" smtClean="0"/>
-              <a:t>yel.)</a:t>
-            </a:r>
-            <a:endParaRPr lang="en-US" sz="1400" dirty="0" smtClean="0"/>
-          </a:p>
-          <a:p>
-            <a:pPr marL="228600" indent="-228600">
-              <a:buFont typeface="+mj-lt"/>
-              <a:buAutoNum type="arabicPeriod"/>
-            </a:pPr>
-            <a:r>
-              <a:rPr lang="en-US" sz="1400" dirty="0" smtClean="0"/>
-              <a:t>Momentary push </a:t>
-            </a:r>
-            <a:r>
-              <a:rPr lang="en-US" sz="1400" dirty="0" smtClean="0"/>
-              <a:t>buttons and wire</a:t>
-            </a:r>
-            <a:endParaRPr lang="en-US" sz="1400" dirty="0" smtClean="0"/>
-          </a:p>
-          <a:p>
-            <a:pPr marL="228600" indent="-228600">
-              <a:buFont typeface="+mj-lt"/>
-              <a:buAutoNum type="arabicPeriod"/>
-            </a:pPr>
-            <a:r>
-              <a:rPr lang="en-US" sz="1400" dirty="0" smtClean="0"/>
-              <a:t>3 AAA battery pack with switch</a:t>
-            </a:r>
-          </a:p>
-          <a:p>
-            <a:pPr marL="228600" indent="-228600">
-              <a:buFont typeface="+mj-lt"/>
-              <a:buAutoNum type="arabicPeriod"/>
-            </a:pPr>
-            <a:r>
-              <a:rPr lang="en-US" sz="1400" dirty="0"/>
-              <a:t>3</a:t>
-            </a:r>
-            <a:r>
-              <a:rPr lang="en-US" sz="1400" dirty="0" smtClean="0"/>
-              <a:t> AAA batteries</a:t>
-            </a:r>
-            <a:endParaRPr lang="en-US" sz="1400" dirty="0"/>
-          </a:p>
-        </p:txBody>
-      </p:sp>
       <p:grpSp>
         <p:nvGrpSpPr>
           <p:cNvPr id="3" name="Group 2"/>
@@ -3916,79 +3774,30 @@
           </p:txBody>
         </p:sp>
       </p:grpSp>
-      <p:sp>
-        <p:nvSpPr>
-          <p:cNvPr id="14" name="Rounded Rectangle 13"/>
-          <p:cNvSpPr/>
-          <p:nvPr/>
-        </p:nvSpPr>
-        <p:spPr>
-          <a:xfrm>
-            <a:off x="1524000" y="651248"/>
-            <a:ext cx="914400" cy="183093"/>
-          </a:xfrm>
-          <a:prstGeom prst="roundRect">
-            <a:avLst/>
-          </a:prstGeom>
-          <a:ln w="19050">
-            <a:solidFill>
-              <a:schemeClr val="tx1"/>
-            </a:solidFill>
-          </a:ln>
-        </p:spPr>
-        <p:style>
-          <a:lnRef idx="2">
-            <a:schemeClr val="accent1">
-              <a:shade val="50000"/>
-            </a:schemeClr>
-          </a:lnRef>
-          <a:fillRef idx="1">
-            <a:schemeClr val="accent1"/>
-          </a:fillRef>
-          <a:effectRef idx="0">
-            <a:schemeClr val="accent1"/>
-          </a:effectRef>
-          <a:fontRef idx="minor">
-            <a:schemeClr val="lt1"/>
-          </a:fontRef>
-        </p:style>
-        <p:txBody>
-          <a:bodyPr rtlCol="0" anchor="ctr"/>
-          <a:lstStyle/>
-          <a:p>
-            <a:pPr algn="ctr"/>
-            <a:r>
-              <a:rPr lang="en-US" sz="1000" smtClean="0"/>
-              <a:t>Kit Contents</a:t>
-            </a:r>
-            <a:endParaRPr lang="en-US" sz="1000" dirty="0"/>
-          </a:p>
-        </p:txBody>
-      </p:sp>
       <p:grpSp>
         <p:nvGrpSpPr>
-          <p:cNvPr id="16" name="Group 15"/>
+          <p:cNvPr id="38" name="Group 37"/>
           <p:cNvGrpSpPr/>
           <p:nvPr/>
         </p:nvGrpSpPr>
         <p:grpSpPr>
           <a:xfrm>
-            <a:off x="361950" y="3048000"/>
-            <a:ext cx="6019800" cy="4154197"/>
-            <a:chOff x="581025" y="3598007"/>
-            <a:chExt cx="6019800" cy="4154197"/>
+            <a:off x="1608137" y="541978"/>
+            <a:ext cx="4564063" cy="1892040"/>
+            <a:chOff x="1447800" y="651248"/>
+            <a:chExt cx="4564063" cy="1892040"/>
           </a:xfrm>
         </p:grpSpPr>
         <p:sp>
           <p:nvSpPr>
-            <p:cNvPr id="5" name="TextBox 4"/>
+            <p:cNvPr id="4" name="TextBox 3"/>
             <p:cNvSpPr txBox="1"/>
             <p:nvPr/>
           </p:nvSpPr>
           <p:spPr>
             <a:xfrm>
-              <a:off x="581025" y="3689553"/>
-              <a:ext cx="6019800" cy="4062651"/>
+              <a:off x="1447800" y="742795"/>
+              <a:ext cx="4564063" cy="1800493"/>
             </a:xfrm>
             <a:prstGeom prst="rect">
               <a:avLst/>
@@ -4001,243 +3810,140 @@
             </a:ln>
           </p:spPr>
           <p:txBody>
-            <a:bodyPr wrap="square" tIns="137160" rtlCol="0">
+            <a:bodyPr wrap="square" tIns="91440" rtlCol="0">
               <a:spAutoFit/>
             </a:bodyPr>
             <a:lstStyle/>
             <a:p>
-              <a:pPr marL="342900" indent="-342900">
+              <a:pPr marL="228600" indent="-228600">
                 <a:buFont typeface="+mj-lt"/>
                 <a:buAutoNum type="arabicPeriod"/>
               </a:pPr>
               <a:r>
-                <a:rPr lang="en-US" sz="1400" dirty="0" smtClean="0"/>
-                <a:t>Learn how to solder solid wires to ends of battery pack</a:t>
-              </a:r>
+                <a:rPr lang="en-US" sz="1200" dirty="0" smtClean="0"/>
+                <a:t>Arduino Nano (</a:t>
+              </a:r>
+              <a:r>
+                <a:rPr lang="en-US" sz="1200" dirty="0" smtClean="0"/>
+                <a:t>CH340 driver)</a:t>
+              </a:r>
+              <a:endParaRPr lang="en-US" sz="1200" dirty="0" smtClean="0"/>
             </a:p>
             <a:p>
-              <a:pPr marL="342900" indent="-342900">
+              <a:pPr marL="228600" indent="-228600">
                 <a:buFont typeface="+mj-lt"/>
                 <a:buAutoNum type="arabicPeriod"/>
               </a:pPr>
               <a:r>
-                <a:rPr lang="en-US" sz="1400" dirty="0" smtClean="0"/>
-                <a:t>Hook up battery to breadboard rails</a:t>
+                <a:rPr lang="en-US" sz="1200" dirty="0" smtClean="0"/>
+                <a:t>1/2 breadboard (400 tie points)</a:t>
               </a:r>
             </a:p>
             <a:p>
-              <a:pPr marL="342900" indent="-342900">
+              <a:pPr marL="228600" indent="-228600">
                 <a:buFont typeface="+mj-lt"/>
                 <a:buAutoNum type="arabicPeriod"/>
               </a:pPr>
               <a:r>
-                <a:rPr lang="en-US" sz="1400" dirty="0" smtClean="0"/>
-                <a:t>Hook up LED circuit </a:t>
-              </a:r>
-              <a:r>
-                <a:rPr lang="en-US" sz="1400" dirty="0" smtClean="0"/>
-                <a:t>in series with </a:t>
-              </a:r>
-              <a:r>
-                <a:rPr lang="en-US" sz="1400" dirty="0" smtClean="0"/>
-                <a:t>330 ohm </a:t>
-              </a:r>
-              <a:r>
-                <a:rPr lang="en-US" sz="1400" dirty="0" smtClean="0"/>
-                <a:t>resistor</a:t>
+                <a:rPr lang="en-US" sz="1200" dirty="0" smtClean="0"/>
+                <a:t>330 Ohm Resistor</a:t>
               </a:r>
             </a:p>
             <a:p>
-              <a:pPr marL="342900" indent="-342900">
+              <a:pPr marL="228600" indent="-228600">
                 <a:buFont typeface="+mj-lt"/>
                 <a:buAutoNum type="arabicPeriod"/>
               </a:pPr>
               <a:r>
-                <a:rPr lang="en-US" sz="1400" dirty="0" smtClean="0"/>
-                <a:t>Add a button to turn on and off the LED</a:t>
-              </a:r>
-              <a:endParaRPr lang="en-US" sz="1400" dirty="0" smtClean="0"/>
+                <a:rPr lang="en-US" sz="1200" dirty="0" smtClean="0"/>
+                <a:t>LED – max current 20ma</a:t>
+              </a:r>
+              <a:endParaRPr lang="en-US" sz="1200" dirty="0"/>
             </a:p>
             <a:p>
-              <a:pPr marL="342900" indent="-342900">
+              <a:pPr marL="228600" indent="-228600">
                 <a:buFont typeface="+mj-lt"/>
                 <a:buAutoNum type="arabicPeriod"/>
               </a:pPr>
               <a:r>
-                <a:rPr lang="en-US" sz="1400" dirty="0" smtClean="0"/>
-                <a:t>Plug </a:t>
-              </a:r>
-              <a:r>
-                <a:rPr lang="en-US" sz="1400" dirty="0" smtClean="0"/>
-                <a:t>in Arduino Nano to breadboard</a:t>
+                <a:rPr lang="en-US" sz="1200" dirty="0" smtClean="0"/>
+                <a:t>USB cable (mini-b)</a:t>
               </a:r>
             </a:p>
             <a:p>
-              <a:pPr marL="342900" indent="-342900">
+              <a:pPr marL="228600" indent="-228600">
                 <a:buFont typeface="+mj-lt"/>
                 <a:buAutoNum type="arabicPeriod"/>
               </a:pPr>
               <a:r>
-                <a:rPr lang="en-US" sz="1400" dirty="0" smtClean="0"/>
-                <a:t>Connect 5v and GND wires and verify LEDs </a:t>
-              </a:r>
-              <a:r>
-                <a:rPr lang="en-US" sz="1400" dirty="0" smtClean="0"/>
-                <a:t>on Arduino work</a:t>
-              </a:r>
-              <a:endParaRPr lang="en-US" sz="1400" dirty="0" smtClean="0"/>
+                <a:rPr lang="en-US" sz="1200" dirty="0" smtClean="0"/>
+                <a:t>30</a:t>
+              </a:r>
+              <a:r>
+                <a:rPr lang="en-US" sz="1200" dirty="0" smtClean="0"/>
+                <a:t> </a:t>
+              </a:r>
+              <a:r>
+                <a:rPr lang="en-US" sz="1200" dirty="0" smtClean="0"/>
+                <a:t>pixel NeoPixel strip with GND (black), 5v (red) and data (</a:t>
+              </a:r>
+              <a:r>
+                <a:rPr lang="en-US" sz="1200" dirty="0" smtClean="0"/>
+                <a:t>yellow)</a:t>
+              </a:r>
+              <a:endParaRPr lang="en-US" sz="1200" dirty="0" smtClean="0"/>
             </a:p>
             <a:p>
-              <a:pPr marL="342900" indent="-342900">
+              <a:pPr marL="228600" indent="-228600">
                 <a:buFont typeface="+mj-lt"/>
                 <a:buAutoNum type="arabicPeriod"/>
               </a:pPr>
               <a:r>
-                <a:rPr lang="en-US" sz="1400" dirty="0" smtClean="0"/>
-                <a:t>Download Arduino IDE software and plug in USB cable</a:t>
-              </a:r>
+                <a:rPr lang="en-US" sz="1200" dirty="0" smtClean="0"/>
+                <a:t>Momentary push </a:t>
+              </a:r>
+              <a:r>
+                <a:rPr lang="en-US" sz="1200" dirty="0" smtClean="0"/>
+                <a:t>buttons and wire</a:t>
+              </a:r>
+              <a:endParaRPr lang="en-US" sz="1200" dirty="0" smtClean="0"/>
             </a:p>
             <a:p>
-              <a:pPr marL="342900" indent="-342900">
+              <a:pPr marL="228600" indent="-228600">
                 <a:buFont typeface="+mj-lt"/>
                 <a:buAutoNum type="arabicPeriod"/>
               </a:pPr>
               <a:r>
-                <a:rPr lang="en-US" sz="1400" dirty="0" smtClean="0"/>
-                <a:t>Get "blink" lab to work (configure board and port) and use upload button</a:t>
+                <a:rPr lang="en-US" sz="1200" dirty="0" smtClean="0"/>
+                <a:t>3 AAA battery pack with switch</a:t>
               </a:r>
             </a:p>
             <a:p>
-              <a:pPr marL="342900" indent="-342900">
+              <a:pPr marL="228600" indent="-228600">
                 <a:buFont typeface="+mj-lt"/>
                 <a:buAutoNum type="arabicPeriod"/>
               </a:pPr>
               <a:r>
-                <a:rPr lang="en-US" sz="1400" dirty="0" smtClean="0"/>
-                <a:t>Download NeoPixel </a:t>
-              </a:r>
-              <a:r>
-                <a:rPr lang="en-US" sz="1400" dirty="0" smtClean="0"/>
-                <a:t>libraries</a:t>
-              </a:r>
-              <a:endParaRPr lang="en-US" sz="1400" dirty="0" smtClean="0"/>
-            </a:p>
-            <a:p>
-              <a:pPr marL="342900" indent="-342900">
-                <a:buFont typeface="+mj-lt"/>
-                <a:buAutoNum type="arabicPeriod"/>
-              </a:pPr>
-              <a:r>
-                <a:rPr lang="en-US" sz="1400" dirty="0" smtClean="0"/>
-                <a:t>Connect </a:t>
-              </a:r>
-              <a:r>
-                <a:rPr lang="en-US" sz="1400" dirty="0" smtClean="0"/>
-                <a:t>NeoPixel strip to pin 12</a:t>
-              </a:r>
-            </a:p>
-            <a:p>
-              <a:pPr marL="342900" indent="-342900">
-                <a:buFont typeface="+mj-lt"/>
-                <a:buAutoNum type="arabicPeriod"/>
-              </a:pPr>
-              <a:r>
-                <a:rPr lang="en-US" sz="1400" dirty="0" smtClean="0"/>
-                <a:t>Run NeoPixel example </a:t>
-              </a:r>
-              <a:r>
-                <a:rPr lang="en-US" sz="1400" dirty="0" smtClean="0"/>
-                <a:t>programs (</a:t>
-              </a:r>
-              <a:r>
-                <a:rPr lang="en-US" sz="1400" dirty="0" err="1" smtClean="0"/>
-                <a:t>strandtest</a:t>
-              </a:r>
-              <a:r>
-                <a:rPr lang="en-US" sz="1400" dirty="0" smtClean="0"/>
-                <a:t>)</a:t>
-              </a:r>
-              <a:endParaRPr lang="en-US" sz="1400" dirty="0" smtClean="0"/>
-            </a:p>
-            <a:p>
-              <a:pPr marL="342900" indent="-342900">
-                <a:buFont typeface="+mj-lt"/>
-                <a:buAutoNum type="arabicPeriod"/>
-              </a:pPr>
-              <a:r>
-                <a:rPr lang="en-US" sz="1400" dirty="0" smtClean="0"/>
-                <a:t>Find Moving Rainbow examples</a:t>
-              </a:r>
-            </a:p>
-            <a:p>
-              <a:pPr marL="342900" indent="-342900">
-                <a:buFont typeface="+mj-lt"/>
-                <a:buAutoNum type="arabicPeriod"/>
-              </a:pPr>
-              <a:r>
-                <a:rPr lang="en-US" sz="1400" dirty="0" smtClean="0"/>
-                <a:t>Work though various examples</a:t>
-              </a:r>
-            </a:p>
-            <a:p>
-              <a:pPr marL="342900" indent="-342900">
-                <a:buFont typeface="+mj-lt"/>
-                <a:buAutoNum type="arabicPeriod"/>
-              </a:pPr>
-              <a:r>
-                <a:rPr lang="en-US" sz="1400" dirty="0" smtClean="0"/>
-                <a:t>On moving rainbow github/</a:t>
-              </a:r>
-              <a:r>
-                <a:rPr lang="en-US" sz="1400" dirty="0" err="1" smtClean="0"/>
-                <a:t>src</a:t>
-              </a:r>
-              <a:r>
-                <a:rPr lang="en-US" sz="1400" dirty="0" smtClean="0"/>
-                <a:t> find mini-maker-fair LED strip two buttons program</a:t>
-              </a:r>
-            </a:p>
-            <a:p>
-              <a:pPr marL="342900" indent="-342900">
-                <a:buFont typeface="+mj-lt"/>
-                <a:buAutoNum type="arabicPeriod"/>
-              </a:pPr>
-              <a:r>
-                <a:rPr lang="en-US" sz="1400" dirty="0" smtClean="0"/>
-                <a:t>Wire button from D2 (interrupt) to ground</a:t>
-              </a:r>
-            </a:p>
-            <a:p>
-              <a:pPr marL="342900" indent="-342900">
-                <a:buFont typeface="+mj-lt"/>
-                <a:buAutoNum type="arabicPeriod"/>
-              </a:pPr>
-              <a:r>
-                <a:rPr lang="en-US" sz="1400" dirty="0" smtClean="0"/>
-                <a:t>Try all the modes</a:t>
-              </a:r>
-            </a:p>
-            <a:p>
-              <a:pPr marL="342900" indent="-342900">
-                <a:buFont typeface="+mj-lt"/>
-                <a:buAutoNum type="arabicPeriod"/>
-              </a:pPr>
-              <a:r>
-                <a:rPr lang="en-US" sz="1400" dirty="0" smtClean="0"/>
-                <a:t>Create your own mode</a:t>
-              </a:r>
+                <a:rPr lang="en-US" sz="1200" dirty="0"/>
+                <a:t>3</a:t>
+              </a:r>
+              <a:r>
+                <a:rPr lang="en-US" sz="1200" dirty="0" smtClean="0"/>
+                <a:t> AAA batteries</a:t>
+              </a:r>
+              <a:endParaRPr lang="en-US" sz="1200" dirty="0"/>
             </a:p>
           </p:txBody>
         </p:sp>
         <p:sp>
           <p:nvSpPr>
-            <p:cNvPr id="15" name="Rounded Rectangle 14"/>
+            <p:cNvPr id="14" name="Rounded Rectangle 13"/>
             <p:cNvSpPr/>
             <p:nvPr/>
           </p:nvSpPr>
           <p:spPr>
             <a:xfrm>
-              <a:off x="684213" y="3598007"/>
+              <a:off x="1524000" y="651248"/>
               <a:ext cx="914400" cy="183093"/>
             </a:xfrm>
             <a:prstGeom prst="roundRect">
@@ -4271,607 +3977,23 @@
             <a:p>
               <a:pPr algn="ctr"/>
               <a:r>
-                <a:rPr lang="en-US" sz="1000" dirty="0" smtClean="0"/>
-                <a:t>Sample Labs</a:t>
+                <a:rPr lang="en-US" sz="1000" smtClean="0"/>
+                <a:t>Kit Contents</a:t>
               </a:r>
               <a:endParaRPr lang="en-US" sz="1000" dirty="0"/>
             </a:p>
           </p:txBody>
         </p:sp>
       </p:grpSp>
-      <p:pic>
-        <p:nvPicPr>
-          <p:cNvPr id="17" name="Picture 16"/>
-          <p:cNvPicPr>
-            <a:picLocks noChangeAspect="1"/>
-          </p:cNvPicPr>
+      <p:sp>
+        <p:nvSpPr>
+          <p:cNvPr id="20" name="TextBox 19"/>
+          <p:cNvSpPr txBox="1"/>
           <p:nvPr/>
-        </p:nvPicPr>
-        <p:blipFill>
-          <a:blip r:embed="rId4"/>
-          <a:stretch>
-            <a:fillRect/>
-          </a:stretch>
-        </p:blipFill>
+        </p:nvSpPr>
         <p:spPr>
           <a:xfrm>
-            <a:off x="2293889" y="7848600"/>
-            <a:ext cx="3808461" cy="947331"/>
-          </a:xfrm>
-          <a:prstGeom prst="rect">
-            <a:avLst/>
-          </a:prstGeom>
-        </p:spPr>
-      </p:pic>
-      <p:pic>
-        <p:nvPicPr>
-          <p:cNvPr id="18" name="Picture 17"/>
-          <p:cNvPicPr>
-            <a:picLocks noChangeAspect="1"/>
-          </p:cNvPicPr>
-          <p:nvPr/>
-        </p:nvPicPr>
-        <p:blipFill>
-          <a:blip r:embed="rId5"/>
-          <a:stretch>
-            <a:fillRect/>
-          </a:stretch>
-        </p:blipFill>
-        <p:spPr>
-          <a:xfrm>
-            <a:off x="828675" y="7467600"/>
-            <a:ext cx="1390650" cy="948536"/>
-          </a:xfrm>
-          <a:prstGeom prst="rect">
-            <a:avLst/>
-          </a:prstGeom>
-        </p:spPr>
-      </p:pic>
-    </p:spTree>
-  </p:cSld>
-  <p:clrMapOvr>
-    <a:masterClrMapping/>
-  </p:clrMapOvr>
-</p:sld>
-</file>
-
-<file path=ppt/slides/slide2.xml><?xml version="1.0" encoding="utf-8"?>
-<p:sld xmlns:a="http://schemas.openxmlformats.org/drawingml/2006/main" xmlns:r="http://schemas.openxmlformats.org/officeDocument/2006/relationships" xmlns:p="http://schemas.openxmlformats.org/presentationml/2006/main">
-  <p:cSld>
-    <p:spTree>
-      <p:nvGrpSpPr>
-        <p:cNvPr id="1" name=""/>
-        <p:cNvGrpSpPr/>
-        <p:nvPr/>
-      </p:nvGrpSpPr>
-      <p:grpSpPr>
-        <a:xfrm>
-          <a:off x="0" y="0"/>
-          <a:ext cx="0" cy="0"/>
-          <a:chOff x="0" y="0"/>
-          <a:chExt cx="0" cy="0"/>
-        </a:xfrm>
-      </p:grpSpPr>
-      <p:sp>
-        <p:nvSpPr>
-          <p:cNvPr id="15" name="TextBox 14"/>
-          <p:cNvSpPr txBox="1"/>
-          <p:nvPr/>
-        </p:nvSpPr>
-        <p:spPr>
-          <a:xfrm>
-            <a:off x="323850" y="998743"/>
-            <a:ext cx="5619750" cy="1538285"/>
-          </a:xfrm>
-          <a:prstGeom prst="rect">
-            <a:avLst/>
-          </a:prstGeom>
-          <a:solidFill>
-            <a:schemeClr val="bg1">
-              <a:lumMod val="95000"/>
-            </a:schemeClr>
-          </a:solidFill>
-          <a:ln>
-            <a:solidFill>
-              <a:schemeClr val="tx1"/>
-            </a:solidFill>
-          </a:ln>
-        </p:spPr>
-        <p:txBody>
-          <a:bodyPr wrap="square" rtlCol="0">
-            <a:spAutoFit/>
-          </a:bodyPr>
-          <a:lstStyle/>
-          <a:p>
-            <a:endParaRPr lang="en-US" sz="1200" dirty="0" smtClean="0">
-              <a:latin typeface="Arial Narrow" pitchFamily="34" charset="0"/>
-            </a:endParaRPr>
-          </a:p>
-        </p:txBody>
-      </p:sp>
-      <p:sp>
-        <p:nvSpPr>
-          <p:cNvPr id="2" name="Title 1"/>
-          <p:cNvSpPr>
-            <a:spLocks noGrp="1"/>
-          </p:cNvSpPr>
-          <p:nvPr>
-            <p:ph type="title"/>
-          </p:nvPr>
-        </p:nvSpPr>
-        <p:spPr>
-          <a:xfrm>
-            <a:off x="323850" y="109537"/>
-            <a:ext cx="6172200" cy="316901"/>
-          </a:xfrm>
-        </p:spPr>
-        <p:txBody>
-          <a:bodyPr>
-            <a:normAutofit fontScale="90000"/>
-          </a:bodyPr>
-          <a:lstStyle/>
-          <a:p>
-            <a:r>
-              <a:rPr lang="en-US" sz="2400" dirty="0" smtClean="0">
-                <a:latin typeface="Arial Narrow" charset="0"/>
-                <a:ea typeface="Arial Narrow" charset="0"/>
-                <a:cs typeface="Arial Narrow" charset="0"/>
-              </a:rPr>
-              <a:t>NeoPixel Code Examples</a:t>
-            </a:r>
-            <a:endParaRPr lang="en-US" sz="2400" dirty="0">
-              <a:latin typeface="Arial Narrow" charset="0"/>
-              <a:ea typeface="Arial Narrow" charset="0"/>
-              <a:cs typeface="Arial Narrow" charset="0"/>
-            </a:endParaRPr>
-          </a:p>
-        </p:txBody>
-      </p:sp>
-      <p:sp>
-        <p:nvSpPr>
-          <p:cNvPr id="4" name="TextBox 3"/>
-          <p:cNvSpPr txBox="1"/>
-          <p:nvPr/>
-        </p:nvSpPr>
-        <p:spPr>
-          <a:xfrm>
-            <a:off x="333012" y="3996966"/>
-            <a:ext cx="6096000" cy="954107"/>
-          </a:xfrm>
-          <a:prstGeom prst="rect">
-            <a:avLst/>
-          </a:prstGeom>
-          <a:solidFill>
-            <a:schemeClr val="bg1">
-              <a:lumMod val="95000"/>
-            </a:schemeClr>
-          </a:solidFill>
-          <a:ln>
-            <a:solidFill>
-              <a:schemeClr val="tx1"/>
-            </a:solidFill>
-          </a:ln>
-        </p:spPr>
-        <p:txBody>
-          <a:bodyPr wrap="square" rtlCol="0">
-            <a:spAutoFit/>
-          </a:bodyPr>
-          <a:lstStyle/>
-          <a:p>
-            <a:endParaRPr lang="en-US" sz="800" dirty="0" smtClean="0">
-              <a:latin typeface="Arial Narrow" pitchFamily="34" charset="0"/>
-            </a:endParaRPr>
-          </a:p>
-          <a:p>
-            <a:r>
-              <a:rPr lang="en-US" sz="1200" dirty="0" smtClean="0">
-                <a:latin typeface="Arial Narrow" pitchFamily="34" charset="0"/>
-              </a:rPr>
-              <a:t>#</a:t>
-            </a:r>
-            <a:r>
-              <a:rPr lang="en-US" sz="1200" dirty="0" smtClean="0">
-                <a:latin typeface="Arial Narrow" pitchFamily="34" charset="0"/>
-              </a:rPr>
-              <a:t>include &lt;Adafruit_NeoPixel.h&gt;</a:t>
-            </a:r>
-          </a:p>
-          <a:p>
-            <a:r>
-              <a:rPr lang="en-US" sz="1200" dirty="0" smtClean="0">
-                <a:latin typeface="Arial Narrow" pitchFamily="34" charset="0"/>
-              </a:rPr>
-              <a:t>#define LEDPIN </a:t>
-            </a:r>
-            <a:r>
-              <a:rPr lang="en-US" sz="1200" dirty="0" smtClean="0">
-                <a:latin typeface="Arial Narrow" pitchFamily="34" charset="0"/>
-              </a:rPr>
-              <a:t>12 </a:t>
-            </a:r>
-            <a:r>
-              <a:rPr lang="en-US" sz="1200" dirty="0" smtClean="0">
-                <a:solidFill>
-                  <a:srgbClr val="00B050"/>
-                </a:solidFill>
-                <a:latin typeface="Arial Narrow" pitchFamily="34" charset="0"/>
-              </a:rPr>
-              <a:t>// connect the Data from the strip to this pin on the Arduino</a:t>
-            </a:r>
-          </a:p>
-          <a:p>
-            <a:r>
-              <a:rPr lang="en-US" sz="1200" dirty="0" smtClean="0">
-                <a:latin typeface="Arial Narrow" pitchFamily="34" charset="0"/>
-              </a:rPr>
-              <a:t>#define </a:t>
-            </a:r>
-            <a:r>
-              <a:rPr lang="en-US" sz="1200" dirty="0" smtClean="0">
-                <a:latin typeface="Arial Narrow" pitchFamily="34" charset="0"/>
-              </a:rPr>
-              <a:t>NUMBER_PIXELS 30 </a:t>
-            </a:r>
-            <a:r>
-              <a:rPr lang="en-US" sz="1200" dirty="0" smtClean="0">
-                <a:latin typeface="Arial Narrow" pitchFamily="34" charset="0"/>
-              </a:rPr>
-              <a:t>/</a:t>
-            </a:r>
-            <a:r>
-              <a:rPr lang="en-US" sz="1200" dirty="0">
-                <a:solidFill>
-                  <a:srgbClr val="00B050"/>
-                </a:solidFill>
-                <a:latin typeface="Arial Narrow" pitchFamily="34" charset="0"/>
-              </a:rPr>
-              <a:t>/ the number of pixels in your LED strip</a:t>
-            </a:r>
-          </a:p>
-          <a:p>
-            <a:r>
-              <a:rPr lang="en-US" sz="1200" dirty="0" smtClean="0">
-                <a:latin typeface="Arial Narrow" pitchFamily="34" charset="0"/>
-              </a:rPr>
-              <a:t>Adafruit_NeoPixel strip = </a:t>
-            </a:r>
-            <a:r>
-              <a:rPr lang="en-US" sz="1200" dirty="0" err="1" smtClean="0">
-                <a:latin typeface="Arial Narrow" pitchFamily="34" charset="0"/>
-              </a:rPr>
-              <a:t>Adafruit_NeoPixel</a:t>
-            </a:r>
-            <a:r>
-              <a:rPr lang="en-US" sz="1200" dirty="0" smtClean="0">
-                <a:latin typeface="Arial Narrow" pitchFamily="34" charset="0"/>
-              </a:rPr>
-              <a:t>(NUMBER_PIXELS</a:t>
-            </a:r>
-            <a:r>
-              <a:rPr lang="en-US" sz="1200" dirty="0" smtClean="0">
-                <a:latin typeface="Arial Narrow" pitchFamily="34" charset="0"/>
-              </a:rPr>
-              <a:t>, LEDPIN, NEO_GRB + NEO_KHZ800</a:t>
-            </a:r>
-            <a:r>
-              <a:rPr lang="en-US" sz="1200" dirty="0" smtClean="0">
-                <a:latin typeface="Arial Narrow" pitchFamily="34" charset="0"/>
-              </a:rPr>
-              <a:t>);</a:t>
-            </a:r>
-            <a:endParaRPr lang="en-US" sz="1200" dirty="0" smtClean="0">
-              <a:latin typeface="Arial Narrow" pitchFamily="34" charset="0"/>
-            </a:endParaRPr>
-          </a:p>
-        </p:txBody>
-      </p:sp>
-      <p:sp>
-        <p:nvSpPr>
-          <p:cNvPr id="5" name="TextBox 4"/>
-          <p:cNvSpPr txBox="1"/>
-          <p:nvPr/>
-        </p:nvSpPr>
-        <p:spPr>
-          <a:xfrm>
-            <a:off x="342900" y="5118442"/>
-            <a:ext cx="5448300" cy="1323439"/>
-          </a:xfrm>
-          <a:prstGeom prst="rect">
-            <a:avLst/>
-          </a:prstGeom>
-          <a:solidFill>
-            <a:schemeClr val="bg1">
-              <a:lumMod val="95000"/>
-            </a:schemeClr>
-          </a:solidFill>
-          <a:ln>
-            <a:solidFill>
-              <a:schemeClr val="tx1"/>
-            </a:solidFill>
-          </a:ln>
-        </p:spPr>
-        <p:txBody>
-          <a:bodyPr wrap="square" rtlCol="0">
-            <a:spAutoFit/>
-          </a:bodyPr>
-          <a:lstStyle/>
-          <a:p>
-            <a:endParaRPr lang="en-US" sz="800" dirty="0" smtClean="0">
-              <a:latin typeface="Arial Narrow" pitchFamily="34" charset="0"/>
-            </a:endParaRPr>
-          </a:p>
-          <a:p>
-            <a:r>
-              <a:rPr lang="en-US" sz="1200" b="1" dirty="0" smtClean="0">
-                <a:latin typeface="Arial" charset="0"/>
-                <a:ea typeface="Arial" charset="0"/>
-                <a:cs typeface="Arial" charset="0"/>
-              </a:rPr>
-              <a:t>void </a:t>
-            </a:r>
-            <a:r>
-              <a:rPr lang="en-US" sz="1200" b="1" dirty="0" smtClean="0">
-                <a:latin typeface="Arial" charset="0"/>
-                <a:ea typeface="Arial" charset="0"/>
-                <a:cs typeface="Arial" charset="0"/>
-              </a:rPr>
-              <a:t>setup() </a:t>
-            </a:r>
-            <a:r>
-              <a:rPr lang="en-US" sz="1200" dirty="0" smtClean="0">
-                <a:latin typeface="Arial" charset="0"/>
-                <a:ea typeface="Arial" charset="0"/>
-                <a:cs typeface="Arial" charset="0"/>
-              </a:rPr>
-              <a:t>{</a:t>
-            </a:r>
-          </a:p>
-          <a:p>
-            <a:r>
-              <a:rPr lang="en-US" sz="1200" dirty="0" smtClean="0">
-                <a:latin typeface="Arial" charset="0"/>
-                <a:ea typeface="Arial" charset="0"/>
-                <a:cs typeface="Arial" charset="0"/>
-              </a:rPr>
-              <a:t>  strip.begin(); </a:t>
-            </a:r>
-            <a:r>
-              <a:rPr lang="en-US" sz="1200" dirty="0" smtClean="0">
-                <a:solidFill>
-                  <a:srgbClr val="00B050"/>
-                </a:solidFill>
-                <a:latin typeface="Arial" charset="0"/>
-                <a:ea typeface="Arial" charset="0"/>
-                <a:cs typeface="Arial" charset="0"/>
-              </a:rPr>
-              <a:t>// initialize all the </a:t>
-            </a:r>
-            <a:r>
-              <a:rPr lang="en-US" sz="1200" dirty="0" smtClean="0">
-                <a:solidFill>
-                  <a:srgbClr val="00B050"/>
-                </a:solidFill>
-                <a:latin typeface="Arial" charset="0"/>
-                <a:ea typeface="Arial" charset="0"/>
-                <a:cs typeface="Arial" charset="0"/>
-              </a:rPr>
-              <a:t>variables </a:t>
-            </a:r>
-            <a:r>
-              <a:rPr lang="mr-IN" sz="1200" dirty="0" smtClean="0">
-                <a:solidFill>
-                  <a:srgbClr val="00B050"/>
-                </a:solidFill>
-                <a:latin typeface="Arial" charset="0"/>
-                <a:ea typeface="Arial" charset="0"/>
-                <a:cs typeface="Arial" charset="0"/>
-              </a:rPr>
-              <a:t>–</a:t>
-            </a:r>
-            <a:r>
-              <a:rPr lang="en-US" sz="1200" dirty="0" smtClean="0">
-                <a:solidFill>
-                  <a:srgbClr val="00B050"/>
-                </a:solidFill>
-                <a:latin typeface="Arial" charset="0"/>
-                <a:ea typeface="Arial" charset="0"/>
-                <a:cs typeface="Arial" charset="0"/>
-              </a:rPr>
-              <a:t> don’t forget this line!</a:t>
-            </a:r>
-          </a:p>
-          <a:p>
-            <a:r>
-              <a:rPr lang="en-US" sz="1200" dirty="0" smtClean="0">
-                <a:latin typeface="Arial" charset="0"/>
-                <a:ea typeface="Arial" charset="0"/>
-                <a:cs typeface="Arial" charset="0"/>
-              </a:rPr>
-              <a:t>  </a:t>
-            </a:r>
-            <a:r>
-              <a:rPr lang="en-US" sz="1200" dirty="0" err="1" smtClean="0">
-                <a:latin typeface="Arial" charset="0"/>
-                <a:ea typeface="Arial" charset="0"/>
-                <a:cs typeface="Arial" charset="0"/>
-              </a:rPr>
-              <a:t>strip.setPixelColor</a:t>
-            </a:r>
-            <a:r>
-              <a:rPr lang="en-US" sz="1200" dirty="0" smtClean="0">
-                <a:latin typeface="Arial" charset="0"/>
-                <a:ea typeface="Arial" charset="0"/>
-                <a:cs typeface="Arial" charset="0"/>
-              </a:rPr>
-              <a:t>(0</a:t>
-            </a:r>
-            <a:r>
-              <a:rPr lang="en-US" sz="1200" dirty="0">
-                <a:latin typeface="Arial" charset="0"/>
-                <a:ea typeface="Arial" charset="0"/>
-                <a:cs typeface="Arial" charset="0"/>
-              </a:rPr>
-              <a:t>, 255, </a:t>
-            </a:r>
-            <a:r>
-              <a:rPr lang="en-US" sz="1200" dirty="0" smtClean="0">
-                <a:latin typeface="Arial" charset="0"/>
-                <a:ea typeface="Arial" charset="0"/>
-                <a:cs typeface="Arial" charset="0"/>
-              </a:rPr>
-              <a:t>125, 0); </a:t>
-            </a:r>
-            <a:r>
-              <a:rPr lang="en-US" sz="1200" dirty="0">
-                <a:solidFill>
-                  <a:srgbClr val="00B050"/>
-                </a:solidFill>
-                <a:latin typeface="Arial" charset="0"/>
-                <a:ea typeface="Arial" charset="0"/>
-                <a:cs typeface="Arial" charset="0"/>
-              </a:rPr>
-              <a:t>// set pixel 0 to be </a:t>
-            </a:r>
-            <a:r>
-              <a:rPr lang="en-US" sz="1200" dirty="0" smtClean="0">
-                <a:solidFill>
-                  <a:srgbClr val="00B050"/>
-                </a:solidFill>
-                <a:latin typeface="Arial" charset="0"/>
-                <a:ea typeface="Arial" charset="0"/>
-                <a:cs typeface="Arial" charset="0"/>
-              </a:rPr>
-              <a:t>yellow</a:t>
-            </a:r>
-            <a:endParaRPr lang="en-US" sz="1200" dirty="0" smtClean="0">
-              <a:solidFill>
-                <a:srgbClr val="00B050"/>
-              </a:solidFill>
-              <a:latin typeface="Arial" charset="0"/>
-              <a:ea typeface="Arial" charset="0"/>
-              <a:cs typeface="Arial" charset="0"/>
-            </a:endParaRPr>
-          </a:p>
-          <a:p>
-            <a:r>
-              <a:rPr lang="en-US" sz="1200" dirty="0" smtClean="0">
-                <a:latin typeface="Arial" charset="0"/>
-                <a:ea typeface="Arial" charset="0"/>
-                <a:cs typeface="Arial" charset="0"/>
-              </a:rPr>
-              <a:t>  strip.show(); </a:t>
-            </a:r>
-            <a:r>
-              <a:rPr lang="en-US" sz="1200" dirty="0" smtClean="0">
-                <a:solidFill>
-                  <a:srgbClr val="00B050"/>
-                </a:solidFill>
-                <a:latin typeface="Arial" charset="0"/>
-                <a:ea typeface="Arial" charset="0"/>
-                <a:cs typeface="Arial" charset="0"/>
-              </a:rPr>
-              <a:t>// </a:t>
-            </a:r>
-            <a:r>
-              <a:rPr lang="en-US" sz="1200" dirty="0">
-                <a:solidFill>
-                  <a:srgbClr val="00B050"/>
-                </a:solidFill>
-                <a:latin typeface="Arial" charset="0"/>
-                <a:ea typeface="Arial" charset="0"/>
-                <a:cs typeface="Arial" charset="0"/>
-              </a:rPr>
-              <a:t>s</a:t>
-            </a:r>
-            <a:r>
-              <a:rPr lang="en-US" sz="1200" dirty="0" smtClean="0">
-                <a:solidFill>
-                  <a:srgbClr val="00B050"/>
-                </a:solidFill>
-                <a:latin typeface="Arial" charset="0"/>
-                <a:ea typeface="Arial" charset="0"/>
-                <a:cs typeface="Arial" charset="0"/>
-              </a:rPr>
-              <a:t>end the data to the LED strip </a:t>
-            </a:r>
-            <a:r>
-              <a:rPr lang="mr-IN" sz="1200" dirty="0" smtClean="0">
-                <a:solidFill>
-                  <a:srgbClr val="00B050"/>
-                </a:solidFill>
-                <a:latin typeface="Arial" charset="0"/>
-                <a:ea typeface="Arial" charset="0"/>
-                <a:cs typeface="Arial" charset="0"/>
-              </a:rPr>
-              <a:t>–</a:t>
-            </a:r>
-            <a:r>
-              <a:rPr lang="en-US" sz="1200" dirty="0" smtClean="0">
-                <a:solidFill>
-                  <a:srgbClr val="00B050"/>
-                </a:solidFill>
-                <a:latin typeface="Arial" charset="0"/>
-                <a:ea typeface="Arial" charset="0"/>
-                <a:cs typeface="Arial" charset="0"/>
-              </a:rPr>
-              <a:t> must do this after any change</a:t>
-            </a:r>
-          </a:p>
-          <a:p>
-            <a:r>
-              <a:rPr lang="en-US" sz="1200" dirty="0" smtClean="0">
-                <a:latin typeface="Arial" charset="0"/>
-                <a:ea typeface="Arial" charset="0"/>
-                <a:cs typeface="Arial" charset="0"/>
-              </a:rPr>
-              <a:t>  delay(1000); </a:t>
-            </a:r>
-            <a:r>
-              <a:rPr lang="en-US" sz="1200" dirty="0" smtClean="0">
-                <a:solidFill>
-                  <a:srgbClr val="00B050"/>
-                </a:solidFill>
-                <a:latin typeface="Arial" charset="0"/>
-                <a:ea typeface="Arial" charset="0"/>
-                <a:cs typeface="Arial" charset="0"/>
-              </a:rPr>
-              <a:t> // wait 1 second</a:t>
-            </a:r>
-            <a:endParaRPr lang="en-US" sz="1200" dirty="0" smtClean="0">
-              <a:solidFill>
-                <a:srgbClr val="00B050"/>
-              </a:solidFill>
-              <a:latin typeface="Arial" charset="0"/>
-              <a:ea typeface="Arial" charset="0"/>
-              <a:cs typeface="Arial" charset="0"/>
-            </a:endParaRPr>
-          </a:p>
-          <a:p>
-            <a:r>
-              <a:rPr lang="en-US" sz="1200" dirty="0" smtClean="0">
-                <a:latin typeface="Arial" charset="0"/>
-                <a:ea typeface="Arial" charset="0"/>
-                <a:cs typeface="Arial" charset="0"/>
-              </a:rPr>
-              <a:t>}</a:t>
-            </a:r>
-            <a:endParaRPr lang="en-US" sz="1200" dirty="0" smtClean="0">
-              <a:latin typeface="Arial" charset="0"/>
-              <a:ea typeface="Arial" charset="0"/>
-              <a:cs typeface="Arial" charset="0"/>
-            </a:endParaRPr>
-          </a:p>
-        </p:txBody>
-      </p:sp>
-      <p:sp>
-        <p:nvSpPr>
-          <p:cNvPr id="6" name="TextBox 5"/>
-          <p:cNvSpPr txBox="1"/>
-          <p:nvPr/>
-        </p:nvSpPr>
-        <p:spPr>
-          <a:xfrm>
-            <a:off x="323850" y="572772"/>
+            <a:off x="447675" y="2819492"/>
             <a:ext cx="4857750" cy="276999"/>
           </a:xfrm>
           <a:prstGeom prst="rect">
@@ -4936,674 +4058,16 @@
           </a:p>
         </p:txBody>
       </p:sp>
-      <p:pic>
-        <p:nvPicPr>
-          <p:cNvPr id="7" name="Picture 6"/>
-          <p:cNvPicPr>
-            <a:picLocks noChangeAspect="1"/>
-          </p:cNvPicPr>
+      <p:sp>
+        <p:nvSpPr>
+          <p:cNvPr id="26" name="Rounded Rectangle 25"/>
+          <p:cNvSpPr/>
           <p:nvPr/>
-        </p:nvPicPr>
-        <p:blipFill>
-          <a:blip r:embed="rId2"/>
-          <a:stretch>
-            <a:fillRect/>
-          </a:stretch>
-        </p:blipFill>
+        </p:nvSpPr>
         <p:spPr>
           <a:xfrm>
-            <a:off x="342900" y="1006548"/>
-            <a:ext cx="1987550" cy="724071"/>
-          </a:xfrm>
-          <a:prstGeom prst="rect">
-            <a:avLst/>
-          </a:prstGeom>
-        </p:spPr>
-      </p:pic>
-      <p:pic>
-        <p:nvPicPr>
-          <p:cNvPr id="8" name="Picture 7"/>
-          <p:cNvPicPr>
-            <a:picLocks noChangeAspect="1"/>
-          </p:cNvPicPr>
-          <p:nvPr/>
-        </p:nvPicPr>
-        <p:blipFill>
-          <a:blip r:embed="rId3"/>
-          <a:stretch>
-            <a:fillRect/>
-          </a:stretch>
-        </p:blipFill>
-        <p:spPr>
-          <a:xfrm>
-            <a:off x="2438400" y="1261533"/>
-            <a:ext cx="3232150" cy="387350"/>
-          </a:xfrm>
-          <a:prstGeom prst="rect">
-            <a:avLst/>
-          </a:prstGeom>
-        </p:spPr>
-      </p:pic>
-      <p:sp>
-        <p:nvSpPr>
-          <p:cNvPr id="9" name="Oval 8"/>
-          <p:cNvSpPr/>
-          <p:nvPr/>
-        </p:nvSpPr>
-        <p:spPr>
-          <a:xfrm>
-            <a:off x="5105400" y="1455208"/>
-            <a:ext cx="685800" cy="144992"/>
-          </a:xfrm>
-          <a:prstGeom prst="ellipse">
-            <a:avLst/>
-          </a:prstGeom>
-          <a:noFill/>
-          <a:ln>
-            <a:solidFill>
-              <a:srgbClr val="FF0000"/>
-            </a:solidFill>
-          </a:ln>
-        </p:spPr>
-        <p:style>
-          <a:lnRef idx="2">
-            <a:schemeClr val="accent1">
-              <a:shade val="50000"/>
-            </a:schemeClr>
-          </a:lnRef>
-          <a:fillRef idx="1">
-            <a:schemeClr val="accent1"/>
-          </a:fillRef>
-          <a:effectRef idx="0">
-            <a:schemeClr val="accent1"/>
-          </a:effectRef>
-          <a:fontRef idx="minor">
-            <a:schemeClr val="lt1"/>
-          </a:fontRef>
-        </p:style>
-        <p:txBody>
-          <a:bodyPr rtlCol="0" anchor="ctr"/>
-          <a:lstStyle/>
-          <a:p>
-            <a:pPr algn="ctr"/>
-            <a:endParaRPr lang="en-US"/>
-          </a:p>
-        </p:txBody>
-      </p:sp>
-      <p:pic>
-        <p:nvPicPr>
-          <p:cNvPr id="10" name="Picture 9"/>
-          <p:cNvPicPr>
-            <a:picLocks noChangeAspect="1"/>
-          </p:cNvPicPr>
-          <p:nvPr/>
-        </p:nvPicPr>
-        <p:blipFill>
-          <a:blip r:embed="rId4"/>
-          <a:stretch>
-            <a:fillRect/>
-          </a:stretch>
-        </p:blipFill>
-        <p:spPr>
-          <a:xfrm>
-            <a:off x="419100" y="1880340"/>
-            <a:ext cx="5372100" cy="549615"/>
-          </a:xfrm>
-          <a:prstGeom prst="rect">
-            <a:avLst/>
-          </a:prstGeom>
-        </p:spPr>
-      </p:pic>
-      <p:sp>
-        <p:nvSpPr>
-          <p:cNvPr id="11" name="Oval 10"/>
-          <p:cNvSpPr/>
-          <p:nvPr/>
-        </p:nvSpPr>
-        <p:spPr>
-          <a:xfrm>
-            <a:off x="1524000" y="1269662"/>
-            <a:ext cx="838200" cy="143404"/>
-          </a:xfrm>
-          <a:prstGeom prst="ellipse">
-            <a:avLst/>
-          </a:prstGeom>
-          <a:noFill/>
-          <a:ln>
-            <a:solidFill>
-              <a:srgbClr val="FF0000"/>
-            </a:solidFill>
-          </a:ln>
-        </p:spPr>
-        <p:style>
-          <a:lnRef idx="2">
-            <a:schemeClr val="accent1">
-              <a:shade val="50000"/>
-            </a:schemeClr>
-          </a:lnRef>
-          <a:fillRef idx="1">
-            <a:schemeClr val="accent1"/>
-          </a:fillRef>
-          <a:effectRef idx="0">
-            <a:schemeClr val="accent1"/>
-          </a:effectRef>
-          <a:fontRef idx="minor">
-            <a:schemeClr val="lt1"/>
-          </a:fontRef>
-        </p:style>
-        <p:txBody>
-          <a:bodyPr rtlCol="0" anchor="ctr"/>
-          <a:lstStyle/>
-          <a:p>
-            <a:pPr algn="ctr"/>
-            <a:endParaRPr lang="en-US"/>
-          </a:p>
-        </p:txBody>
-      </p:sp>
-      <p:sp>
-        <p:nvSpPr>
-          <p:cNvPr id="12" name="TextBox 11"/>
-          <p:cNvSpPr txBox="1"/>
-          <p:nvPr/>
-        </p:nvSpPr>
-        <p:spPr>
-          <a:xfrm>
-            <a:off x="333012" y="6665664"/>
-            <a:ext cx="5458188" cy="1692771"/>
-          </a:xfrm>
-          <a:prstGeom prst="rect">
-            <a:avLst/>
-          </a:prstGeom>
-          <a:solidFill>
-            <a:schemeClr val="bg1">
-              <a:lumMod val="95000"/>
-            </a:schemeClr>
-          </a:solidFill>
-          <a:ln>
-            <a:solidFill>
-              <a:schemeClr val="tx1"/>
-            </a:solidFill>
-          </a:ln>
-        </p:spPr>
-        <p:txBody>
-          <a:bodyPr wrap="square" rtlCol="0">
-            <a:spAutoFit/>
-          </a:bodyPr>
-          <a:lstStyle/>
-          <a:p>
-            <a:endParaRPr lang="en-US" sz="800" dirty="0" smtClean="0">
-              <a:latin typeface="Arial Narrow" pitchFamily="34" charset="0"/>
-            </a:endParaRPr>
-          </a:p>
-          <a:p>
-            <a:r>
-              <a:rPr lang="en-US" sz="1200" b="1" dirty="0"/>
-              <a:t>void</a:t>
-            </a:r>
-            <a:r>
-              <a:rPr lang="en-US" sz="1200" dirty="0"/>
-              <a:t> </a:t>
-            </a:r>
-            <a:r>
-              <a:rPr lang="en-US" sz="1200" b="1" dirty="0"/>
-              <a:t>loop</a:t>
-            </a:r>
-            <a:r>
-              <a:rPr lang="en-US" sz="1200" dirty="0"/>
-              <a:t>() </a:t>
-            </a:r>
-            <a:r>
-              <a:rPr lang="en-US" sz="1200" dirty="0" smtClean="0"/>
-              <a:t>{</a:t>
-            </a:r>
-          </a:p>
-          <a:p>
-            <a:r>
-              <a:rPr lang="en-US" sz="1200" b="1" dirty="0" smtClean="0"/>
-              <a:t>   for</a:t>
-            </a:r>
-            <a:r>
-              <a:rPr lang="en-US" sz="1200" dirty="0" smtClean="0"/>
-              <a:t> </a:t>
-            </a:r>
-            <a:r>
-              <a:rPr lang="en-US" sz="1200" dirty="0"/>
-              <a:t>(</a:t>
-            </a:r>
-            <a:r>
-              <a:rPr lang="en-US" sz="1200" b="1" dirty="0" err="1"/>
-              <a:t>int</a:t>
-            </a:r>
-            <a:r>
-              <a:rPr lang="en-US" sz="1200" dirty="0"/>
-              <a:t> </a:t>
-            </a:r>
-            <a:r>
-              <a:rPr lang="en-US" sz="1200" dirty="0" err="1"/>
-              <a:t>i</a:t>
-            </a:r>
-            <a:r>
-              <a:rPr lang="en-US" sz="1200" dirty="0"/>
-              <a:t>=0; </a:t>
-            </a:r>
-            <a:r>
-              <a:rPr lang="en-US" sz="1200" dirty="0" err="1" smtClean="0"/>
-              <a:t>i</a:t>
-            </a:r>
-            <a:r>
-              <a:rPr lang="en-US" sz="1200" dirty="0" smtClean="0"/>
-              <a:t>&lt;NUMBER_PIXELS</a:t>
-            </a:r>
-            <a:r>
-              <a:rPr lang="en-US" sz="1200" dirty="0"/>
-              <a:t>; </a:t>
-            </a:r>
-            <a:r>
-              <a:rPr lang="en-US" sz="1200" dirty="0" err="1"/>
-              <a:t>i</a:t>
-            </a:r>
-            <a:r>
-              <a:rPr lang="en-US" sz="1200" dirty="0" smtClean="0"/>
-              <a:t>++) {</a:t>
-            </a:r>
-          </a:p>
-          <a:p>
-            <a:r>
-              <a:rPr lang="en-US" sz="1200" dirty="0"/>
-              <a:t> </a:t>
-            </a:r>
-            <a:r>
-              <a:rPr lang="en-US" sz="1200" dirty="0" smtClean="0"/>
-              <a:t>      </a:t>
-            </a:r>
-            <a:r>
-              <a:rPr lang="en-US" sz="1200" dirty="0" err="1" smtClean="0">
-                <a:latin typeface="Arial" charset="0"/>
-                <a:ea typeface="Arial" charset="0"/>
-                <a:cs typeface="Arial" charset="0"/>
-              </a:rPr>
-              <a:t>strip.setPixelColor</a:t>
-            </a:r>
-            <a:r>
-              <a:rPr lang="en-US" sz="1200" dirty="0" smtClean="0">
-                <a:latin typeface="Arial" charset="0"/>
-                <a:ea typeface="Arial" charset="0"/>
-                <a:cs typeface="Arial" charset="0"/>
-              </a:rPr>
-              <a:t>(</a:t>
-            </a:r>
-            <a:r>
-              <a:rPr lang="en-US" sz="1200" dirty="0" err="1" smtClean="0">
-                <a:latin typeface="Arial" charset="0"/>
-                <a:ea typeface="Arial" charset="0"/>
-                <a:cs typeface="Arial" charset="0"/>
-              </a:rPr>
-              <a:t>i</a:t>
-            </a:r>
-            <a:r>
-              <a:rPr lang="en-US" sz="1200" dirty="0">
-                <a:latin typeface="Arial" charset="0"/>
-                <a:ea typeface="Arial" charset="0"/>
-                <a:cs typeface="Arial" charset="0"/>
-              </a:rPr>
-              <a:t>, 255, 0, 0); </a:t>
-            </a:r>
-            <a:r>
-              <a:rPr lang="en-US" sz="1200" i="1" dirty="0">
-                <a:solidFill>
-                  <a:srgbClr val="00B050"/>
-                </a:solidFill>
-                <a:latin typeface="Arial" charset="0"/>
-                <a:ea typeface="Arial" charset="0"/>
-                <a:cs typeface="Arial" charset="0"/>
-              </a:rPr>
-              <a:t>// turn the "</a:t>
-            </a:r>
-            <a:r>
-              <a:rPr lang="en-US" sz="1200" i="1" dirty="0" err="1">
-                <a:solidFill>
-                  <a:srgbClr val="00B050"/>
-                </a:solidFill>
-                <a:latin typeface="Arial" charset="0"/>
-                <a:ea typeface="Arial" charset="0"/>
-                <a:cs typeface="Arial" charset="0"/>
-              </a:rPr>
-              <a:t>i"th</a:t>
-            </a:r>
-            <a:r>
-              <a:rPr lang="en-US" sz="1200" i="1" dirty="0">
-                <a:solidFill>
-                  <a:srgbClr val="00B050"/>
-                </a:solidFill>
-                <a:latin typeface="Arial" charset="0"/>
-                <a:ea typeface="Arial" charset="0"/>
-                <a:cs typeface="Arial" charset="0"/>
-              </a:rPr>
-              <a:t> pixel </a:t>
-            </a:r>
-            <a:r>
-              <a:rPr lang="en-US" sz="1200" i="1" dirty="0" smtClean="0">
-                <a:solidFill>
-                  <a:srgbClr val="00B050"/>
-                </a:solidFill>
-                <a:latin typeface="Arial" charset="0"/>
-                <a:ea typeface="Arial" charset="0"/>
-                <a:cs typeface="Arial" charset="0"/>
-              </a:rPr>
-              <a:t>on</a:t>
-            </a:r>
-            <a:endParaRPr lang="en-US" sz="1200" dirty="0">
-              <a:solidFill>
-                <a:srgbClr val="00B050"/>
-              </a:solidFill>
-              <a:latin typeface="Arial" charset="0"/>
-              <a:ea typeface="Arial" charset="0"/>
-              <a:cs typeface="Arial" charset="0"/>
-            </a:endParaRPr>
-          </a:p>
-          <a:p>
-            <a:r>
-              <a:rPr lang="en-US" sz="1200" dirty="0">
-                <a:solidFill>
-                  <a:srgbClr val="00B050"/>
-                </a:solidFill>
-                <a:latin typeface="Arial" charset="0"/>
-                <a:ea typeface="Arial" charset="0"/>
-                <a:cs typeface="Arial" charset="0"/>
-              </a:rPr>
-              <a:t> </a:t>
-            </a:r>
-            <a:r>
-              <a:rPr lang="en-US" sz="1200" dirty="0" smtClean="0">
-                <a:solidFill>
-                  <a:srgbClr val="00B050"/>
-                </a:solidFill>
-                <a:latin typeface="Arial" charset="0"/>
-                <a:ea typeface="Arial" charset="0"/>
-                <a:cs typeface="Arial" charset="0"/>
-              </a:rPr>
-              <a:t>     </a:t>
-            </a:r>
-            <a:r>
-              <a:rPr lang="en-US" sz="1200" dirty="0" err="1" smtClean="0">
-                <a:latin typeface="Arial" charset="0"/>
-                <a:ea typeface="Arial" charset="0"/>
-                <a:cs typeface="Arial" charset="0"/>
-              </a:rPr>
-              <a:t>strip.show</a:t>
-            </a:r>
-            <a:r>
-              <a:rPr lang="en-US" sz="1200" dirty="0" smtClean="0">
-                <a:latin typeface="Arial" charset="0"/>
-                <a:ea typeface="Arial" charset="0"/>
-                <a:cs typeface="Arial" charset="0"/>
-              </a:rPr>
-              <a:t>();  </a:t>
-            </a:r>
-            <a:r>
-              <a:rPr lang="en-US" sz="1200" dirty="0">
-                <a:solidFill>
-                  <a:srgbClr val="00B050"/>
-                </a:solidFill>
-                <a:latin typeface="Arial" charset="0"/>
-                <a:ea typeface="Arial" charset="0"/>
-                <a:cs typeface="Arial" charset="0"/>
-              </a:rPr>
-              <a:t>// send the data to the LED strip</a:t>
-            </a:r>
-            <a:endParaRPr lang="en-US" sz="1200" dirty="0" smtClean="0">
-              <a:latin typeface="Arial" charset="0"/>
-              <a:ea typeface="Arial" charset="0"/>
-              <a:cs typeface="Arial" charset="0"/>
-            </a:endParaRPr>
-          </a:p>
-          <a:p>
-            <a:r>
-              <a:rPr lang="en-US" sz="1200" dirty="0" smtClean="0">
-                <a:latin typeface="Arial" charset="0"/>
-                <a:ea typeface="Arial" charset="0"/>
-                <a:cs typeface="Arial" charset="0"/>
-              </a:rPr>
-              <a:t>      delay(100</a:t>
-            </a:r>
-            <a:r>
-              <a:rPr lang="en-US" sz="1200" dirty="0">
-                <a:latin typeface="Arial" charset="0"/>
-                <a:ea typeface="Arial" charset="0"/>
-                <a:cs typeface="Arial" charset="0"/>
-              </a:rPr>
-              <a:t>); </a:t>
-            </a:r>
-            <a:r>
-              <a:rPr lang="en-US" sz="1200" dirty="0" smtClean="0">
-                <a:latin typeface="Arial" charset="0"/>
-                <a:ea typeface="Arial" charset="0"/>
-                <a:cs typeface="Arial" charset="0"/>
-              </a:rPr>
-              <a:t> </a:t>
-            </a:r>
-            <a:r>
-              <a:rPr lang="en-US" sz="1200" dirty="0">
-                <a:solidFill>
-                  <a:srgbClr val="00B050"/>
-                </a:solidFill>
-                <a:latin typeface="Arial" charset="0"/>
-                <a:ea typeface="Arial" charset="0"/>
-                <a:cs typeface="Arial" charset="0"/>
-              </a:rPr>
-              <a:t>// </a:t>
-            </a:r>
-            <a:r>
-              <a:rPr lang="en-US" sz="1200" i="1" dirty="0" smtClean="0">
-                <a:solidFill>
-                  <a:srgbClr val="00B050"/>
-                </a:solidFill>
-                <a:latin typeface="Arial" charset="0"/>
-                <a:ea typeface="Arial" charset="0"/>
-                <a:cs typeface="Arial" charset="0"/>
-              </a:rPr>
-              <a:t>wait </a:t>
-            </a:r>
-            <a:r>
-              <a:rPr lang="en-US" sz="1200" i="1" dirty="0">
-                <a:solidFill>
-                  <a:srgbClr val="00B050"/>
-                </a:solidFill>
-                <a:latin typeface="Arial" charset="0"/>
-                <a:ea typeface="Arial" charset="0"/>
-                <a:cs typeface="Arial" charset="0"/>
-              </a:rPr>
-              <a:t>1/10th of a </a:t>
-            </a:r>
-            <a:r>
-              <a:rPr lang="en-US" sz="1200" i="1" dirty="0" smtClean="0">
-                <a:solidFill>
-                  <a:srgbClr val="00B050"/>
-                </a:solidFill>
-                <a:latin typeface="Arial" charset="0"/>
-                <a:ea typeface="Arial" charset="0"/>
-                <a:cs typeface="Arial" charset="0"/>
-              </a:rPr>
-              <a:t>second </a:t>
-            </a:r>
-            <a:r>
-              <a:rPr lang="mr-IN" sz="1200" i="1" dirty="0" smtClean="0">
-                <a:solidFill>
-                  <a:srgbClr val="00B050"/>
-                </a:solidFill>
-                <a:latin typeface="Arial" charset="0"/>
-                <a:ea typeface="Arial" charset="0"/>
-                <a:cs typeface="Arial" charset="0"/>
-              </a:rPr>
-              <a:t>–</a:t>
-            </a:r>
-            <a:r>
-              <a:rPr lang="en-US" sz="1200" i="1" dirty="0" smtClean="0">
-                <a:solidFill>
-                  <a:srgbClr val="00B050"/>
-                </a:solidFill>
-                <a:latin typeface="Arial" charset="0"/>
-                <a:ea typeface="Arial" charset="0"/>
-                <a:cs typeface="Arial" charset="0"/>
-              </a:rPr>
-              <a:t> a lower number makes it go faster</a:t>
-            </a:r>
-            <a:endParaRPr lang="en-US" sz="1200" dirty="0">
-              <a:solidFill>
-                <a:srgbClr val="00B050"/>
-              </a:solidFill>
-              <a:latin typeface="Arial" charset="0"/>
-              <a:ea typeface="Arial" charset="0"/>
-              <a:cs typeface="Arial" charset="0"/>
-            </a:endParaRPr>
-          </a:p>
-          <a:p>
-            <a:r>
-              <a:rPr lang="en-US" sz="1200" dirty="0" smtClean="0">
-                <a:latin typeface="Arial" charset="0"/>
-                <a:ea typeface="Arial" charset="0"/>
-                <a:cs typeface="Arial" charset="0"/>
-              </a:rPr>
-              <a:t>      </a:t>
-            </a:r>
-            <a:r>
-              <a:rPr lang="en-US" sz="1200" dirty="0" err="1" smtClean="0">
-                <a:latin typeface="Arial" charset="0"/>
-                <a:ea typeface="Arial" charset="0"/>
-                <a:cs typeface="Arial" charset="0"/>
-              </a:rPr>
-              <a:t>strip.setPixelColor</a:t>
-            </a:r>
-            <a:r>
-              <a:rPr lang="en-US" sz="1200" dirty="0" smtClean="0">
-                <a:latin typeface="Arial" charset="0"/>
-                <a:ea typeface="Arial" charset="0"/>
-                <a:cs typeface="Arial" charset="0"/>
-              </a:rPr>
-              <a:t>(</a:t>
-            </a:r>
-            <a:r>
-              <a:rPr lang="en-US" sz="1200" dirty="0" err="1" smtClean="0">
-                <a:latin typeface="Arial" charset="0"/>
-                <a:ea typeface="Arial" charset="0"/>
-                <a:cs typeface="Arial" charset="0"/>
-              </a:rPr>
-              <a:t>i</a:t>
-            </a:r>
-            <a:r>
-              <a:rPr lang="en-US" sz="1200" dirty="0">
-                <a:latin typeface="Arial" charset="0"/>
-                <a:ea typeface="Arial" charset="0"/>
-                <a:cs typeface="Arial" charset="0"/>
-              </a:rPr>
-              <a:t>, 0, 0, 0); </a:t>
-            </a:r>
-            <a:r>
-              <a:rPr lang="en-US" sz="1200" dirty="0">
-                <a:solidFill>
-                  <a:srgbClr val="00B050"/>
-                </a:solidFill>
-                <a:latin typeface="Arial" charset="0"/>
-                <a:ea typeface="Arial" charset="0"/>
-                <a:cs typeface="Arial" charset="0"/>
-              </a:rPr>
-              <a:t>// </a:t>
-            </a:r>
-            <a:r>
-              <a:rPr lang="en-US" sz="1200" i="1" dirty="0" smtClean="0">
-                <a:solidFill>
-                  <a:srgbClr val="00B050"/>
-                </a:solidFill>
-                <a:latin typeface="Arial" charset="0"/>
-                <a:ea typeface="Arial" charset="0"/>
-                <a:cs typeface="Arial" charset="0"/>
-              </a:rPr>
-              <a:t>turn </a:t>
-            </a:r>
-            <a:r>
-              <a:rPr lang="en-US" sz="1200" i="1" dirty="0">
-                <a:solidFill>
-                  <a:srgbClr val="00B050"/>
-                </a:solidFill>
-                <a:latin typeface="Arial" charset="0"/>
-                <a:ea typeface="Arial" charset="0"/>
-                <a:cs typeface="Arial" charset="0"/>
-              </a:rPr>
-              <a:t>the "</a:t>
-            </a:r>
-            <a:r>
-              <a:rPr lang="en-US" sz="1200" i="1" dirty="0" err="1">
-                <a:solidFill>
-                  <a:srgbClr val="00B050"/>
-                </a:solidFill>
-                <a:latin typeface="Arial" charset="0"/>
-                <a:ea typeface="Arial" charset="0"/>
-                <a:cs typeface="Arial" charset="0"/>
-              </a:rPr>
-              <a:t>i"th</a:t>
-            </a:r>
-            <a:r>
-              <a:rPr lang="en-US" sz="1200" i="1" dirty="0">
-                <a:solidFill>
-                  <a:srgbClr val="00B050"/>
-                </a:solidFill>
-                <a:latin typeface="Arial" charset="0"/>
-                <a:ea typeface="Arial" charset="0"/>
-                <a:cs typeface="Arial" charset="0"/>
-              </a:rPr>
-              <a:t> pixel </a:t>
-            </a:r>
-            <a:r>
-              <a:rPr lang="en-US" sz="1200" i="1" dirty="0" smtClean="0">
-                <a:solidFill>
-                  <a:srgbClr val="00B050"/>
-                </a:solidFill>
-                <a:latin typeface="Arial" charset="0"/>
-                <a:ea typeface="Arial" charset="0"/>
-                <a:cs typeface="Arial" charset="0"/>
-              </a:rPr>
-              <a:t>off</a:t>
-            </a:r>
-            <a:endParaRPr lang="en-US" sz="1200" dirty="0">
-              <a:solidFill>
-                <a:srgbClr val="00B050"/>
-              </a:solidFill>
-              <a:latin typeface="Arial" charset="0"/>
-              <a:ea typeface="Arial" charset="0"/>
-              <a:cs typeface="Arial" charset="0"/>
-            </a:endParaRPr>
-          </a:p>
-          <a:p>
-            <a:r>
-              <a:rPr lang="en-US" sz="1200" dirty="0" smtClean="0">
-                <a:latin typeface="Arial" charset="0"/>
-                <a:ea typeface="Arial" charset="0"/>
-                <a:cs typeface="Arial" charset="0"/>
-              </a:rPr>
-              <a:t>   }</a:t>
-            </a:r>
-          </a:p>
-          <a:p>
-            <a:r>
-              <a:rPr lang="en-US" sz="1200" dirty="0" smtClean="0"/>
-              <a:t>}</a:t>
-            </a:r>
-            <a:endParaRPr lang="en-US" sz="1200" dirty="0">
-              <a:latin typeface="Arial Narrow" pitchFamily="34" charset="0"/>
-            </a:endParaRPr>
-          </a:p>
-        </p:txBody>
-      </p:sp>
-      <p:sp>
-        <p:nvSpPr>
-          <p:cNvPr id="13" name="Rounded Rectangle 12"/>
-          <p:cNvSpPr/>
-          <p:nvPr/>
-        </p:nvSpPr>
-        <p:spPr>
-          <a:xfrm>
-            <a:off x="342900" y="433891"/>
-            <a:ext cx="1524000" cy="183093"/>
+            <a:off x="519113" y="2688017"/>
+            <a:ext cx="4029076" cy="183093"/>
           </a:xfrm>
           <a:prstGeom prst="roundRect">
             <a:avLst/>
@@ -5636,23 +4100,494 @@
           <a:p>
             <a:pPr algn="ctr"/>
             <a:r>
+              <a:rPr lang="en-US" sz="1000" dirty="0" smtClean="0"/>
+              <a:t>Step 1: Download the Arduino Integrated </a:t>
+            </a:r>
+            <a:r>
               <a:rPr lang="en-US" sz="1000" smtClean="0"/>
-              <a:t>Step 1: Download the IDE</a:t>
-            </a:r>
-            <a:endParaRPr lang="en-US" sz="1000"/>
-          </a:p>
-        </p:txBody>
-      </p:sp>
-      <p:sp>
-        <p:nvSpPr>
-          <p:cNvPr id="14" name="Rounded Rectangle 13"/>
+              <a:t>Development Environment (IDE)</a:t>
+            </a:r>
+            <a:endParaRPr lang="en-US" sz="1000" dirty="0"/>
+          </a:p>
+        </p:txBody>
+      </p:sp>
+      <p:grpSp>
+        <p:nvGrpSpPr>
+          <p:cNvPr id="39" name="Group 38"/>
+          <p:cNvGrpSpPr/>
+          <p:nvPr/>
+        </p:nvGrpSpPr>
+        <p:grpSpPr>
+          <a:xfrm>
+            <a:off x="447675" y="3242501"/>
+            <a:ext cx="5619750" cy="1595159"/>
+            <a:chOff x="392113" y="3415128"/>
+            <a:chExt cx="5619750" cy="1595159"/>
+          </a:xfrm>
+        </p:grpSpPr>
+        <p:sp>
+          <p:nvSpPr>
+            <p:cNvPr id="19" name="TextBox 18"/>
+            <p:cNvSpPr txBox="1"/>
+            <p:nvPr/>
+          </p:nvSpPr>
+          <p:spPr>
+            <a:xfrm>
+              <a:off x="392113" y="3472002"/>
+              <a:ext cx="5619750" cy="1538285"/>
+            </a:xfrm>
+            <a:prstGeom prst="rect">
+              <a:avLst/>
+            </a:prstGeom>
+            <a:solidFill>
+              <a:schemeClr val="bg1">
+                <a:lumMod val="95000"/>
+              </a:schemeClr>
+            </a:solidFill>
+            <a:ln>
+              <a:solidFill>
+                <a:schemeClr val="tx1"/>
+              </a:solidFill>
+            </a:ln>
+          </p:spPr>
+          <p:txBody>
+            <a:bodyPr wrap="square" rtlCol="0">
+              <a:spAutoFit/>
+            </a:bodyPr>
+            <a:lstStyle/>
+            <a:p>
+              <a:endParaRPr lang="en-US" sz="1200" dirty="0" smtClean="0">
+                <a:latin typeface="Arial Narrow" pitchFamily="34" charset="0"/>
+              </a:endParaRPr>
+            </a:p>
+          </p:txBody>
+        </p:sp>
+        <p:pic>
+          <p:nvPicPr>
+            <p:cNvPr id="21" name="Picture 20"/>
+            <p:cNvPicPr>
+              <a:picLocks noChangeAspect="1"/>
+            </p:cNvPicPr>
+            <p:nvPr/>
+          </p:nvPicPr>
+          <p:blipFill>
+            <a:blip r:embed="rId4"/>
+            <a:stretch>
+              <a:fillRect/>
+            </a:stretch>
+          </p:blipFill>
+          <p:spPr>
+            <a:xfrm>
+              <a:off x="428625" y="3655931"/>
+              <a:ext cx="1987550" cy="724071"/>
+            </a:xfrm>
+            <a:prstGeom prst="rect">
+              <a:avLst/>
+            </a:prstGeom>
+          </p:spPr>
+        </p:pic>
+        <p:pic>
+          <p:nvPicPr>
+            <p:cNvPr id="22" name="Picture 21"/>
+            <p:cNvPicPr>
+              <a:picLocks noChangeAspect="1"/>
+            </p:cNvPicPr>
+            <p:nvPr/>
+          </p:nvPicPr>
+          <p:blipFill>
+            <a:blip r:embed="rId5"/>
+            <a:stretch>
+              <a:fillRect/>
+            </a:stretch>
+          </p:blipFill>
+          <p:spPr>
+            <a:xfrm>
+              <a:off x="2452687" y="3778969"/>
+              <a:ext cx="3232150" cy="387350"/>
+            </a:xfrm>
+            <a:prstGeom prst="rect">
+              <a:avLst/>
+            </a:prstGeom>
+          </p:spPr>
+        </p:pic>
+        <p:sp>
+          <p:nvSpPr>
+            <p:cNvPr id="23" name="Oval 22"/>
+            <p:cNvSpPr/>
+            <p:nvPr/>
+          </p:nvSpPr>
+          <p:spPr>
+            <a:xfrm>
+              <a:off x="5119687" y="3972644"/>
+              <a:ext cx="685800" cy="144992"/>
+            </a:xfrm>
+            <a:prstGeom prst="ellipse">
+              <a:avLst/>
+            </a:prstGeom>
+            <a:noFill/>
+            <a:ln>
+              <a:solidFill>
+                <a:srgbClr val="FF0000"/>
+              </a:solidFill>
+            </a:ln>
+          </p:spPr>
+          <p:style>
+            <a:lnRef idx="2">
+              <a:schemeClr val="accent1">
+                <a:shade val="50000"/>
+              </a:schemeClr>
+            </a:lnRef>
+            <a:fillRef idx="1">
+              <a:schemeClr val="accent1"/>
+            </a:fillRef>
+            <a:effectRef idx="0">
+              <a:schemeClr val="accent1"/>
+            </a:effectRef>
+            <a:fontRef idx="minor">
+              <a:schemeClr val="lt1"/>
+            </a:fontRef>
+          </p:style>
+          <p:txBody>
+            <a:bodyPr rtlCol="0" anchor="ctr"/>
+            <a:lstStyle/>
+            <a:p>
+              <a:pPr algn="ctr"/>
+              <a:endParaRPr lang="en-US"/>
+            </a:p>
+          </p:txBody>
+        </p:sp>
+        <p:pic>
+          <p:nvPicPr>
+            <p:cNvPr id="24" name="Picture 23"/>
+            <p:cNvPicPr>
+              <a:picLocks noChangeAspect="1"/>
+            </p:cNvPicPr>
+            <p:nvPr/>
+          </p:nvPicPr>
+          <p:blipFill>
+            <a:blip r:embed="rId6"/>
+            <a:stretch>
+              <a:fillRect/>
+            </a:stretch>
+          </p:blipFill>
+          <p:spPr>
+            <a:xfrm>
+              <a:off x="433387" y="4397776"/>
+              <a:ext cx="5372100" cy="549615"/>
+            </a:xfrm>
+            <a:prstGeom prst="rect">
+              <a:avLst/>
+            </a:prstGeom>
+          </p:spPr>
+        </p:pic>
+        <p:sp>
+          <p:nvSpPr>
+            <p:cNvPr id="25" name="Oval 24"/>
+            <p:cNvSpPr/>
+            <p:nvPr/>
+          </p:nvSpPr>
+          <p:spPr>
+            <a:xfrm>
+              <a:off x="1612901" y="3775590"/>
+              <a:ext cx="838200" cy="143404"/>
+            </a:xfrm>
+            <a:prstGeom prst="ellipse">
+              <a:avLst/>
+            </a:prstGeom>
+            <a:noFill/>
+            <a:ln>
+              <a:solidFill>
+                <a:srgbClr val="FF0000"/>
+              </a:solidFill>
+            </a:ln>
+          </p:spPr>
+          <p:style>
+            <a:lnRef idx="2">
+              <a:schemeClr val="accent1">
+                <a:shade val="50000"/>
+              </a:schemeClr>
+            </a:lnRef>
+            <a:fillRef idx="1">
+              <a:schemeClr val="accent1"/>
+            </a:fillRef>
+            <a:effectRef idx="0">
+              <a:schemeClr val="accent1"/>
+            </a:effectRef>
+            <a:fontRef idx="minor">
+              <a:schemeClr val="lt1"/>
+            </a:fontRef>
+          </p:style>
+          <p:txBody>
+            <a:bodyPr rtlCol="0" anchor="ctr"/>
+            <a:lstStyle/>
+            <a:p>
+              <a:pPr algn="ctr"/>
+              <a:endParaRPr lang="en-US"/>
+            </a:p>
+          </p:txBody>
+        </p:sp>
+        <p:sp>
+          <p:nvSpPr>
+            <p:cNvPr id="27" name="Rounded Rectangle 26"/>
+            <p:cNvSpPr/>
+            <p:nvPr/>
+          </p:nvSpPr>
+          <p:spPr>
+            <a:xfrm>
+              <a:off x="447675" y="3415128"/>
+              <a:ext cx="1987550" cy="183093"/>
+            </a:xfrm>
+            <a:prstGeom prst="roundRect">
+              <a:avLst/>
+            </a:prstGeom>
+            <a:ln w="19050">
+              <a:solidFill>
+                <a:schemeClr val="tx1"/>
+              </a:solidFill>
+            </a:ln>
+          </p:spPr>
+          <p:style>
+            <a:lnRef idx="2">
+              <a:schemeClr val="accent1">
+                <a:shade val="50000"/>
+              </a:schemeClr>
+            </a:lnRef>
+            <a:fillRef idx="1">
+              <a:schemeClr val="accent1"/>
+            </a:fillRef>
+            <a:effectRef idx="0">
+              <a:schemeClr val="accent1"/>
+            </a:effectRef>
+            <a:fontRef idx="minor">
+              <a:schemeClr val="lt1"/>
+            </a:fontRef>
+          </p:style>
+          <p:txBody>
+            <a:bodyPr rtlCol="0" anchor="ctr"/>
+            <a:lstStyle/>
+            <a:p>
+              <a:pPr algn="ctr"/>
+              <a:r>
+                <a:rPr lang="en-US" sz="1000" dirty="0" smtClean="0"/>
+                <a:t>Step 2: Install the NeoPixel Library</a:t>
+              </a:r>
+              <a:endParaRPr lang="en-US" sz="1000" dirty="0"/>
+            </a:p>
+          </p:txBody>
+        </p:sp>
+        <p:sp>
+          <p:nvSpPr>
+            <p:cNvPr id="28" name="Oval 27"/>
+            <p:cNvSpPr/>
+            <p:nvPr/>
+          </p:nvSpPr>
+          <p:spPr>
+            <a:xfrm>
+              <a:off x="1462087" y="4734637"/>
+              <a:ext cx="685800" cy="177527"/>
+            </a:xfrm>
+            <a:prstGeom prst="ellipse">
+              <a:avLst/>
+            </a:prstGeom>
+            <a:noFill/>
+            <a:ln w="19050">
+              <a:solidFill>
+                <a:srgbClr val="FF0000"/>
+              </a:solidFill>
+            </a:ln>
+          </p:spPr>
+          <p:style>
+            <a:lnRef idx="2">
+              <a:schemeClr val="accent1">
+                <a:shade val="50000"/>
+              </a:schemeClr>
+            </a:lnRef>
+            <a:fillRef idx="1">
+              <a:schemeClr val="accent1"/>
+            </a:fillRef>
+            <a:effectRef idx="0">
+              <a:schemeClr val="accent1"/>
+            </a:effectRef>
+            <a:fontRef idx="minor">
+              <a:schemeClr val="lt1"/>
+            </a:fontRef>
+          </p:style>
+          <p:txBody>
+            <a:bodyPr rtlCol="0" anchor="ctr"/>
+            <a:lstStyle/>
+            <a:p>
+              <a:pPr algn="ctr"/>
+              <a:endParaRPr lang="en-US"/>
+            </a:p>
+          </p:txBody>
+        </p:sp>
+      </p:grpSp>
+      <p:grpSp>
+        <p:nvGrpSpPr>
+          <p:cNvPr id="33" name="Group 32"/>
+          <p:cNvGrpSpPr/>
+          <p:nvPr/>
+        </p:nvGrpSpPr>
+        <p:grpSpPr>
+          <a:xfrm>
+            <a:off x="422276" y="4999960"/>
+            <a:ext cx="4691925" cy="420927"/>
+            <a:chOff x="381000" y="5090266"/>
+            <a:chExt cx="4691925" cy="420927"/>
+          </a:xfrm>
+        </p:grpSpPr>
+        <p:sp>
+          <p:nvSpPr>
+            <p:cNvPr id="29" name="TextBox 28"/>
+            <p:cNvSpPr txBox="1"/>
+            <p:nvPr/>
+          </p:nvSpPr>
+          <p:spPr>
+            <a:xfrm>
+              <a:off x="381000" y="5178432"/>
+              <a:ext cx="4691925" cy="332761"/>
+            </a:xfrm>
+            <a:prstGeom prst="rect">
+              <a:avLst/>
+            </a:prstGeom>
+            <a:solidFill>
+              <a:schemeClr val="bg1">
+                <a:lumMod val="95000"/>
+              </a:schemeClr>
+            </a:solidFill>
+            <a:ln>
+              <a:solidFill>
+                <a:schemeClr val="tx1"/>
+              </a:solidFill>
+            </a:ln>
+          </p:spPr>
+          <p:txBody>
+            <a:bodyPr wrap="square" tIns="91440" rtlCol="0">
+              <a:noAutofit/>
+            </a:bodyPr>
+            <a:lstStyle/>
+            <a:p>
+              <a:r>
+                <a:rPr lang="en-US" sz="1200" dirty="0">
+                  <a:latin typeface="Arial Narrow" pitchFamily="34" charset="0"/>
+                </a:rPr>
+                <a:t>Download CH341 driver from: http://</a:t>
+              </a:r>
+              <a:r>
+                <a:rPr lang="en-US" sz="1200" dirty="0" err="1" smtClean="0">
+                  <a:latin typeface="Arial Narrow" pitchFamily="34" charset="0"/>
+                </a:rPr>
+                <a:t>www.wch.cn</a:t>
+              </a:r>
+              <a:r>
+                <a:rPr lang="en-US" sz="1200" dirty="0" smtClean="0">
+                  <a:latin typeface="Arial Narrow" pitchFamily="34" charset="0"/>
+                </a:rPr>
+                <a:t>/download/CH341SER_ZIP.html</a:t>
+              </a:r>
+              <a:endParaRPr lang="en-US" sz="1200" dirty="0">
+                <a:latin typeface="Arial Narrow" pitchFamily="34" charset="0"/>
+              </a:endParaRPr>
+            </a:p>
+          </p:txBody>
+        </p:sp>
+        <p:sp>
+          <p:nvSpPr>
+            <p:cNvPr id="30" name="Rounded Rectangle 29"/>
+            <p:cNvSpPr/>
+            <p:nvPr/>
+          </p:nvSpPr>
+          <p:spPr>
+            <a:xfrm>
+              <a:off x="436563" y="5090266"/>
+              <a:ext cx="1987550" cy="183093"/>
+            </a:xfrm>
+            <a:prstGeom prst="roundRect">
+              <a:avLst/>
+            </a:prstGeom>
+            <a:ln w="19050">
+              <a:solidFill>
+                <a:schemeClr val="tx1"/>
+              </a:solidFill>
+            </a:ln>
+          </p:spPr>
+          <p:style>
+            <a:lnRef idx="2">
+              <a:schemeClr val="accent1">
+                <a:shade val="50000"/>
+              </a:schemeClr>
+            </a:lnRef>
+            <a:fillRef idx="1">
+              <a:schemeClr val="accent1"/>
+            </a:fillRef>
+            <a:effectRef idx="0">
+              <a:schemeClr val="accent1"/>
+            </a:effectRef>
+            <a:fontRef idx="minor">
+              <a:schemeClr val="lt1"/>
+            </a:fontRef>
+          </p:style>
+          <p:txBody>
+            <a:bodyPr rtlCol="0" anchor="ctr"/>
+            <a:lstStyle/>
+            <a:p>
+              <a:pPr algn="ctr"/>
+              <a:r>
+                <a:rPr lang="en-US" sz="1000" dirty="0" smtClean="0"/>
+                <a:t>Step 3: Install the CH340 Driver</a:t>
+              </a:r>
+              <a:endParaRPr lang="en-US" sz="1000" dirty="0"/>
+            </a:p>
+          </p:txBody>
+        </p:sp>
+      </p:grpSp>
+      <p:sp>
+        <p:nvSpPr>
+          <p:cNvPr id="35" name="TextBox 34"/>
+          <p:cNvSpPr txBox="1"/>
+          <p:nvPr/>
+        </p:nvSpPr>
+        <p:spPr>
+          <a:xfrm>
+            <a:off x="422276" y="5700538"/>
+            <a:ext cx="5767387" cy="1541416"/>
+          </a:xfrm>
+          <a:prstGeom prst="rect">
+            <a:avLst/>
+          </a:prstGeom>
+          <a:solidFill>
+            <a:schemeClr val="bg1">
+              <a:lumMod val="95000"/>
+            </a:schemeClr>
+          </a:solidFill>
+          <a:ln>
+            <a:solidFill>
+              <a:schemeClr val="tx1"/>
+            </a:solidFill>
+          </a:ln>
+        </p:spPr>
+        <p:txBody>
+          <a:bodyPr wrap="square" tIns="91440" rtlCol="0">
+            <a:noAutofit/>
+          </a:bodyPr>
+          <a:lstStyle/>
+          <a:p>
+            <a:endParaRPr lang="en-US" sz="1200" dirty="0">
+              <a:latin typeface="Arial Narrow" pitchFamily="34" charset="0"/>
+            </a:endParaRPr>
+          </a:p>
+        </p:txBody>
+      </p:sp>
+      <p:sp>
+        <p:nvSpPr>
+          <p:cNvPr id="36" name="Rounded Rectangle 35"/>
           <p:cNvSpPr/>
           <p:nvPr/>
         </p:nvSpPr>
         <p:spPr>
           <a:xfrm>
-            <a:off x="342900" y="919019"/>
-            <a:ext cx="1987550" cy="183093"/>
+            <a:off x="477839" y="5612372"/>
+            <a:ext cx="2663824" cy="183093"/>
           </a:xfrm>
           <a:prstGeom prst="roundRect">
             <a:avLst/>
@@ -5686,22 +4621,78 @@
             <a:pPr algn="ctr"/>
             <a:r>
               <a:rPr lang="en-US" sz="1000" dirty="0" smtClean="0"/>
-              <a:t>Step 2: Install the NeoPixel Library</a:t>
+              <a:t>Step 4: Run the </a:t>
+            </a:r>
+            <a:r>
+              <a:rPr lang="en-US" sz="1000" smtClean="0"/>
+              <a:t>NeoPixel Example </a:t>
+            </a:r>
+            <a:r>
+              <a:rPr lang="en-US" sz="1000" dirty="0" err="1" smtClean="0"/>
+              <a:t>Strandtest</a:t>
             </a:r>
             <a:endParaRPr lang="en-US" sz="1000" dirty="0"/>
           </a:p>
         </p:txBody>
       </p:sp>
-      <p:sp>
-        <p:nvSpPr>
-          <p:cNvPr id="16" name="Oval 15"/>
+      <p:pic>
+        <p:nvPicPr>
+          <p:cNvPr id="17" name="Picture 16"/>
+          <p:cNvPicPr>
+            <a:picLocks noChangeAspect="1"/>
+          </p:cNvPicPr>
+          <p:nvPr/>
+        </p:nvPicPr>
+        <p:blipFill>
+          <a:blip r:embed="rId7"/>
+          <a:stretch>
+            <a:fillRect/>
+          </a:stretch>
+        </p:blipFill>
+        <p:spPr>
+          <a:xfrm>
+            <a:off x="1998663" y="6236913"/>
+            <a:ext cx="3808461" cy="947331"/>
+          </a:xfrm>
+          <a:prstGeom prst="rect">
+            <a:avLst/>
+          </a:prstGeom>
+        </p:spPr>
+      </p:pic>
+      <p:pic>
+        <p:nvPicPr>
+          <p:cNvPr id="18" name="Picture 17"/>
+          <p:cNvPicPr>
+            <a:picLocks noChangeAspect="1"/>
+          </p:cNvPicPr>
+          <p:nvPr/>
+        </p:nvPicPr>
+        <p:blipFill>
+          <a:blip r:embed="rId8"/>
+          <a:stretch>
+            <a:fillRect/>
+          </a:stretch>
+        </p:blipFill>
+        <p:spPr>
+          <a:xfrm>
+            <a:off x="536576" y="5903182"/>
+            <a:ext cx="1390650" cy="948536"/>
+          </a:xfrm>
+          <a:prstGeom prst="rect">
+            <a:avLst/>
+          </a:prstGeom>
+        </p:spPr>
+      </p:pic>
+      <p:sp>
+        <p:nvSpPr>
+          <p:cNvPr id="37" name="Oval 36"/>
           <p:cNvSpPr/>
           <p:nvPr/>
         </p:nvSpPr>
         <p:spPr>
           <a:xfrm>
-            <a:off x="1447800" y="2217201"/>
-            <a:ext cx="685800" cy="177527"/>
+            <a:off x="4404587" y="6762954"/>
+            <a:ext cx="946875" cy="177527"/>
           </a:xfrm>
           <a:prstGeom prst="ellipse">
             <a:avLst/>
@@ -5740,145 +4731,13 @@
       </p:sp>
       <p:sp>
         <p:nvSpPr>
-          <p:cNvPr id="17" name="TextBox 16"/>
+          <p:cNvPr id="40" name="TextBox 39"/>
           <p:cNvSpPr txBox="1"/>
           <p:nvPr/>
         </p:nvSpPr>
         <p:spPr>
           <a:xfrm>
-            <a:off x="342900" y="2666003"/>
-            <a:ext cx="4691925" cy="404697"/>
-          </a:xfrm>
-          <a:prstGeom prst="rect">
-            <a:avLst/>
-          </a:prstGeom>
-          <a:solidFill>
-            <a:schemeClr val="bg1">
-              <a:lumMod val="95000"/>
-            </a:schemeClr>
-          </a:solidFill>
-          <a:ln>
-            <a:solidFill>
-              <a:schemeClr val="tx1"/>
-            </a:solidFill>
-          </a:ln>
-        </p:spPr>
-        <p:txBody>
-          <a:bodyPr wrap="square" rtlCol="0">
-            <a:noAutofit/>
-          </a:bodyPr>
-          <a:lstStyle/>
-          <a:p>
-            <a:endParaRPr lang="en-US" sz="1200" dirty="0" smtClean="0">
-              <a:latin typeface="Arial Narrow" pitchFamily="34" charset="0"/>
-            </a:endParaRPr>
-          </a:p>
-        </p:txBody>
-      </p:sp>
-      <p:sp>
-        <p:nvSpPr>
-          <p:cNvPr id="18" name="Rounded Rectangle 17"/>
-          <p:cNvSpPr/>
-          <p:nvPr/>
-        </p:nvSpPr>
-        <p:spPr>
-          <a:xfrm>
-            <a:off x="374650" y="2583375"/>
-            <a:ext cx="1987550" cy="183093"/>
-          </a:xfrm>
-          <a:prstGeom prst="roundRect">
-            <a:avLst/>
-          </a:prstGeom>
-          <a:ln w="19050">
-            <a:solidFill>
-              <a:schemeClr val="tx1"/>
-            </a:solidFill>
-          </a:ln>
-        </p:spPr>
-        <p:style>
-          <a:lnRef idx="2">
-            <a:schemeClr val="accent1">
-              <a:shade val="50000"/>
-            </a:schemeClr>
-          </a:lnRef>
-          <a:fillRef idx="1">
-            <a:schemeClr val="accent1"/>
-          </a:fillRef>
-          <a:effectRef idx="0">
-            <a:schemeClr val="accent1"/>
-          </a:effectRef>
-          <a:fontRef idx="minor">
-            <a:schemeClr val="lt1"/>
-          </a:fontRef>
-        </p:style>
-        <p:txBody>
-          <a:bodyPr rtlCol="0" anchor="ctr"/>
-          <a:lstStyle/>
-          <a:p>
-            <a:pPr algn="ctr"/>
-            <a:r>
-              <a:rPr lang="en-US" sz="1000" dirty="0" smtClean="0"/>
-              <a:t>Step 3: Install the CH340 Driver</a:t>
-            </a:r>
-            <a:endParaRPr lang="en-US" sz="1000" dirty="0"/>
-          </a:p>
-        </p:txBody>
-      </p:sp>
-      <p:sp>
-        <p:nvSpPr>
-          <p:cNvPr id="19" name="TextBox 18"/>
-          <p:cNvSpPr txBox="1"/>
-          <p:nvPr/>
-        </p:nvSpPr>
-        <p:spPr>
-          <a:xfrm>
-            <a:off x="342900" y="2752108"/>
-            <a:ext cx="4691925" cy="461665"/>
-          </a:xfrm>
-          <a:prstGeom prst="rect">
-            <a:avLst/>
-          </a:prstGeom>
-          <a:noFill/>
-        </p:spPr>
-        <p:txBody>
-          <a:bodyPr wrap="none" rtlCol="0">
-            <a:spAutoFit/>
-          </a:bodyPr>
-          <a:lstStyle/>
-          <a:p>
-            <a:r>
-              <a:rPr lang="en-US" sz="1200" dirty="0">
-                <a:latin typeface="Arial Narrow" pitchFamily="34" charset="0"/>
-              </a:rPr>
-              <a:t>Download CH341 driver from: http://</a:t>
-            </a:r>
-            <a:r>
-              <a:rPr lang="en-US" sz="1200" dirty="0" err="1">
-                <a:latin typeface="Arial Narrow" pitchFamily="34" charset="0"/>
-              </a:rPr>
-              <a:t>www.wch.cn</a:t>
-            </a:r>
-            <a:r>
-              <a:rPr lang="en-US" sz="1200" dirty="0">
-                <a:latin typeface="Arial Narrow" pitchFamily="34" charset="0"/>
-              </a:rPr>
-              <a:t>/download/CH341SER_ZIP.html</a:t>
-            </a:r>
-          </a:p>
-          <a:p>
-            <a:endParaRPr lang="en-US" sz="1200" dirty="0"/>
-          </a:p>
-        </p:txBody>
-      </p:sp>
-      <p:sp>
-        <p:nvSpPr>
-          <p:cNvPr id="24" name="TextBox 23"/>
-          <p:cNvSpPr txBox="1"/>
-          <p:nvPr/>
-        </p:nvSpPr>
-        <p:spPr>
-          <a:xfrm>
-            <a:off x="342900" y="3244567"/>
+            <a:off x="422276" y="7485712"/>
             <a:ext cx="3771900" cy="404697"/>
           </a:xfrm>
           <a:prstGeom prst="rect">
@@ -5909,13 +4768,13 @@
       </p:sp>
       <p:sp>
         <p:nvSpPr>
-          <p:cNvPr id="22" name="Rounded Rectangle 21"/>
+          <p:cNvPr id="41" name="Rounded Rectangle 40"/>
           <p:cNvSpPr/>
           <p:nvPr/>
         </p:nvSpPr>
         <p:spPr>
           <a:xfrm>
-            <a:off x="387350" y="3158082"/>
+            <a:off x="466726" y="7399227"/>
             <a:ext cx="2292350" cy="183093"/>
           </a:xfrm>
           <a:prstGeom prst="roundRect">
@@ -5953,8 +4812,12 @@
               <a:t>Step </a:t>
             </a:r>
             <a:r>
-              <a:rPr lang="en-US" sz="1000" smtClean="0"/>
-              <a:t>4: Open the Moving Rainbow Labs</a:t>
+              <a:rPr lang="en-US" sz="1000" dirty="0"/>
+              <a:t>5</a:t>
+            </a:r>
+            <a:r>
+              <a:rPr lang="en-US" sz="1000" dirty="0" smtClean="0"/>
+              <a:t>: Open the Moving Rainbow Labs</a:t>
             </a:r>
             <a:endParaRPr lang="en-US" sz="1000" dirty="0"/>
           </a:p>
@@ -5962,13 +4825,13 @@
       </p:sp>
       <p:sp>
         <p:nvSpPr>
-          <p:cNvPr id="25" name="TextBox 24"/>
+          <p:cNvPr id="42" name="TextBox 41"/>
           <p:cNvSpPr txBox="1"/>
           <p:nvPr/>
         </p:nvSpPr>
         <p:spPr>
           <a:xfrm>
-            <a:off x="419100" y="3321608"/>
+            <a:off x="498476" y="7562753"/>
             <a:ext cx="3757375" cy="461665"/>
           </a:xfrm>
           <a:prstGeom prst="rect">
@@ -6024,150 +4887,1522 @@
           </a:p>
         </p:txBody>
       </p:sp>
-      <p:sp>
-        <p:nvSpPr>
-          <p:cNvPr id="26" name="Rounded Rectangle 25"/>
-          <p:cNvSpPr/>
-          <p:nvPr/>
+    </p:spTree>
+  </p:cSld>
+  <p:clrMapOvr>
+    <a:masterClrMapping/>
+  </p:clrMapOvr>
+</p:sld>
+</file>
+
+<file path=ppt/slides/slide2.xml><?xml version="1.0" encoding="utf-8"?>
+<p:sld xmlns:a="http://schemas.openxmlformats.org/drawingml/2006/main" xmlns:r="http://schemas.openxmlformats.org/officeDocument/2006/relationships" xmlns:p="http://schemas.openxmlformats.org/presentationml/2006/main">
+  <p:cSld>
+    <p:spTree>
+      <p:nvGrpSpPr>
+        <p:cNvPr id="1" name=""/>
+        <p:cNvGrpSpPr/>
+        <p:nvPr/>
+      </p:nvGrpSpPr>
+      <p:grpSpPr>
+        <a:xfrm>
+          <a:off x="0" y="0"/>
+          <a:ext cx="0" cy="0"/>
+          <a:chOff x="0" y="0"/>
+          <a:chExt cx="0" cy="0"/>
+        </a:xfrm>
+      </p:grpSpPr>
+      <p:sp>
+        <p:nvSpPr>
+          <p:cNvPr id="2" name="Title 1"/>
+          <p:cNvSpPr>
+            <a:spLocks noGrp="1"/>
+          </p:cNvSpPr>
+          <p:nvPr>
+            <p:ph type="title"/>
+          </p:nvPr>
         </p:nvSpPr>
         <p:spPr>
           <a:xfrm>
-            <a:off x="400050" y="3924642"/>
-            <a:ext cx="1123950" cy="183093"/>
+            <a:off x="323850" y="109537"/>
+            <a:ext cx="6172200" cy="316901"/>
           </a:xfrm>
-          <a:prstGeom prst="roundRect">
-            <a:avLst/>
-          </a:prstGeom>
-          <a:ln w="19050">
+        </p:spPr>
+        <p:txBody>
+          <a:bodyPr>
+            <a:normAutofit fontScale="90000"/>
+          </a:bodyPr>
+          <a:lstStyle/>
+          <a:p>
+            <a:r>
+              <a:rPr lang="en-US" sz="2400" b="1" dirty="0" smtClean="0">
+                <a:latin typeface="Arial Narrow" charset="0"/>
+                <a:ea typeface="Arial Narrow" charset="0"/>
+                <a:cs typeface="Arial Narrow" charset="0"/>
+              </a:rPr>
+              <a:t>NeoPixel Code Examples</a:t>
+            </a:r>
+            <a:endParaRPr lang="en-US" sz="2400" b="1" dirty="0">
+              <a:latin typeface="Arial Narrow" charset="0"/>
+              <a:ea typeface="Arial Narrow" charset="0"/>
+              <a:cs typeface="Arial Narrow" charset="0"/>
+            </a:endParaRPr>
+          </a:p>
+        </p:txBody>
+      </p:sp>
+      <p:grpSp>
+        <p:nvGrpSpPr>
+          <p:cNvPr id="32" name="Group 31"/>
+          <p:cNvGrpSpPr/>
+          <p:nvPr/>
+        </p:nvGrpSpPr>
+        <p:grpSpPr>
+          <a:xfrm>
+            <a:off x="317500" y="545259"/>
+            <a:ext cx="6096000" cy="1026431"/>
+            <a:chOff x="333012" y="3025479"/>
+            <a:chExt cx="6096000" cy="1026431"/>
+          </a:xfrm>
+        </p:grpSpPr>
+        <p:sp>
+          <p:nvSpPr>
+            <p:cNvPr id="4" name="TextBox 3"/>
+            <p:cNvSpPr txBox="1"/>
+            <p:nvPr/>
+          </p:nvSpPr>
+          <p:spPr>
+            <a:xfrm>
+              <a:off x="333012" y="3097803"/>
+              <a:ext cx="6096000" cy="954107"/>
+            </a:xfrm>
+            <a:prstGeom prst="rect">
+              <a:avLst/>
+            </a:prstGeom>
             <a:solidFill>
-              <a:schemeClr val="tx1"/>
+              <a:schemeClr val="bg1">
+                <a:lumMod val="95000"/>
+              </a:schemeClr>
             </a:solidFill>
-          </a:ln>
-        </p:spPr>
-        <p:style>
-          <a:lnRef idx="2">
-            <a:schemeClr val="accent1">
-              <a:shade val="50000"/>
-            </a:schemeClr>
-          </a:lnRef>
-          <a:fillRef idx="1">
-            <a:schemeClr val="accent1"/>
-          </a:fillRef>
-          <a:effectRef idx="0">
-            <a:schemeClr val="accent1"/>
-          </a:effectRef>
-          <a:fontRef idx="minor">
-            <a:schemeClr val="lt1"/>
-          </a:fontRef>
-        </p:style>
-        <p:txBody>
-          <a:bodyPr rtlCol="0" anchor="ctr"/>
-          <a:lstStyle/>
-          <a:p>
-            <a:r>
-              <a:rPr lang="en-US" sz="1000" dirty="0" smtClean="0"/>
-              <a:t>Sample Preamble</a:t>
-            </a:r>
-            <a:endParaRPr lang="en-US" sz="1000" dirty="0"/>
-          </a:p>
-        </p:txBody>
-      </p:sp>
-      <p:sp>
-        <p:nvSpPr>
-          <p:cNvPr id="27" name="Rounded Rectangle 26"/>
-          <p:cNvSpPr/>
+            <a:ln>
+              <a:solidFill>
+                <a:schemeClr val="tx1"/>
+              </a:solidFill>
+            </a:ln>
+          </p:spPr>
+          <p:txBody>
+            <a:bodyPr wrap="square" rtlCol="0">
+              <a:spAutoFit/>
+            </a:bodyPr>
+            <a:lstStyle/>
+            <a:p>
+              <a:endParaRPr lang="en-US" sz="800" dirty="0" smtClean="0">
+                <a:latin typeface="Arial Narrow" pitchFamily="34" charset="0"/>
+              </a:endParaRPr>
+            </a:p>
+            <a:p>
+              <a:r>
+                <a:rPr lang="en-US" sz="1200" dirty="0" smtClean="0">
+                  <a:latin typeface="Arial Narrow" pitchFamily="34" charset="0"/>
+                </a:rPr>
+                <a:t>#</a:t>
+              </a:r>
+              <a:r>
+                <a:rPr lang="en-US" sz="1200" dirty="0" smtClean="0">
+                  <a:latin typeface="Arial Narrow" pitchFamily="34" charset="0"/>
+                </a:rPr>
+                <a:t>include &lt;Adafruit_NeoPixel.h&gt;</a:t>
+              </a:r>
+            </a:p>
+            <a:p>
+              <a:r>
+                <a:rPr lang="en-US" sz="1200" dirty="0" smtClean="0">
+                  <a:latin typeface="Arial Narrow" pitchFamily="34" charset="0"/>
+                </a:rPr>
+                <a:t>#define LEDPIN </a:t>
+              </a:r>
+              <a:r>
+                <a:rPr lang="en-US" sz="1200" dirty="0" smtClean="0">
+                  <a:latin typeface="Arial Narrow" pitchFamily="34" charset="0"/>
+                </a:rPr>
+                <a:t>12 </a:t>
+              </a:r>
+              <a:r>
+                <a:rPr lang="en-US" sz="1200" dirty="0" smtClean="0">
+                  <a:solidFill>
+                    <a:srgbClr val="00B050"/>
+                  </a:solidFill>
+                  <a:latin typeface="Arial Narrow" pitchFamily="34" charset="0"/>
+                </a:rPr>
+                <a:t>// connect the Data from the strip to this pin on the Arduino</a:t>
+              </a:r>
+            </a:p>
+            <a:p>
+              <a:r>
+                <a:rPr lang="en-US" sz="1200" dirty="0" smtClean="0">
+                  <a:latin typeface="Arial Narrow" pitchFamily="34" charset="0"/>
+                </a:rPr>
+                <a:t>#define </a:t>
+              </a:r>
+              <a:r>
+                <a:rPr lang="en-US" sz="1200" dirty="0" smtClean="0">
+                  <a:latin typeface="Arial Narrow" pitchFamily="34" charset="0"/>
+                </a:rPr>
+                <a:t>NUMBER_PIXELS 30 </a:t>
+              </a:r>
+              <a:r>
+                <a:rPr lang="en-US" sz="1200" dirty="0" smtClean="0">
+                  <a:latin typeface="Arial Narrow" pitchFamily="34" charset="0"/>
+                </a:rPr>
+                <a:t>/</a:t>
+              </a:r>
+              <a:r>
+                <a:rPr lang="en-US" sz="1200" dirty="0">
+                  <a:solidFill>
+                    <a:srgbClr val="00B050"/>
+                  </a:solidFill>
+                  <a:latin typeface="Arial Narrow" pitchFamily="34" charset="0"/>
+                </a:rPr>
+                <a:t>/ the number of pixels in your LED strip</a:t>
+              </a:r>
+            </a:p>
+            <a:p>
+              <a:r>
+                <a:rPr lang="en-US" sz="1200" dirty="0" smtClean="0">
+                  <a:latin typeface="Arial Narrow" pitchFamily="34" charset="0"/>
+                </a:rPr>
+                <a:t>Adafruit_NeoPixel strip = </a:t>
+              </a:r>
+              <a:r>
+                <a:rPr lang="en-US" sz="1200" dirty="0" err="1" smtClean="0">
+                  <a:latin typeface="Arial Narrow" pitchFamily="34" charset="0"/>
+                </a:rPr>
+                <a:t>Adafruit_NeoPixel</a:t>
+              </a:r>
+              <a:r>
+                <a:rPr lang="en-US" sz="1200" dirty="0" smtClean="0">
+                  <a:latin typeface="Arial Narrow" pitchFamily="34" charset="0"/>
+                </a:rPr>
+                <a:t>(NUMBER_PIXELS</a:t>
+              </a:r>
+              <a:r>
+                <a:rPr lang="en-US" sz="1200" dirty="0" smtClean="0">
+                  <a:latin typeface="Arial Narrow" pitchFamily="34" charset="0"/>
+                </a:rPr>
+                <a:t>, LEDPIN, NEO_GRB + NEO_KHZ800</a:t>
+              </a:r>
+              <a:r>
+                <a:rPr lang="en-US" sz="1200" dirty="0" smtClean="0">
+                  <a:latin typeface="Arial Narrow" pitchFamily="34" charset="0"/>
+                </a:rPr>
+                <a:t>);</a:t>
+              </a:r>
+              <a:endParaRPr lang="en-US" sz="1200" dirty="0" smtClean="0">
+                <a:latin typeface="Arial Narrow" pitchFamily="34" charset="0"/>
+              </a:endParaRPr>
+            </a:p>
+          </p:txBody>
+        </p:sp>
+        <p:sp>
+          <p:nvSpPr>
+            <p:cNvPr id="26" name="Rounded Rectangle 25"/>
+            <p:cNvSpPr/>
+            <p:nvPr/>
+          </p:nvSpPr>
+          <p:spPr>
+            <a:xfrm>
+              <a:off x="400050" y="3025479"/>
+              <a:ext cx="1123950" cy="183093"/>
+            </a:xfrm>
+            <a:prstGeom prst="roundRect">
+              <a:avLst/>
+            </a:prstGeom>
+            <a:ln w="19050">
+              <a:solidFill>
+                <a:schemeClr val="tx1"/>
+              </a:solidFill>
+            </a:ln>
+          </p:spPr>
+          <p:style>
+            <a:lnRef idx="2">
+              <a:schemeClr val="accent1">
+                <a:shade val="50000"/>
+              </a:schemeClr>
+            </a:lnRef>
+            <a:fillRef idx="1">
+              <a:schemeClr val="accent1"/>
+            </a:fillRef>
+            <a:effectRef idx="0">
+              <a:schemeClr val="accent1"/>
+            </a:effectRef>
+            <a:fontRef idx="minor">
+              <a:schemeClr val="lt1"/>
+            </a:fontRef>
+          </p:style>
+          <p:txBody>
+            <a:bodyPr rtlCol="0" anchor="ctr"/>
+            <a:lstStyle/>
+            <a:p>
+              <a:r>
+                <a:rPr lang="en-US" sz="1000" dirty="0" smtClean="0"/>
+                <a:t>Sample Preamble</a:t>
+              </a:r>
+              <a:endParaRPr lang="en-US" sz="1000" dirty="0"/>
+            </a:p>
+          </p:txBody>
+        </p:sp>
+      </p:grpSp>
+      <p:grpSp>
+        <p:nvGrpSpPr>
+          <p:cNvPr id="33" name="Group 32"/>
+          <p:cNvGrpSpPr/>
           <p:nvPr/>
-        </p:nvSpPr>
-        <p:spPr>
+        </p:nvGrpSpPr>
+        <p:grpSpPr>
           <a:xfrm>
-            <a:off x="387350" y="5060118"/>
-            <a:ext cx="1123950" cy="183093"/>
+            <a:off x="323850" y="1708348"/>
+            <a:ext cx="5448300" cy="1381763"/>
+            <a:chOff x="342900" y="5060118"/>
+            <a:chExt cx="5448300" cy="1381763"/>
           </a:xfrm>
-          <a:prstGeom prst="roundRect">
-            <a:avLst/>
-          </a:prstGeom>
-          <a:ln w="19050">
+        </p:grpSpPr>
+        <p:sp>
+          <p:nvSpPr>
+            <p:cNvPr id="5" name="TextBox 4"/>
+            <p:cNvSpPr txBox="1"/>
+            <p:nvPr/>
+          </p:nvSpPr>
+          <p:spPr>
+            <a:xfrm>
+              <a:off x="342900" y="5118442"/>
+              <a:ext cx="5448300" cy="1323439"/>
+            </a:xfrm>
+            <a:prstGeom prst="rect">
+              <a:avLst/>
+            </a:prstGeom>
             <a:solidFill>
-              <a:schemeClr val="tx1"/>
+              <a:schemeClr val="bg1">
+                <a:lumMod val="95000"/>
+              </a:schemeClr>
             </a:solidFill>
-          </a:ln>
-        </p:spPr>
-        <p:style>
-          <a:lnRef idx="2">
-            <a:schemeClr val="accent1">
-              <a:shade val="50000"/>
-            </a:schemeClr>
-          </a:lnRef>
-          <a:fillRef idx="1">
-            <a:schemeClr val="accent1"/>
-          </a:fillRef>
-          <a:effectRef idx="0">
-            <a:schemeClr val="accent1"/>
-          </a:effectRef>
-          <a:fontRef idx="minor">
-            <a:schemeClr val="lt1"/>
-          </a:fontRef>
-        </p:style>
-        <p:txBody>
-          <a:bodyPr rtlCol="0" anchor="ctr"/>
-          <a:lstStyle/>
-          <a:p>
-            <a:r>
-              <a:rPr lang="en-US" sz="1000" dirty="0" smtClean="0"/>
-              <a:t>Sample Setup</a:t>
-            </a:r>
-            <a:endParaRPr lang="en-US" sz="1000" dirty="0"/>
-          </a:p>
-        </p:txBody>
-      </p:sp>
-      <p:sp>
-        <p:nvSpPr>
-          <p:cNvPr id="28" name="Rounded Rectangle 27"/>
-          <p:cNvSpPr/>
+            <a:ln>
+              <a:solidFill>
+                <a:schemeClr val="tx1"/>
+              </a:solidFill>
+            </a:ln>
+          </p:spPr>
+          <p:txBody>
+            <a:bodyPr wrap="square" rtlCol="0">
+              <a:spAutoFit/>
+            </a:bodyPr>
+            <a:lstStyle/>
+            <a:p>
+              <a:endParaRPr lang="en-US" sz="800" dirty="0" smtClean="0">
+                <a:latin typeface="Arial Narrow" pitchFamily="34" charset="0"/>
+              </a:endParaRPr>
+            </a:p>
+            <a:p>
+              <a:r>
+                <a:rPr lang="en-US" sz="1200" b="1" dirty="0" smtClean="0">
+                  <a:latin typeface="Arial" charset="0"/>
+                  <a:ea typeface="Arial" charset="0"/>
+                  <a:cs typeface="Arial" charset="0"/>
+                </a:rPr>
+                <a:t>void </a:t>
+              </a:r>
+              <a:r>
+                <a:rPr lang="en-US" sz="1200" b="1" dirty="0" smtClean="0">
+                  <a:latin typeface="Arial" charset="0"/>
+                  <a:ea typeface="Arial" charset="0"/>
+                  <a:cs typeface="Arial" charset="0"/>
+                </a:rPr>
+                <a:t>setup() </a:t>
+              </a:r>
+              <a:r>
+                <a:rPr lang="en-US" sz="1200" dirty="0" smtClean="0">
+                  <a:latin typeface="Arial" charset="0"/>
+                  <a:ea typeface="Arial" charset="0"/>
+                  <a:cs typeface="Arial" charset="0"/>
+                </a:rPr>
+                <a:t>{</a:t>
+              </a:r>
+            </a:p>
+            <a:p>
+              <a:r>
+                <a:rPr lang="en-US" sz="1200" dirty="0" smtClean="0">
+                  <a:latin typeface="Arial" charset="0"/>
+                  <a:ea typeface="Arial" charset="0"/>
+                  <a:cs typeface="Arial" charset="0"/>
+                </a:rPr>
+                <a:t>  strip.begin(); </a:t>
+              </a:r>
+              <a:r>
+                <a:rPr lang="en-US" sz="1200" dirty="0" smtClean="0">
+                  <a:solidFill>
+                    <a:srgbClr val="00B050"/>
+                  </a:solidFill>
+                  <a:latin typeface="Arial" charset="0"/>
+                  <a:ea typeface="Arial" charset="0"/>
+                  <a:cs typeface="Arial" charset="0"/>
+                </a:rPr>
+                <a:t>// initialize all the </a:t>
+              </a:r>
+              <a:r>
+                <a:rPr lang="en-US" sz="1200" dirty="0" smtClean="0">
+                  <a:solidFill>
+                    <a:srgbClr val="00B050"/>
+                  </a:solidFill>
+                  <a:latin typeface="Arial" charset="0"/>
+                  <a:ea typeface="Arial" charset="0"/>
+                  <a:cs typeface="Arial" charset="0"/>
+                </a:rPr>
+                <a:t>variables </a:t>
+              </a:r>
+              <a:r>
+                <a:rPr lang="mr-IN" sz="1200" dirty="0" smtClean="0">
+                  <a:solidFill>
+                    <a:srgbClr val="00B050"/>
+                  </a:solidFill>
+                  <a:latin typeface="Arial" charset="0"/>
+                  <a:ea typeface="Arial" charset="0"/>
+                  <a:cs typeface="Arial" charset="0"/>
+                </a:rPr>
+                <a:t>–</a:t>
+              </a:r>
+              <a:r>
+                <a:rPr lang="en-US" sz="1200" dirty="0" smtClean="0">
+                  <a:solidFill>
+                    <a:srgbClr val="00B050"/>
+                  </a:solidFill>
+                  <a:latin typeface="Arial" charset="0"/>
+                  <a:ea typeface="Arial" charset="0"/>
+                  <a:cs typeface="Arial" charset="0"/>
+                </a:rPr>
+                <a:t> don’t forget this line!</a:t>
+              </a:r>
+            </a:p>
+            <a:p>
+              <a:r>
+                <a:rPr lang="en-US" sz="1200" dirty="0" smtClean="0">
+                  <a:latin typeface="Arial" charset="0"/>
+                  <a:ea typeface="Arial" charset="0"/>
+                  <a:cs typeface="Arial" charset="0"/>
+                </a:rPr>
+                <a:t>  </a:t>
+              </a:r>
+              <a:r>
+                <a:rPr lang="en-US" sz="1200" dirty="0" err="1" smtClean="0">
+                  <a:latin typeface="Arial" charset="0"/>
+                  <a:ea typeface="Arial" charset="0"/>
+                  <a:cs typeface="Arial" charset="0"/>
+                </a:rPr>
+                <a:t>strip.setPixelColor</a:t>
+              </a:r>
+              <a:r>
+                <a:rPr lang="en-US" sz="1200" dirty="0" smtClean="0">
+                  <a:latin typeface="Arial" charset="0"/>
+                  <a:ea typeface="Arial" charset="0"/>
+                  <a:cs typeface="Arial" charset="0"/>
+                </a:rPr>
+                <a:t>(0</a:t>
+              </a:r>
+              <a:r>
+                <a:rPr lang="en-US" sz="1200" dirty="0">
+                  <a:latin typeface="Arial" charset="0"/>
+                  <a:ea typeface="Arial" charset="0"/>
+                  <a:cs typeface="Arial" charset="0"/>
+                </a:rPr>
+                <a:t>, 255, </a:t>
+              </a:r>
+              <a:r>
+                <a:rPr lang="en-US" sz="1200" dirty="0" smtClean="0">
+                  <a:latin typeface="Arial" charset="0"/>
+                  <a:ea typeface="Arial" charset="0"/>
+                  <a:cs typeface="Arial" charset="0"/>
+                </a:rPr>
+                <a:t>125, 0); </a:t>
+              </a:r>
+              <a:r>
+                <a:rPr lang="en-US" sz="1200" dirty="0">
+                  <a:solidFill>
+                    <a:srgbClr val="00B050"/>
+                  </a:solidFill>
+                  <a:latin typeface="Arial" charset="0"/>
+                  <a:ea typeface="Arial" charset="0"/>
+                  <a:cs typeface="Arial" charset="0"/>
+                </a:rPr>
+                <a:t>// set pixel 0 to be </a:t>
+              </a:r>
+              <a:r>
+                <a:rPr lang="en-US" sz="1200" dirty="0" smtClean="0">
+                  <a:solidFill>
+                    <a:srgbClr val="00B050"/>
+                  </a:solidFill>
+                  <a:latin typeface="Arial" charset="0"/>
+                  <a:ea typeface="Arial" charset="0"/>
+                  <a:cs typeface="Arial" charset="0"/>
+                </a:rPr>
+                <a:t>yellow</a:t>
+              </a:r>
+              <a:endParaRPr lang="en-US" sz="1200" dirty="0" smtClean="0">
+                <a:solidFill>
+                  <a:srgbClr val="00B050"/>
+                </a:solidFill>
+                <a:latin typeface="Arial" charset="0"/>
+                <a:ea typeface="Arial" charset="0"/>
+                <a:cs typeface="Arial" charset="0"/>
+              </a:endParaRPr>
+            </a:p>
+            <a:p>
+              <a:r>
+                <a:rPr lang="en-US" sz="1200" dirty="0" smtClean="0">
+                  <a:latin typeface="Arial" charset="0"/>
+                  <a:ea typeface="Arial" charset="0"/>
+                  <a:cs typeface="Arial" charset="0"/>
+                </a:rPr>
+                <a:t>  strip.show(); </a:t>
+              </a:r>
+              <a:r>
+                <a:rPr lang="en-US" sz="1200" dirty="0" smtClean="0">
+                  <a:solidFill>
+                    <a:srgbClr val="00B050"/>
+                  </a:solidFill>
+                  <a:latin typeface="Arial" charset="0"/>
+                  <a:ea typeface="Arial" charset="0"/>
+                  <a:cs typeface="Arial" charset="0"/>
+                </a:rPr>
+                <a:t>// </a:t>
+              </a:r>
+              <a:r>
+                <a:rPr lang="en-US" sz="1200" dirty="0">
+                  <a:solidFill>
+                    <a:srgbClr val="00B050"/>
+                  </a:solidFill>
+                  <a:latin typeface="Arial" charset="0"/>
+                  <a:ea typeface="Arial" charset="0"/>
+                  <a:cs typeface="Arial" charset="0"/>
+                </a:rPr>
+                <a:t>s</a:t>
+              </a:r>
+              <a:r>
+                <a:rPr lang="en-US" sz="1200" dirty="0" smtClean="0">
+                  <a:solidFill>
+                    <a:srgbClr val="00B050"/>
+                  </a:solidFill>
+                  <a:latin typeface="Arial" charset="0"/>
+                  <a:ea typeface="Arial" charset="0"/>
+                  <a:cs typeface="Arial" charset="0"/>
+                </a:rPr>
+                <a:t>end the data to the LED strip </a:t>
+              </a:r>
+              <a:r>
+                <a:rPr lang="mr-IN" sz="1200" dirty="0" smtClean="0">
+                  <a:solidFill>
+                    <a:srgbClr val="00B050"/>
+                  </a:solidFill>
+                  <a:latin typeface="Arial" charset="0"/>
+                  <a:ea typeface="Arial" charset="0"/>
+                  <a:cs typeface="Arial" charset="0"/>
+                </a:rPr>
+                <a:t>–</a:t>
+              </a:r>
+              <a:r>
+                <a:rPr lang="en-US" sz="1200" dirty="0" smtClean="0">
+                  <a:solidFill>
+                    <a:srgbClr val="00B050"/>
+                  </a:solidFill>
+                  <a:latin typeface="Arial" charset="0"/>
+                  <a:ea typeface="Arial" charset="0"/>
+                  <a:cs typeface="Arial" charset="0"/>
+                </a:rPr>
+                <a:t> must do this after any change</a:t>
+              </a:r>
+            </a:p>
+            <a:p>
+              <a:r>
+                <a:rPr lang="en-US" sz="1200" dirty="0" smtClean="0">
+                  <a:latin typeface="Arial" charset="0"/>
+                  <a:ea typeface="Arial" charset="0"/>
+                  <a:cs typeface="Arial" charset="0"/>
+                </a:rPr>
+                <a:t>  delay(1000); </a:t>
+              </a:r>
+              <a:r>
+                <a:rPr lang="en-US" sz="1200" dirty="0" smtClean="0">
+                  <a:solidFill>
+                    <a:srgbClr val="00B050"/>
+                  </a:solidFill>
+                  <a:latin typeface="Arial" charset="0"/>
+                  <a:ea typeface="Arial" charset="0"/>
+                  <a:cs typeface="Arial" charset="0"/>
+                </a:rPr>
+                <a:t> // wait 1 second</a:t>
+              </a:r>
+              <a:endParaRPr lang="en-US" sz="1200" dirty="0" smtClean="0">
+                <a:solidFill>
+                  <a:srgbClr val="00B050"/>
+                </a:solidFill>
+                <a:latin typeface="Arial" charset="0"/>
+                <a:ea typeface="Arial" charset="0"/>
+                <a:cs typeface="Arial" charset="0"/>
+              </a:endParaRPr>
+            </a:p>
+            <a:p>
+              <a:r>
+                <a:rPr lang="en-US" sz="1200" dirty="0" smtClean="0">
+                  <a:latin typeface="Arial" charset="0"/>
+                  <a:ea typeface="Arial" charset="0"/>
+                  <a:cs typeface="Arial" charset="0"/>
+                </a:rPr>
+                <a:t>}</a:t>
+              </a:r>
+              <a:endParaRPr lang="en-US" sz="1200" dirty="0" smtClean="0">
+                <a:latin typeface="Arial" charset="0"/>
+                <a:ea typeface="Arial" charset="0"/>
+                <a:cs typeface="Arial" charset="0"/>
+              </a:endParaRPr>
+            </a:p>
+          </p:txBody>
+        </p:sp>
+        <p:sp>
+          <p:nvSpPr>
+            <p:cNvPr id="27" name="Rounded Rectangle 26"/>
+            <p:cNvSpPr/>
+            <p:nvPr/>
+          </p:nvSpPr>
+          <p:spPr>
+            <a:xfrm>
+              <a:off x="387350" y="5060118"/>
+              <a:ext cx="1123950" cy="183093"/>
+            </a:xfrm>
+            <a:prstGeom prst="roundRect">
+              <a:avLst/>
+            </a:prstGeom>
+            <a:ln w="19050">
+              <a:solidFill>
+                <a:schemeClr val="tx1"/>
+              </a:solidFill>
+            </a:ln>
+          </p:spPr>
+          <p:style>
+            <a:lnRef idx="2">
+              <a:schemeClr val="accent1">
+                <a:shade val="50000"/>
+              </a:schemeClr>
+            </a:lnRef>
+            <a:fillRef idx="1">
+              <a:schemeClr val="accent1"/>
+            </a:fillRef>
+            <a:effectRef idx="0">
+              <a:schemeClr val="accent1"/>
+            </a:effectRef>
+            <a:fontRef idx="minor">
+              <a:schemeClr val="lt1"/>
+            </a:fontRef>
+          </p:style>
+          <p:txBody>
+            <a:bodyPr rtlCol="0" anchor="ctr"/>
+            <a:lstStyle/>
+            <a:p>
+              <a:r>
+                <a:rPr lang="en-US" sz="1000" dirty="0" smtClean="0"/>
+                <a:t>Sample Setup</a:t>
+              </a:r>
+              <a:endParaRPr lang="en-US" sz="1000" dirty="0"/>
+            </a:p>
+          </p:txBody>
+        </p:sp>
+      </p:grpSp>
+      <p:grpSp>
+        <p:nvGrpSpPr>
+          <p:cNvPr id="34" name="Group 33"/>
+          <p:cNvGrpSpPr/>
           <p:nvPr/>
-        </p:nvSpPr>
-        <p:spPr>
+        </p:nvGrpSpPr>
+        <p:grpSpPr>
           <a:xfrm>
-            <a:off x="374650" y="6609250"/>
-            <a:ext cx="1536700" cy="183093"/>
+            <a:off x="313962" y="3228553"/>
+            <a:ext cx="5458188" cy="1772169"/>
+            <a:chOff x="323850" y="3387264"/>
+            <a:chExt cx="5458188" cy="1772169"/>
           </a:xfrm>
-          <a:prstGeom prst="roundRect">
-            <a:avLst/>
-          </a:prstGeom>
-          <a:ln w="19050">
+        </p:grpSpPr>
+        <p:sp>
+          <p:nvSpPr>
+            <p:cNvPr id="12" name="TextBox 11"/>
+            <p:cNvSpPr txBox="1"/>
+            <p:nvPr/>
+          </p:nvSpPr>
+          <p:spPr>
+            <a:xfrm>
+              <a:off x="323850" y="3466662"/>
+              <a:ext cx="5458188" cy="1692771"/>
+            </a:xfrm>
+            <a:prstGeom prst="rect">
+              <a:avLst/>
+            </a:prstGeom>
             <a:solidFill>
-              <a:schemeClr val="tx1"/>
+              <a:schemeClr val="bg1">
+                <a:lumMod val="95000"/>
+              </a:schemeClr>
             </a:solidFill>
-          </a:ln>
-        </p:spPr>
-        <p:style>
-          <a:lnRef idx="2">
-            <a:schemeClr val="accent1">
-              <a:shade val="50000"/>
-            </a:schemeClr>
-          </a:lnRef>
-          <a:fillRef idx="1">
-            <a:schemeClr val="accent1"/>
-          </a:fillRef>
-          <a:effectRef idx="0">
-            <a:schemeClr val="accent1"/>
-          </a:effectRef>
-          <a:fontRef idx="minor">
-            <a:schemeClr val="lt1"/>
-          </a:fontRef>
-        </p:style>
-        <p:txBody>
-          <a:bodyPr rtlCol="0" anchor="ctr"/>
-          <a:lstStyle/>
-          <a:p>
-            <a:r>
-              <a:rPr lang="en-US" sz="1000" dirty="0" smtClean="0"/>
-              <a:t>Sample Moving Pixel</a:t>
-            </a:r>
-            <a:endParaRPr lang="en-US" sz="1000" dirty="0"/>
-          </a:p>
-        </p:txBody>
-      </p:sp>
+            <a:ln>
+              <a:solidFill>
+                <a:schemeClr val="tx1"/>
+              </a:solidFill>
+            </a:ln>
+          </p:spPr>
+          <p:txBody>
+            <a:bodyPr wrap="square" rtlCol="0">
+              <a:spAutoFit/>
+            </a:bodyPr>
+            <a:lstStyle/>
+            <a:p>
+              <a:endParaRPr lang="en-US" sz="800" dirty="0" smtClean="0">
+                <a:latin typeface="Arial Narrow" pitchFamily="34" charset="0"/>
+              </a:endParaRPr>
+            </a:p>
+            <a:p>
+              <a:r>
+                <a:rPr lang="en-US" sz="1200" b="1" dirty="0"/>
+                <a:t>void</a:t>
+              </a:r>
+              <a:r>
+                <a:rPr lang="en-US" sz="1200" dirty="0"/>
+                <a:t> </a:t>
+              </a:r>
+              <a:r>
+                <a:rPr lang="en-US" sz="1200" b="1" dirty="0"/>
+                <a:t>loop</a:t>
+              </a:r>
+              <a:r>
+                <a:rPr lang="en-US" sz="1200" dirty="0"/>
+                <a:t>() </a:t>
+              </a:r>
+              <a:r>
+                <a:rPr lang="en-US" sz="1200" dirty="0" smtClean="0"/>
+                <a:t>{</a:t>
+              </a:r>
+            </a:p>
+            <a:p>
+              <a:r>
+                <a:rPr lang="en-US" sz="1200" b="1" dirty="0" smtClean="0"/>
+                <a:t>   for</a:t>
+              </a:r>
+              <a:r>
+                <a:rPr lang="en-US" sz="1200" dirty="0" smtClean="0"/>
+                <a:t> </a:t>
+              </a:r>
+              <a:r>
+                <a:rPr lang="en-US" sz="1200" dirty="0"/>
+                <a:t>(</a:t>
+              </a:r>
+              <a:r>
+                <a:rPr lang="en-US" sz="1200" b="1" dirty="0" err="1"/>
+                <a:t>int</a:t>
+              </a:r>
+              <a:r>
+                <a:rPr lang="en-US" sz="1200" dirty="0"/>
+                <a:t> </a:t>
+              </a:r>
+              <a:r>
+                <a:rPr lang="en-US" sz="1200" dirty="0" err="1"/>
+                <a:t>i</a:t>
+              </a:r>
+              <a:r>
+                <a:rPr lang="en-US" sz="1200" dirty="0"/>
+                <a:t>=0; </a:t>
+              </a:r>
+              <a:r>
+                <a:rPr lang="en-US" sz="1200" dirty="0" err="1" smtClean="0"/>
+                <a:t>i</a:t>
+              </a:r>
+              <a:r>
+                <a:rPr lang="en-US" sz="1200" dirty="0" smtClean="0"/>
+                <a:t>&lt;NUMBER_PIXELS</a:t>
+              </a:r>
+              <a:r>
+                <a:rPr lang="en-US" sz="1200" dirty="0"/>
+                <a:t>; </a:t>
+              </a:r>
+              <a:r>
+                <a:rPr lang="en-US" sz="1200" dirty="0" err="1"/>
+                <a:t>i</a:t>
+              </a:r>
+              <a:r>
+                <a:rPr lang="en-US" sz="1200" dirty="0" smtClean="0"/>
+                <a:t>++) {</a:t>
+              </a:r>
+            </a:p>
+            <a:p>
+              <a:r>
+                <a:rPr lang="en-US" sz="1200" dirty="0"/>
+                <a:t> </a:t>
+              </a:r>
+              <a:r>
+                <a:rPr lang="en-US" sz="1200" dirty="0" smtClean="0"/>
+                <a:t>      </a:t>
+              </a:r>
+              <a:r>
+                <a:rPr lang="en-US" sz="1200" dirty="0" err="1" smtClean="0">
+                  <a:latin typeface="Arial" charset="0"/>
+                  <a:ea typeface="Arial" charset="0"/>
+                  <a:cs typeface="Arial" charset="0"/>
+                </a:rPr>
+                <a:t>strip.setPixelColor</a:t>
+              </a:r>
+              <a:r>
+                <a:rPr lang="en-US" sz="1200" dirty="0" smtClean="0">
+                  <a:latin typeface="Arial" charset="0"/>
+                  <a:ea typeface="Arial" charset="0"/>
+                  <a:cs typeface="Arial" charset="0"/>
+                </a:rPr>
+                <a:t>(</a:t>
+              </a:r>
+              <a:r>
+                <a:rPr lang="en-US" sz="1200" dirty="0" err="1" smtClean="0">
+                  <a:latin typeface="Arial" charset="0"/>
+                  <a:ea typeface="Arial" charset="0"/>
+                  <a:cs typeface="Arial" charset="0"/>
+                </a:rPr>
+                <a:t>i</a:t>
+              </a:r>
+              <a:r>
+                <a:rPr lang="en-US" sz="1200" dirty="0">
+                  <a:latin typeface="Arial" charset="0"/>
+                  <a:ea typeface="Arial" charset="0"/>
+                  <a:cs typeface="Arial" charset="0"/>
+                </a:rPr>
+                <a:t>, 255, 0, 0); </a:t>
+              </a:r>
+              <a:r>
+                <a:rPr lang="en-US" sz="1200" i="1" dirty="0">
+                  <a:solidFill>
+                    <a:srgbClr val="00B050"/>
+                  </a:solidFill>
+                  <a:latin typeface="Arial" charset="0"/>
+                  <a:ea typeface="Arial" charset="0"/>
+                  <a:cs typeface="Arial" charset="0"/>
+                </a:rPr>
+                <a:t>// turn the "</a:t>
+              </a:r>
+              <a:r>
+                <a:rPr lang="en-US" sz="1200" i="1" dirty="0" err="1">
+                  <a:solidFill>
+                    <a:srgbClr val="00B050"/>
+                  </a:solidFill>
+                  <a:latin typeface="Arial" charset="0"/>
+                  <a:ea typeface="Arial" charset="0"/>
+                  <a:cs typeface="Arial" charset="0"/>
+                </a:rPr>
+                <a:t>i"th</a:t>
+              </a:r>
+              <a:r>
+                <a:rPr lang="en-US" sz="1200" i="1" dirty="0">
+                  <a:solidFill>
+                    <a:srgbClr val="00B050"/>
+                  </a:solidFill>
+                  <a:latin typeface="Arial" charset="0"/>
+                  <a:ea typeface="Arial" charset="0"/>
+                  <a:cs typeface="Arial" charset="0"/>
+                </a:rPr>
+                <a:t> pixel </a:t>
+              </a:r>
+              <a:r>
+                <a:rPr lang="en-US" sz="1200" i="1" dirty="0" smtClean="0">
+                  <a:solidFill>
+                    <a:srgbClr val="00B050"/>
+                  </a:solidFill>
+                  <a:latin typeface="Arial" charset="0"/>
+                  <a:ea typeface="Arial" charset="0"/>
+                  <a:cs typeface="Arial" charset="0"/>
+                </a:rPr>
+                <a:t>on</a:t>
+              </a:r>
+              <a:endParaRPr lang="en-US" sz="1200" dirty="0">
+                <a:solidFill>
+                  <a:srgbClr val="00B050"/>
+                </a:solidFill>
+                <a:latin typeface="Arial" charset="0"/>
+                <a:ea typeface="Arial" charset="0"/>
+                <a:cs typeface="Arial" charset="0"/>
+              </a:endParaRPr>
+            </a:p>
+            <a:p>
+              <a:r>
+                <a:rPr lang="en-US" sz="1200" dirty="0">
+                  <a:solidFill>
+                    <a:srgbClr val="00B050"/>
+                  </a:solidFill>
+                  <a:latin typeface="Arial" charset="0"/>
+                  <a:ea typeface="Arial" charset="0"/>
+                  <a:cs typeface="Arial" charset="0"/>
+                </a:rPr>
+                <a:t> </a:t>
+              </a:r>
+              <a:r>
+                <a:rPr lang="en-US" sz="1200" dirty="0" smtClean="0">
+                  <a:solidFill>
+                    <a:srgbClr val="00B050"/>
+                  </a:solidFill>
+                  <a:latin typeface="Arial" charset="0"/>
+                  <a:ea typeface="Arial" charset="0"/>
+                  <a:cs typeface="Arial" charset="0"/>
+                </a:rPr>
+                <a:t>     </a:t>
+              </a:r>
+              <a:r>
+                <a:rPr lang="en-US" sz="1200" dirty="0" err="1" smtClean="0">
+                  <a:latin typeface="Arial" charset="0"/>
+                  <a:ea typeface="Arial" charset="0"/>
+                  <a:cs typeface="Arial" charset="0"/>
+                </a:rPr>
+                <a:t>strip.show</a:t>
+              </a:r>
+              <a:r>
+                <a:rPr lang="en-US" sz="1200" dirty="0" smtClean="0">
+                  <a:latin typeface="Arial" charset="0"/>
+                  <a:ea typeface="Arial" charset="0"/>
+                  <a:cs typeface="Arial" charset="0"/>
+                </a:rPr>
+                <a:t>();  </a:t>
+              </a:r>
+              <a:r>
+                <a:rPr lang="en-US" sz="1200" dirty="0">
+                  <a:solidFill>
+                    <a:srgbClr val="00B050"/>
+                  </a:solidFill>
+                  <a:latin typeface="Arial" charset="0"/>
+                  <a:ea typeface="Arial" charset="0"/>
+                  <a:cs typeface="Arial" charset="0"/>
+                </a:rPr>
+                <a:t>// send the data to the LED strip</a:t>
+              </a:r>
+              <a:endParaRPr lang="en-US" sz="1200" dirty="0" smtClean="0">
+                <a:latin typeface="Arial" charset="0"/>
+                <a:ea typeface="Arial" charset="0"/>
+                <a:cs typeface="Arial" charset="0"/>
+              </a:endParaRPr>
+            </a:p>
+            <a:p>
+              <a:r>
+                <a:rPr lang="en-US" sz="1200" dirty="0" smtClean="0">
+                  <a:latin typeface="Arial" charset="0"/>
+                  <a:ea typeface="Arial" charset="0"/>
+                  <a:cs typeface="Arial" charset="0"/>
+                </a:rPr>
+                <a:t>      delay(100</a:t>
+              </a:r>
+              <a:r>
+                <a:rPr lang="en-US" sz="1200" dirty="0">
+                  <a:latin typeface="Arial" charset="0"/>
+                  <a:ea typeface="Arial" charset="0"/>
+                  <a:cs typeface="Arial" charset="0"/>
+                </a:rPr>
+                <a:t>); </a:t>
+              </a:r>
+              <a:r>
+                <a:rPr lang="en-US" sz="1200" dirty="0" smtClean="0">
+                  <a:latin typeface="Arial" charset="0"/>
+                  <a:ea typeface="Arial" charset="0"/>
+                  <a:cs typeface="Arial" charset="0"/>
+                </a:rPr>
+                <a:t> </a:t>
+              </a:r>
+              <a:r>
+                <a:rPr lang="en-US" sz="1200" dirty="0">
+                  <a:solidFill>
+                    <a:srgbClr val="00B050"/>
+                  </a:solidFill>
+                  <a:latin typeface="Arial" charset="0"/>
+                  <a:ea typeface="Arial" charset="0"/>
+                  <a:cs typeface="Arial" charset="0"/>
+                </a:rPr>
+                <a:t>// </a:t>
+              </a:r>
+              <a:r>
+                <a:rPr lang="en-US" sz="1200" i="1" dirty="0" smtClean="0">
+                  <a:solidFill>
+                    <a:srgbClr val="00B050"/>
+                  </a:solidFill>
+                  <a:latin typeface="Arial" charset="0"/>
+                  <a:ea typeface="Arial" charset="0"/>
+                  <a:cs typeface="Arial" charset="0"/>
+                </a:rPr>
+                <a:t>wait </a:t>
+              </a:r>
+              <a:r>
+                <a:rPr lang="en-US" sz="1200" i="1" dirty="0">
+                  <a:solidFill>
+                    <a:srgbClr val="00B050"/>
+                  </a:solidFill>
+                  <a:latin typeface="Arial" charset="0"/>
+                  <a:ea typeface="Arial" charset="0"/>
+                  <a:cs typeface="Arial" charset="0"/>
+                </a:rPr>
+                <a:t>1/10th of a </a:t>
+              </a:r>
+              <a:r>
+                <a:rPr lang="en-US" sz="1200" i="1" dirty="0" smtClean="0">
+                  <a:solidFill>
+                    <a:srgbClr val="00B050"/>
+                  </a:solidFill>
+                  <a:latin typeface="Arial" charset="0"/>
+                  <a:ea typeface="Arial" charset="0"/>
+                  <a:cs typeface="Arial" charset="0"/>
+                </a:rPr>
+                <a:t>second </a:t>
+              </a:r>
+              <a:r>
+                <a:rPr lang="mr-IN" sz="1200" i="1" dirty="0" smtClean="0">
+                  <a:solidFill>
+                    <a:srgbClr val="00B050"/>
+                  </a:solidFill>
+                  <a:latin typeface="Arial" charset="0"/>
+                  <a:ea typeface="Arial" charset="0"/>
+                  <a:cs typeface="Arial" charset="0"/>
+                </a:rPr>
+                <a:t>–</a:t>
+              </a:r>
+              <a:r>
+                <a:rPr lang="en-US" sz="1200" i="1" dirty="0" smtClean="0">
+                  <a:solidFill>
+                    <a:srgbClr val="00B050"/>
+                  </a:solidFill>
+                  <a:latin typeface="Arial" charset="0"/>
+                  <a:ea typeface="Arial" charset="0"/>
+                  <a:cs typeface="Arial" charset="0"/>
+                </a:rPr>
+                <a:t> a lower number makes it go faster</a:t>
+              </a:r>
+              <a:endParaRPr lang="en-US" sz="1200" dirty="0">
+                <a:solidFill>
+                  <a:srgbClr val="00B050"/>
+                </a:solidFill>
+                <a:latin typeface="Arial" charset="0"/>
+                <a:ea typeface="Arial" charset="0"/>
+                <a:cs typeface="Arial" charset="0"/>
+              </a:endParaRPr>
+            </a:p>
+            <a:p>
+              <a:r>
+                <a:rPr lang="en-US" sz="1200" dirty="0" smtClean="0">
+                  <a:latin typeface="Arial" charset="0"/>
+                  <a:ea typeface="Arial" charset="0"/>
+                  <a:cs typeface="Arial" charset="0"/>
+                </a:rPr>
+                <a:t>      </a:t>
+              </a:r>
+              <a:r>
+                <a:rPr lang="en-US" sz="1200" dirty="0" err="1" smtClean="0">
+                  <a:latin typeface="Arial" charset="0"/>
+                  <a:ea typeface="Arial" charset="0"/>
+                  <a:cs typeface="Arial" charset="0"/>
+                </a:rPr>
+                <a:t>strip.setPixelColor</a:t>
+              </a:r>
+              <a:r>
+                <a:rPr lang="en-US" sz="1200" dirty="0" smtClean="0">
+                  <a:latin typeface="Arial" charset="0"/>
+                  <a:ea typeface="Arial" charset="0"/>
+                  <a:cs typeface="Arial" charset="0"/>
+                </a:rPr>
+                <a:t>(</a:t>
+              </a:r>
+              <a:r>
+                <a:rPr lang="en-US" sz="1200" dirty="0" err="1" smtClean="0">
+                  <a:latin typeface="Arial" charset="0"/>
+                  <a:ea typeface="Arial" charset="0"/>
+                  <a:cs typeface="Arial" charset="0"/>
+                </a:rPr>
+                <a:t>i</a:t>
+              </a:r>
+              <a:r>
+                <a:rPr lang="en-US" sz="1200" dirty="0">
+                  <a:latin typeface="Arial" charset="0"/>
+                  <a:ea typeface="Arial" charset="0"/>
+                  <a:cs typeface="Arial" charset="0"/>
+                </a:rPr>
+                <a:t>, 0, 0, 0); </a:t>
+              </a:r>
+              <a:r>
+                <a:rPr lang="en-US" sz="1200" dirty="0">
+                  <a:solidFill>
+                    <a:srgbClr val="00B050"/>
+                  </a:solidFill>
+                  <a:latin typeface="Arial" charset="0"/>
+                  <a:ea typeface="Arial" charset="0"/>
+                  <a:cs typeface="Arial" charset="0"/>
+                </a:rPr>
+                <a:t>// </a:t>
+              </a:r>
+              <a:r>
+                <a:rPr lang="en-US" sz="1200" i="1" dirty="0" smtClean="0">
+                  <a:solidFill>
+                    <a:srgbClr val="00B050"/>
+                  </a:solidFill>
+                  <a:latin typeface="Arial" charset="0"/>
+                  <a:ea typeface="Arial" charset="0"/>
+                  <a:cs typeface="Arial" charset="0"/>
+                </a:rPr>
+                <a:t>turn </a:t>
+              </a:r>
+              <a:r>
+                <a:rPr lang="en-US" sz="1200" i="1" dirty="0">
+                  <a:solidFill>
+                    <a:srgbClr val="00B050"/>
+                  </a:solidFill>
+                  <a:latin typeface="Arial" charset="0"/>
+                  <a:ea typeface="Arial" charset="0"/>
+                  <a:cs typeface="Arial" charset="0"/>
+                </a:rPr>
+                <a:t>the "</a:t>
+              </a:r>
+              <a:r>
+                <a:rPr lang="en-US" sz="1200" i="1" dirty="0" err="1">
+                  <a:solidFill>
+                    <a:srgbClr val="00B050"/>
+                  </a:solidFill>
+                  <a:latin typeface="Arial" charset="0"/>
+                  <a:ea typeface="Arial" charset="0"/>
+                  <a:cs typeface="Arial" charset="0"/>
+                </a:rPr>
+                <a:t>i"th</a:t>
+              </a:r>
+              <a:r>
+                <a:rPr lang="en-US" sz="1200" i="1" dirty="0">
+                  <a:solidFill>
+                    <a:srgbClr val="00B050"/>
+                  </a:solidFill>
+                  <a:latin typeface="Arial" charset="0"/>
+                  <a:ea typeface="Arial" charset="0"/>
+                  <a:cs typeface="Arial" charset="0"/>
+                </a:rPr>
+                <a:t> pixel </a:t>
+              </a:r>
+              <a:r>
+                <a:rPr lang="en-US" sz="1200" i="1" dirty="0" smtClean="0">
+                  <a:solidFill>
+                    <a:srgbClr val="00B050"/>
+                  </a:solidFill>
+                  <a:latin typeface="Arial" charset="0"/>
+                  <a:ea typeface="Arial" charset="0"/>
+                  <a:cs typeface="Arial" charset="0"/>
+                </a:rPr>
+                <a:t>off</a:t>
+              </a:r>
+              <a:endParaRPr lang="en-US" sz="1200" dirty="0">
+                <a:solidFill>
+                  <a:srgbClr val="00B050"/>
+                </a:solidFill>
+                <a:latin typeface="Arial" charset="0"/>
+                <a:ea typeface="Arial" charset="0"/>
+                <a:cs typeface="Arial" charset="0"/>
+              </a:endParaRPr>
+            </a:p>
+            <a:p>
+              <a:r>
+                <a:rPr lang="en-US" sz="1200" dirty="0" smtClean="0">
+                  <a:latin typeface="Arial" charset="0"/>
+                  <a:ea typeface="Arial" charset="0"/>
+                  <a:cs typeface="Arial" charset="0"/>
+                </a:rPr>
+                <a:t>   }</a:t>
+              </a:r>
+            </a:p>
+            <a:p>
+              <a:r>
+                <a:rPr lang="en-US" sz="1200" dirty="0" smtClean="0"/>
+                <a:t>}</a:t>
+              </a:r>
+              <a:endParaRPr lang="en-US" sz="1200" dirty="0">
+                <a:latin typeface="Arial Narrow" pitchFamily="34" charset="0"/>
+              </a:endParaRPr>
+            </a:p>
+          </p:txBody>
+        </p:sp>
+        <p:sp>
+          <p:nvSpPr>
+            <p:cNvPr id="28" name="Rounded Rectangle 27"/>
+            <p:cNvSpPr/>
+            <p:nvPr/>
+          </p:nvSpPr>
+          <p:spPr>
+            <a:xfrm>
+              <a:off x="384538" y="3387264"/>
+              <a:ext cx="1536700" cy="183093"/>
+            </a:xfrm>
+            <a:prstGeom prst="roundRect">
+              <a:avLst/>
+            </a:prstGeom>
+            <a:ln w="19050">
+              <a:solidFill>
+                <a:schemeClr val="tx1"/>
+              </a:solidFill>
+            </a:ln>
+          </p:spPr>
+          <p:style>
+            <a:lnRef idx="2">
+              <a:schemeClr val="accent1">
+                <a:shade val="50000"/>
+              </a:schemeClr>
+            </a:lnRef>
+            <a:fillRef idx="1">
+              <a:schemeClr val="accent1"/>
+            </a:fillRef>
+            <a:effectRef idx="0">
+              <a:schemeClr val="accent1"/>
+            </a:effectRef>
+            <a:fontRef idx="minor">
+              <a:schemeClr val="lt1"/>
+            </a:fontRef>
+          </p:style>
+          <p:txBody>
+            <a:bodyPr rtlCol="0" anchor="ctr"/>
+            <a:lstStyle/>
+            <a:p>
+              <a:r>
+                <a:rPr lang="en-US" sz="1000" dirty="0" smtClean="0"/>
+                <a:t>Sample Moving Pixel</a:t>
+              </a:r>
+              <a:endParaRPr lang="en-US" sz="1000" dirty="0"/>
+            </a:p>
+          </p:txBody>
+        </p:sp>
+      </p:grpSp>
+      <p:grpSp>
+        <p:nvGrpSpPr>
+          <p:cNvPr id="35" name="Group 34"/>
+          <p:cNvGrpSpPr/>
+          <p:nvPr/>
+        </p:nvGrpSpPr>
+        <p:grpSpPr>
+          <a:xfrm>
+            <a:off x="313962" y="5105520"/>
+            <a:ext cx="6019800" cy="3586923"/>
+            <a:chOff x="640987" y="7881107"/>
+            <a:chExt cx="6019800" cy="3586923"/>
+          </a:xfrm>
+        </p:grpSpPr>
+        <p:sp>
+          <p:nvSpPr>
+            <p:cNvPr id="30" name="TextBox 29"/>
+            <p:cNvSpPr txBox="1"/>
+            <p:nvPr/>
+          </p:nvSpPr>
+          <p:spPr>
+            <a:xfrm>
+              <a:off x="640987" y="7959377"/>
+              <a:ext cx="6019800" cy="3508653"/>
+            </a:xfrm>
+            <a:prstGeom prst="rect">
+              <a:avLst/>
+            </a:prstGeom>
+            <a:noFill/>
+            <a:ln>
+              <a:solidFill>
+                <a:schemeClr val="tx2"/>
+              </a:solidFill>
+            </a:ln>
+          </p:spPr>
+          <p:txBody>
+            <a:bodyPr wrap="square" tIns="137160" rtlCol="0">
+              <a:spAutoFit/>
+            </a:bodyPr>
+            <a:lstStyle/>
+            <a:p>
+              <a:pPr marL="342900" indent="-342900">
+                <a:buFont typeface="+mj-lt"/>
+                <a:buAutoNum type="arabicPeriod"/>
+              </a:pPr>
+              <a:r>
+                <a:rPr lang="en-US" sz="1200" dirty="0" smtClean="0"/>
+                <a:t>Learn how to solder solid wires to ends of battery pack</a:t>
+              </a:r>
+            </a:p>
+            <a:p>
+              <a:pPr marL="342900" indent="-342900">
+                <a:buFont typeface="+mj-lt"/>
+                <a:buAutoNum type="arabicPeriod"/>
+              </a:pPr>
+              <a:r>
+                <a:rPr lang="en-US" sz="1200" dirty="0" smtClean="0"/>
+                <a:t>Hook up battery to breadboard rails</a:t>
+              </a:r>
+            </a:p>
+            <a:p>
+              <a:pPr marL="342900" indent="-342900">
+                <a:buFont typeface="+mj-lt"/>
+                <a:buAutoNum type="arabicPeriod"/>
+              </a:pPr>
+              <a:r>
+                <a:rPr lang="en-US" sz="1200" dirty="0" smtClean="0"/>
+                <a:t>Hook up LED circuit </a:t>
+              </a:r>
+              <a:r>
+                <a:rPr lang="en-US" sz="1200" dirty="0" smtClean="0"/>
+                <a:t>in series with </a:t>
+              </a:r>
+              <a:r>
+                <a:rPr lang="en-US" sz="1200" dirty="0" smtClean="0"/>
+                <a:t>330 ohm </a:t>
+              </a:r>
+              <a:r>
+                <a:rPr lang="en-US" sz="1200" dirty="0" smtClean="0"/>
+                <a:t>resistor</a:t>
+              </a:r>
+            </a:p>
+            <a:p>
+              <a:pPr marL="342900" indent="-342900">
+                <a:buFont typeface="+mj-lt"/>
+                <a:buAutoNum type="arabicPeriod"/>
+              </a:pPr>
+              <a:r>
+                <a:rPr lang="en-US" sz="1200" dirty="0" smtClean="0"/>
+                <a:t>Add a button to turn on and off the LED</a:t>
+              </a:r>
+              <a:endParaRPr lang="en-US" sz="1200" dirty="0" smtClean="0"/>
+            </a:p>
+            <a:p>
+              <a:pPr marL="342900" indent="-342900">
+                <a:buFont typeface="+mj-lt"/>
+                <a:buAutoNum type="arabicPeriod"/>
+              </a:pPr>
+              <a:r>
+                <a:rPr lang="en-US" sz="1200" dirty="0" smtClean="0"/>
+                <a:t>Plug </a:t>
+              </a:r>
+              <a:r>
+                <a:rPr lang="en-US" sz="1200" dirty="0" smtClean="0"/>
+                <a:t>in Arduino Nano to breadboard</a:t>
+              </a:r>
+            </a:p>
+            <a:p>
+              <a:pPr marL="342900" indent="-342900">
+                <a:buFont typeface="+mj-lt"/>
+                <a:buAutoNum type="arabicPeriod"/>
+              </a:pPr>
+              <a:r>
+                <a:rPr lang="en-US" sz="1200" dirty="0" smtClean="0"/>
+                <a:t>Connect 5v and GND wires and verify </a:t>
+              </a:r>
+              <a:r>
+                <a:rPr lang="en-US" sz="1200" dirty="0" smtClean="0"/>
+                <a:t>the LEDs on Arduino work</a:t>
+              </a:r>
+              <a:endParaRPr lang="en-US" sz="1200" dirty="0" smtClean="0"/>
+            </a:p>
+            <a:p>
+              <a:pPr marL="342900" indent="-342900">
+                <a:buFont typeface="+mj-lt"/>
+                <a:buAutoNum type="arabicPeriod"/>
+              </a:pPr>
+              <a:r>
+                <a:rPr lang="en-US" sz="1200" dirty="0" smtClean="0"/>
+                <a:t>Download Arduino IDE software and plug in USB cable</a:t>
+              </a:r>
+            </a:p>
+            <a:p>
+              <a:pPr marL="342900" indent="-342900">
+                <a:buFont typeface="+mj-lt"/>
+                <a:buAutoNum type="arabicPeriod"/>
+              </a:pPr>
+              <a:r>
+                <a:rPr lang="en-US" sz="1200" dirty="0" smtClean="0"/>
+                <a:t>Get "blink" lab to work (configure board and port) and use upload </a:t>
+              </a:r>
+              <a:r>
+                <a:rPr lang="en-US" sz="1200" dirty="0" smtClean="0"/>
+                <a:t>button</a:t>
+              </a:r>
+            </a:p>
+            <a:p>
+              <a:pPr marL="342900" indent="-342900">
+                <a:buFont typeface="+mj-lt"/>
+                <a:buAutoNum type="arabicPeriod"/>
+              </a:pPr>
+              <a:r>
+                <a:rPr lang="en-US" sz="1200" dirty="0" smtClean="0"/>
+                <a:t>Change the “delay” time in the blink lab from 10 to 1000 milliseconds</a:t>
+              </a:r>
+              <a:endParaRPr lang="en-US" sz="1200" dirty="0" smtClean="0"/>
+            </a:p>
+            <a:p>
+              <a:pPr marL="342900" indent="-342900">
+                <a:buFont typeface="+mj-lt"/>
+                <a:buAutoNum type="arabicPeriod"/>
+              </a:pPr>
+              <a:r>
+                <a:rPr lang="en-US" sz="1200" dirty="0" smtClean="0"/>
+                <a:t>Download NeoPixel </a:t>
+              </a:r>
+              <a:r>
+                <a:rPr lang="en-US" sz="1200" dirty="0" smtClean="0"/>
+                <a:t>libraries</a:t>
+              </a:r>
+              <a:endParaRPr lang="en-US" sz="1200" dirty="0" smtClean="0"/>
+            </a:p>
+            <a:p>
+              <a:pPr marL="342900" indent="-342900">
+                <a:buFont typeface="+mj-lt"/>
+                <a:buAutoNum type="arabicPeriod"/>
+              </a:pPr>
+              <a:r>
+                <a:rPr lang="en-US" sz="1200" dirty="0" smtClean="0"/>
+                <a:t>Connect </a:t>
+              </a:r>
+              <a:r>
+                <a:rPr lang="en-US" sz="1200" dirty="0" smtClean="0"/>
+                <a:t>NeoPixel strip to pin 12</a:t>
+              </a:r>
+            </a:p>
+            <a:p>
+              <a:pPr marL="342900" indent="-342900">
+                <a:buFont typeface="+mj-lt"/>
+                <a:buAutoNum type="arabicPeriod"/>
+              </a:pPr>
+              <a:r>
+                <a:rPr lang="en-US" sz="1200" dirty="0" smtClean="0"/>
+                <a:t>Run NeoPixel example </a:t>
+              </a:r>
+              <a:r>
+                <a:rPr lang="en-US" sz="1200" dirty="0" smtClean="0"/>
+                <a:t>programs (</a:t>
+              </a:r>
+              <a:r>
+                <a:rPr lang="en-US" sz="1200" dirty="0" err="1" smtClean="0"/>
+                <a:t>strandtest</a:t>
+              </a:r>
+              <a:r>
+                <a:rPr lang="en-US" sz="1200" dirty="0" smtClean="0"/>
+                <a:t>)</a:t>
+              </a:r>
+              <a:endParaRPr lang="en-US" sz="1200" dirty="0" smtClean="0"/>
+            </a:p>
+            <a:p>
+              <a:pPr marL="342900" indent="-342900">
+                <a:buFont typeface="+mj-lt"/>
+                <a:buAutoNum type="arabicPeriod"/>
+              </a:pPr>
+              <a:r>
+                <a:rPr lang="en-US" sz="1200" dirty="0" smtClean="0"/>
+                <a:t>Find Moving Rainbow examples</a:t>
+              </a:r>
+            </a:p>
+            <a:p>
+              <a:pPr marL="342900" indent="-342900">
+                <a:buFont typeface="+mj-lt"/>
+                <a:buAutoNum type="arabicPeriod"/>
+              </a:pPr>
+              <a:r>
+                <a:rPr lang="en-US" sz="1200" dirty="0" smtClean="0"/>
+                <a:t>Work though various examples</a:t>
+              </a:r>
+            </a:p>
+            <a:p>
+              <a:pPr marL="342900" indent="-342900">
+                <a:buFont typeface="+mj-lt"/>
+                <a:buAutoNum type="arabicPeriod"/>
+              </a:pPr>
+              <a:r>
+                <a:rPr lang="en-US" sz="1200" dirty="0" smtClean="0"/>
+                <a:t>On moving rainbow github/</a:t>
+              </a:r>
+              <a:r>
+                <a:rPr lang="en-US" sz="1200" dirty="0" err="1" smtClean="0"/>
+                <a:t>src</a:t>
+              </a:r>
+              <a:r>
+                <a:rPr lang="en-US" sz="1200" dirty="0" smtClean="0"/>
+                <a:t> find mini-maker-fair LED strip two buttons program</a:t>
+              </a:r>
+            </a:p>
+            <a:p>
+              <a:pPr marL="342900" indent="-342900">
+                <a:buFont typeface="+mj-lt"/>
+                <a:buAutoNum type="arabicPeriod"/>
+              </a:pPr>
+              <a:r>
+                <a:rPr lang="en-US" sz="1200" dirty="0" smtClean="0"/>
+                <a:t>Wire button from D2 (interrupt) to ground</a:t>
+              </a:r>
+            </a:p>
+            <a:p>
+              <a:pPr marL="342900" indent="-342900">
+                <a:buFont typeface="+mj-lt"/>
+                <a:buAutoNum type="arabicPeriod"/>
+              </a:pPr>
+              <a:r>
+                <a:rPr lang="en-US" sz="1200" dirty="0" smtClean="0"/>
+                <a:t>Try all the modes</a:t>
+              </a:r>
+            </a:p>
+            <a:p>
+              <a:pPr marL="342900" indent="-342900">
+                <a:buFont typeface="+mj-lt"/>
+                <a:buAutoNum type="arabicPeriod"/>
+              </a:pPr>
+              <a:r>
+                <a:rPr lang="en-US" sz="1200" dirty="0" smtClean="0"/>
+                <a:t>Create your own </a:t>
+              </a:r>
+              <a:r>
+                <a:rPr lang="en-US" sz="1200" dirty="0" smtClean="0"/>
+                <a:t>mode pattern</a:t>
+              </a:r>
+              <a:endParaRPr lang="en-US" sz="1200" dirty="0" smtClean="0"/>
+            </a:p>
+          </p:txBody>
+        </p:sp>
+        <p:sp>
+          <p:nvSpPr>
+            <p:cNvPr id="31" name="Rounded Rectangle 30"/>
+            <p:cNvSpPr/>
+            <p:nvPr/>
+          </p:nvSpPr>
+          <p:spPr>
+            <a:xfrm>
+              <a:off x="727438" y="7881107"/>
+              <a:ext cx="914400" cy="154777"/>
+            </a:xfrm>
+            <a:prstGeom prst="roundRect">
+              <a:avLst/>
+            </a:prstGeom>
+            <a:ln w="19050">
+              <a:solidFill>
+                <a:schemeClr val="tx1"/>
+              </a:solidFill>
+            </a:ln>
+          </p:spPr>
+          <p:style>
+            <a:lnRef idx="2">
+              <a:schemeClr val="accent1">
+                <a:shade val="50000"/>
+              </a:schemeClr>
+            </a:lnRef>
+            <a:fillRef idx="1">
+              <a:schemeClr val="accent1"/>
+            </a:fillRef>
+            <a:effectRef idx="0">
+              <a:schemeClr val="accent1"/>
+            </a:effectRef>
+            <a:fontRef idx="minor">
+              <a:schemeClr val="lt1"/>
+            </a:fontRef>
+          </p:style>
+          <p:txBody>
+            <a:bodyPr rtlCol="0" anchor="ctr"/>
+            <a:lstStyle/>
+            <a:p>
+              <a:pPr algn="ctr"/>
+              <a:r>
+                <a:rPr lang="en-US" sz="1000" dirty="0" smtClean="0"/>
+                <a:t>Sample Labs</a:t>
+              </a:r>
+              <a:endParaRPr lang="en-US" sz="1000" dirty="0"/>
+            </a:p>
+          </p:txBody>
+        </p:sp>
+      </p:grpSp>
     </p:spTree>
     <p:extLst>
       <p:ext uri="{BB962C8B-B14F-4D97-AF65-F5344CB8AC3E}">

</xml_diff>

<commit_message>
Added sample and guides
</commit_message>
<xml_diff>
--- a/guide/2017-HackDay.pptx
+++ b/guide/2017-HackDay.pptx
@@ -3892,8 +3892,17 @@
               </a:pPr>
               <a:r>
                 <a:rPr lang="en-US" sz="1200" dirty="0" smtClean="0"/>
-                <a:t>3 AAA battery pack with switch</a:t>
-              </a:r>
+                <a:t>AAA </a:t>
+              </a:r>
+              <a:r>
+                <a:rPr lang="en-US" sz="1200" dirty="0" smtClean="0"/>
+                <a:t>battery </a:t>
+              </a:r>
+              <a:r>
+                <a:rPr lang="en-US" sz="1200" dirty="0" smtClean="0"/>
+                <a:t>pack</a:t>
+              </a:r>
+              <a:endParaRPr lang="en-US" sz="1200" dirty="0" smtClean="0"/>
             </a:p>
             <a:p>
               <a:pPr marL="228600" indent="-228600">
@@ -4088,317 +4097,302 @@
           </a:p>
         </p:txBody>
       </p:sp>
-      <p:grpSp>
-        <p:nvGrpSpPr>
-          <p:cNvPr id="39" name="Group 38"/>
-          <p:cNvGrpSpPr/>
+      <p:sp>
+        <p:nvSpPr>
+          <p:cNvPr id="19" name="TextBox 18"/>
+          <p:cNvSpPr txBox="1"/>
           <p:nvPr/>
-        </p:nvGrpSpPr>
-        <p:grpSpPr>
+        </p:nvSpPr>
+        <p:spPr>
           <a:xfrm>
-            <a:off x="447675" y="3242501"/>
-            <a:ext cx="5619750" cy="1595159"/>
-            <a:chOff x="392113" y="3415128"/>
-            <a:chExt cx="5619750" cy="1595159"/>
+            <a:off x="447675" y="3299375"/>
+            <a:ext cx="5572126" cy="1538285"/>
           </a:xfrm>
-        </p:grpSpPr>
-        <p:sp>
-          <p:nvSpPr>
-            <p:cNvPr id="19" name="TextBox 18"/>
-            <p:cNvSpPr txBox="1"/>
-            <p:nvPr/>
-          </p:nvSpPr>
-          <p:spPr>
-            <a:xfrm>
-              <a:off x="392113" y="3472002"/>
-              <a:ext cx="5619750" cy="1538285"/>
-            </a:xfrm>
-            <a:prstGeom prst="rect">
-              <a:avLst/>
-            </a:prstGeom>
+          <a:prstGeom prst="rect">
+            <a:avLst/>
+          </a:prstGeom>
+          <a:solidFill>
+            <a:schemeClr val="bg1">
+              <a:lumMod val="95000"/>
+            </a:schemeClr>
+          </a:solidFill>
+          <a:ln>
             <a:solidFill>
-              <a:schemeClr val="bg1">
-                <a:lumMod val="95000"/>
-              </a:schemeClr>
+              <a:schemeClr val="tx1"/>
             </a:solidFill>
-            <a:ln>
-              <a:solidFill>
-                <a:schemeClr val="tx1"/>
-              </a:solidFill>
-            </a:ln>
-          </p:spPr>
-          <p:txBody>
-            <a:bodyPr wrap="square" rtlCol="0">
-              <a:spAutoFit/>
-            </a:bodyPr>
-            <a:lstStyle/>
-            <a:p>
-              <a:endParaRPr lang="en-US" sz="1200" dirty="0" smtClean="0">
-                <a:latin typeface="Arial Narrow" pitchFamily="34" charset="0"/>
-              </a:endParaRPr>
-            </a:p>
-          </p:txBody>
-        </p:sp>
-        <p:pic>
-          <p:nvPicPr>
-            <p:cNvPr id="21" name="Picture 20"/>
-            <p:cNvPicPr>
-              <a:picLocks noChangeAspect="1"/>
-            </p:cNvPicPr>
-            <p:nvPr/>
-          </p:nvPicPr>
-          <p:blipFill>
-            <a:blip r:embed="rId4"/>
-            <a:stretch>
-              <a:fillRect/>
-            </a:stretch>
-          </p:blipFill>
-          <p:spPr>
-            <a:xfrm>
-              <a:off x="428625" y="3655931"/>
-              <a:ext cx="1987550" cy="724071"/>
-            </a:xfrm>
-            <a:prstGeom prst="rect">
-              <a:avLst/>
-            </a:prstGeom>
-          </p:spPr>
-        </p:pic>
-        <p:pic>
-          <p:nvPicPr>
-            <p:cNvPr id="22" name="Picture 21"/>
-            <p:cNvPicPr>
-              <a:picLocks noChangeAspect="1"/>
-            </p:cNvPicPr>
-            <p:nvPr/>
-          </p:nvPicPr>
-          <p:blipFill>
-            <a:blip r:embed="rId5"/>
-            <a:stretch>
-              <a:fillRect/>
-            </a:stretch>
-          </p:blipFill>
-          <p:spPr>
-            <a:xfrm>
-              <a:off x="2452687" y="3778969"/>
-              <a:ext cx="3232150" cy="387350"/>
-            </a:xfrm>
-            <a:prstGeom prst="rect">
-              <a:avLst/>
-            </a:prstGeom>
-          </p:spPr>
-        </p:pic>
-        <p:sp>
-          <p:nvSpPr>
-            <p:cNvPr id="23" name="Oval 22"/>
-            <p:cNvSpPr/>
-            <p:nvPr/>
-          </p:nvSpPr>
-          <p:spPr>
-            <a:xfrm>
-              <a:off x="5119687" y="3972644"/>
-              <a:ext cx="685800" cy="144992"/>
-            </a:xfrm>
-            <a:prstGeom prst="ellipse">
-              <a:avLst/>
-            </a:prstGeom>
-            <a:noFill/>
-            <a:ln>
-              <a:solidFill>
-                <a:srgbClr val="FF0000"/>
-              </a:solidFill>
-            </a:ln>
-          </p:spPr>
-          <p:style>
-            <a:lnRef idx="2">
-              <a:schemeClr val="accent1">
-                <a:shade val="50000"/>
-              </a:schemeClr>
-            </a:lnRef>
-            <a:fillRef idx="1">
-              <a:schemeClr val="accent1"/>
-            </a:fillRef>
-            <a:effectRef idx="0">
-              <a:schemeClr val="accent1"/>
-            </a:effectRef>
-            <a:fontRef idx="minor">
-              <a:schemeClr val="lt1"/>
-            </a:fontRef>
-          </p:style>
-          <p:txBody>
-            <a:bodyPr rtlCol="0" anchor="ctr"/>
-            <a:lstStyle/>
-            <a:p>
-              <a:pPr algn="ctr"/>
-              <a:endParaRPr lang="en-US"/>
-            </a:p>
-          </p:txBody>
-        </p:sp>
-        <p:pic>
-          <p:nvPicPr>
-            <p:cNvPr id="24" name="Picture 23"/>
-            <p:cNvPicPr>
-              <a:picLocks noChangeAspect="1"/>
-            </p:cNvPicPr>
-            <p:nvPr/>
-          </p:nvPicPr>
-          <p:blipFill>
-            <a:blip r:embed="rId6"/>
-            <a:stretch>
-              <a:fillRect/>
-            </a:stretch>
-          </p:blipFill>
-          <p:spPr>
-            <a:xfrm>
-              <a:off x="433387" y="4397776"/>
-              <a:ext cx="5372100" cy="549615"/>
-            </a:xfrm>
-            <a:prstGeom prst="rect">
-              <a:avLst/>
-            </a:prstGeom>
-          </p:spPr>
-        </p:pic>
-        <p:sp>
-          <p:nvSpPr>
-            <p:cNvPr id="25" name="Oval 24"/>
-            <p:cNvSpPr/>
-            <p:nvPr/>
-          </p:nvSpPr>
-          <p:spPr>
-            <a:xfrm>
-              <a:off x="1612901" y="3775590"/>
-              <a:ext cx="838200" cy="143404"/>
-            </a:xfrm>
-            <a:prstGeom prst="ellipse">
-              <a:avLst/>
-            </a:prstGeom>
-            <a:noFill/>
-            <a:ln>
-              <a:solidFill>
-                <a:srgbClr val="FF0000"/>
-              </a:solidFill>
-            </a:ln>
-          </p:spPr>
-          <p:style>
-            <a:lnRef idx="2">
-              <a:schemeClr val="accent1">
-                <a:shade val="50000"/>
-              </a:schemeClr>
-            </a:lnRef>
-            <a:fillRef idx="1">
-              <a:schemeClr val="accent1"/>
-            </a:fillRef>
-            <a:effectRef idx="0">
-              <a:schemeClr val="accent1"/>
-            </a:effectRef>
-            <a:fontRef idx="minor">
-              <a:schemeClr val="lt1"/>
-            </a:fontRef>
-          </p:style>
-          <p:txBody>
-            <a:bodyPr rtlCol="0" anchor="ctr"/>
-            <a:lstStyle/>
-            <a:p>
-              <a:pPr algn="ctr"/>
-              <a:endParaRPr lang="en-US"/>
-            </a:p>
-          </p:txBody>
-        </p:sp>
-        <p:sp>
-          <p:nvSpPr>
-            <p:cNvPr id="27" name="Rounded Rectangle 26"/>
-            <p:cNvSpPr/>
-            <p:nvPr/>
-          </p:nvSpPr>
-          <p:spPr>
-            <a:xfrm>
-              <a:off x="447675" y="3415128"/>
-              <a:ext cx="1987550" cy="183093"/>
-            </a:xfrm>
-            <a:prstGeom prst="roundRect">
-              <a:avLst/>
-            </a:prstGeom>
-            <a:ln w="19050">
-              <a:solidFill>
-                <a:schemeClr val="tx1"/>
-              </a:solidFill>
-            </a:ln>
-          </p:spPr>
-          <p:style>
-            <a:lnRef idx="2">
-              <a:schemeClr val="accent1">
-                <a:shade val="50000"/>
-              </a:schemeClr>
-            </a:lnRef>
-            <a:fillRef idx="1">
-              <a:schemeClr val="accent1"/>
-            </a:fillRef>
-            <a:effectRef idx="0">
-              <a:schemeClr val="accent1"/>
-            </a:effectRef>
-            <a:fontRef idx="minor">
-              <a:schemeClr val="lt1"/>
-            </a:fontRef>
-          </p:style>
-          <p:txBody>
-            <a:bodyPr rtlCol="0" anchor="ctr"/>
-            <a:lstStyle/>
-            <a:p>
-              <a:pPr algn="ctr"/>
-              <a:r>
-                <a:rPr lang="en-US" sz="1000" dirty="0" smtClean="0"/>
-                <a:t>Step 2: Install the NeoPixel Library</a:t>
-              </a:r>
-              <a:endParaRPr lang="en-US" sz="1000" dirty="0"/>
-            </a:p>
-          </p:txBody>
-        </p:sp>
-        <p:sp>
-          <p:nvSpPr>
-            <p:cNvPr id="28" name="Oval 27"/>
-            <p:cNvSpPr/>
-            <p:nvPr/>
-          </p:nvSpPr>
-          <p:spPr>
-            <a:xfrm>
-              <a:off x="1462087" y="4734637"/>
-              <a:ext cx="685800" cy="177527"/>
-            </a:xfrm>
-            <a:prstGeom prst="ellipse">
-              <a:avLst/>
-            </a:prstGeom>
-            <a:noFill/>
-            <a:ln w="19050">
-              <a:solidFill>
-                <a:srgbClr val="FF0000"/>
-              </a:solidFill>
-            </a:ln>
-          </p:spPr>
-          <p:style>
-            <a:lnRef idx="2">
-              <a:schemeClr val="accent1">
-                <a:shade val="50000"/>
-              </a:schemeClr>
-            </a:lnRef>
-            <a:fillRef idx="1">
-              <a:schemeClr val="accent1"/>
-            </a:fillRef>
-            <a:effectRef idx="0">
-              <a:schemeClr val="accent1"/>
-            </a:effectRef>
-            <a:fontRef idx="minor">
-              <a:schemeClr val="lt1"/>
-            </a:fontRef>
-          </p:style>
-          <p:txBody>
-            <a:bodyPr rtlCol="0" anchor="ctr"/>
-            <a:lstStyle/>
-            <a:p>
-              <a:pPr algn="ctr"/>
-              <a:endParaRPr lang="en-US"/>
-            </a:p>
-          </p:txBody>
-        </p:sp>
-      </p:grpSp>
+          </a:ln>
+        </p:spPr>
+        <p:txBody>
+          <a:bodyPr wrap="square" rtlCol="0">
+            <a:spAutoFit/>
+          </a:bodyPr>
+          <a:lstStyle/>
+          <a:p>
+            <a:endParaRPr lang="en-US" sz="1200" dirty="0" smtClean="0">
+              <a:latin typeface="Arial Narrow" pitchFamily="34" charset="0"/>
+            </a:endParaRPr>
+          </a:p>
+        </p:txBody>
+      </p:sp>
+      <p:pic>
+        <p:nvPicPr>
+          <p:cNvPr id="21" name="Picture 20"/>
+          <p:cNvPicPr>
+            <a:picLocks noChangeAspect="1"/>
+          </p:cNvPicPr>
+          <p:nvPr/>
+        </p:nvPicPr>
+        <p:blipFill>
+          <a:blip r:embed="rId4"/>
+          <a:stretch>
+            <a:fillRect/>
+          </a:stretch>
+        </p:blipFill>
+        <p:spPr>
+          <a:xfrm>
+            <a:off x="484867" y="3483304"/>
+            <a:ext cx="2024606" cy="724071"/>
+          </a:xfrm>
+          <a:prstGeom prst="rect">
+            <a:avLst/>
+          </a:prstGeom>
+        </p:spPr>
+      </p:pic>
+      <p:pic>
+        <p:nvPicPr>
+          <p:cNvPr id="22" name="Picture 21"/>
+          <p:cNvPicPr>
+            <a:picLocks noChangeAspect="1"/>
+          </p:cNvPicPr>
+          <p:nvPr/>
+        </p:nvPicPr>
+        <p:blipFill>
+          <a:blip r:embed="rId5"/>
+          <a:stretch>
+            <a:fillRect/>
+          </a:stretch>
+        </p:blipFill>
+        <p:spPr>
+          <a:xfrm>
+            <a:off x="2546665" y="3606342"/>
+            <a:ext cx="3292410" cy="387350"/>
+          </a:xfrm>
+          <a:prstGeom prst="rect">
+            <a:avLst/>
+          </a:prstGeom>
+        </p:spPr>
+      </p:pic>
+      <p:sp>
+        <p:nvSpPr>
+          <p:cNvPr id="23" name="Oval 22"/>
+          <p:cNvSpPr/>
+          <p:nvPr/>
+        </p:nvSpPr>
+        <p:spPr>
+          <a:xfrm>
+            <a:off x="5263389" y="3800017"/>
+            <a:ext cx="698586" cy="144992"/>
+          </a:xfrm>
+          <a:prstGeom prst="ellipse">
+            <a:avLst/>
+          </a:prstGeom>
+          <a:noFill/>
+          <a:ln>
+            <a:solidFill>
+              <a:srgbClr val="FF0000"/>
+            </a:solidFill>
+          </a:ln>
+        </p:spPr>
+        <p:style>
+          <a:lnRef idx="2">
+            <a:schemeClr val="accent1">
+              <a:shade val="50000"/>
+            </a:schemeClr>
+          </a:lnRef>
+          <a:fillRef idx="1">
+            <a:schemeClr val="accent1"/>
+          </a:fillRef>
+          <a:effectRef idx="0">
+            <a:schemeClr val="accent1"/>
+          </a:effectRef>
+          <a:fontRef idx="minor">
+            <a:schemeClr val="lt1"/>
+          </a:fontRef>
+        </p:style>
+        <p:txBody>
+          <a:bodyPr rtlCol="0" anchor="ctr"/>
+          <a:lstStyle/>
+          <a:p>
+            <a:pPr algn="ctr"/>
+            <a:endParaRPr lang="en-US"/>
+          </a:p>
+        </p:txBody>
+      </p:sp>
+      <p:pic>
+        <p:nvPicPr>
+          <p:cNvPr id="24" name="Picture 23"/>
+          <p:cNvPicPr>
+            <a:picLocks noChangeAspect="1"/>
+          </p:cNvPicPr>
+          <p:nvPr/>
+        </p:nvPicPr>
+        <p:blipFill>
+          <a:blip r:embed="rId6"/>
+          <a:stretch>
+            <a:fillRect/>
+          </a:stretch>
+        </p:blipFill>
+        <p:spPr>
+          <a:xfrm>
+            <a:off x="489718" y="4225149"/>
+            <a:ext cx="5472258" cy="549615"/>
+          </a:xfrm>
+          <a:prstGeom prst="rect">
+            <a:avLst/>
+          </a:prstGeom>
+        </p:spPr>
+      </p:pic>
+      <p:sp>
+        <p:nvSpPr>
+          <p:cNvPr id="25" name="Oval 24"/>
+          <p:cNvSpPr/>
+          <p:nvPr/>
+        </p:nvSpPr>
+        <p:spPr>
+          <a:xfrm>
+            <a:off x="1691222" y="3602963"/>
+            <a:ext cx="853827" cy="143404"/>
+          </a:xfrm>
+          <a:prstGeom prst="ellipse">
+            <a:avLst/>
+          </a:prstGeom>
+          <a:noFill/>
+          <a:ln>
+            <a:solidFill>
+              <a:srgbClr val="FF0000"/>
+            </a:solidFill>
+          </a:ln>
+        </p:spPr>
+        <p:style>
+          <a:lnRef idx="2">
+            <a:schemeClr val="accent1">
+              <a:shade val="50000"/>
+            </a:schemeClr>
+          </a:lnRef>
+          <a:fillRef idx="1">
+            <a:schemeClr val="accent1"/>
+          </a:fillRef>
+          <a:effectRef idx="0">
+            <a:schemeClr val="accent1"/>
+          </a:effectRef>
+          <a:fontRef idx="minor">
+            <a:schemeClr val="lt1"/>
+          </a:fontRef>
+        </p:style>
+        <p:txBody>
+          <a:bodyPr rtlCol="0" anchor="ctr"/>
+          <a:lstStyle/>
+          <a:p>
+            <a:pPr algn="ctr"/>
+            <a:endParaRPr lang="en-US"/>
+          </a:p>
+        </p:txBody>
+      </p:sp>
+      <p:sp>
+        <p:nvSpPr>
+          <p:cNvPr id="27" name="Rounded Rectangle 26"/>
+          <p:cNvSpPr/>
+          <p:nvPr/>
+        </p:nvSpPr>
+        <p:spPr>
+          <a:xfrm>
+            <a:off x="504272" y="3242501"/>
+            <a:ext cx="2024606" cy="183093"/>
+          </a:xfrm>
+          <a:prstGeom prst="roundRect">
+            <a:avLst/>
+          </a:prstGeom>
+          <a:ln w="19050">
+            <a:solidFill>
+              <a:schemeClr val="tx1"/>
+            </a:solidFill>
+          </a:ln>
+        </p:spPr>
+        <p:style>
+          <a:lnRef idx="2">
+            <a:schemeClr val="accent1">
+              <a:shade val="50000"/>
+            </a:schemeClr>
+          </a:lnRef>
+          <a:fillRef idx="1">
+            <a:schemeClr val="accent1"/>
+          </a:fillRef>
+          <a:effectRef idx="0">
+            <a:schemeClr val="accent1"/>
+          </a:effectRef>
+          <a:fontRef idx="minor">
+            <a:schemeClr val="lt1"/>
+          </a:fontRef>
+        </p:style>
+        <p:txBody>
+          <a:bodyPr rtlCol="0" anchor="ctr"/>
+          <a:lstStyle/>
+          <a:p>
+            <a:pPr algn="ctr"/>
+            <a:r>
+              <a:rPr lang="en-US" sz="1000" dirty="0" smtClean="0"/>
+              <a:t>Step 2: Install the NeoPixel Library</a:t>
+            </a:r>
+            <a:endParaRPr lang="en-US" sz="1000" dirty="0"/>
+          </a:p>
+        </p:txBody>
+      </p:sp>
+      <p:sp>
+        <p:nvSpPr>
+          <p:cNvPr id="28" name="Oval 27"/>
+          <p:cNvSpPr/>
+          <p:nvPr/>
+        </p:nvSpPr>
+        <p:spPr>
+          <a:xfrm>
+            <a:off x="1537597" y="4562010"/>
+            <a:ext cx="698586" cy="177527"/>
+          </a:xfrm>
+          <a:prstGeom prst="ellipse">
+            <a:avLst/>
+          </a:prstGeom>
+          <a:noFill/>
+          <a:ln w="19050">
+            <a:solidFill>
+              <a:srgbClr val="FF0000"/>
+            </a:solidFill>
+          </a:ln>
+        </p:spPr>
+        <p:style>
+          <a:lnRef idx="2">
+            <a:schemeClr val="accent1">
+              <a:shade val="50000"/>
+            </a:schemeClr>
+          </a:lnRef>
+          <a:fillRef idx="1">
+            <a:schemeClr val="accent1"/>
+          </a:fillRef>
+          <a:effectRef idx="0">
+            <a:schemeClr val="accent1"/>
+          </a:effectRef>
+          <a:fontRef idx="minor">
+            <a:schemeClr val="lt1"/>
+          </a:fontRef>
+        </p:style>
+        <p:txBody>
+          <a:bodyPr rtlCol="0" anchor="ctr"/>
+          <a:lstStyle/>
+          <a:p>
+            <a:pPr algn="ctr"/>
+            <a:endParaRPr lang="en-US"/>
+          </a:p>
+        </p:txBody>
+      </p:sp>
       <p:grpSp>
         <p:nvGrpSpPr>
           <p:cNvPr id="33" name="Group 32"/>
@@ -4407,10 +4401,10 @@
         </p:nvGrpSpPr>
         <p:grpSpPr>
           <a:xfrm>
-            <a:off x="422276" y="4999960"/>
-            <a:ext cx="4691925" cy="420927"/>
-            <a:chOff x="381000" y="5090266"/>
-            <a:chExt cx="4691925" cy="420927"/>
+            <a:off x="412753" y="4999960"/>
+            <a:ext cx="5226048" cy="438201"/>
+            <a:chOff x="373018" y="5090266"/>
+            <a:chExt cx="4380548" cy="438201"/>
           </a:xfrm>
         </p:grpSpPr>
         <p:sp>
@@ -4421,8 +4415,8 @@
           </p:nvSpPr>
           <p:spPr>
             <a:xfrm>
-              <a:off x="381000" y="5178432"/>
-              <a:ext cx="4691925" cy="332761"/>
+              <a:off x="373018" y="5195706"/>
+              <a:ext cx="4380548" cy="332761"/>
             </a:xfrm>
             <a:prstGeom prst="rect">
               <a:avLst/>
@@ -4448,19 +4442,27 @@
                 <a:rPr lang="en-US" sz="1200" dirty="0">
                   <a:latin typeface="Arial Narrow" pitchFamily="34" charset="0"/>
                 </a:rPr>
-                <a:t>Download CH341 driver from: http://</a:t>
-              </a:r>
-              <a:r>
-                <a:rPr lang="en-US" sz="1200" dirty="0" err="1" smtClean="0">
+                <a:t>Download CH341 driver from: </a:t>
+              </a:r>
+              <a:r>
+                <a:rPr lang="en-US" sz="1200" dirty="0">
                   <a:latin typeface="Arial Narrow" pitchFamily="34" charset="0"/>
+                  <a:hlinkClick r:id="rId7"/>
                 </a:rPr>
-                <a:t>www.wch.cn</a:t>
+                <a:t>http://</a:t>
+              </a:r>
+              <a:r>
+                <a:rPr lang="en-US" sz="1200" dirty="0" smtClean="0">
+                  <a:latin typeface="Arial Narrow" pitchFamily="34" charset="0"/>
+                  <a:hlinkClick r:id="rId7"/>
+                </a:rPr>
+                <a:t>www.wch.cn/download/CH341SER_ZIP.html</a:t>
               </a:r>
               <a:r>
                 <a:rPr lang="en-US" sz="1200" dirty="0" smtClean="0">
                   <a:latin typeface="Arial Narrow" pitchFamily="34" charset="0"/>
                 </a:rPr>
-                <a:t>/download/CH341SER_ZIP.html</a:t>
+                <a:t> (Chinese)</a:t>
               </a:r>
               <a:endParaRPr lang="en-US" sz="1200" dirty="0">
                 <a:latin typeface="Arial Narrow" pitchFamily="34" charset="0"/>
@@ -4526,8 +4528,8 @@
         </p:nvSpPr>
         <p:spPr>
           <a:xfrm>
-            <a:off x="412752" y="7058358"/>
-            <a:ext cx="5767387" cy="1336265"/>
+            <a:off x="412753" y="7058358"/>
+            <a:ext cx="4387848" cy="1336265"/>
           </a:xfrm>
           <a:prstGeom prst="rect">
             <a:avLst/>
@@ -4598,15 +4600,7 @@
             <a:pPr algn="ctr"/>
             <a:r>
               <a:rPr lang="en-US" sz="1000" dirty="0" smtClean="0"/>
-              <a:t>Step </a:t>
-            </a:r>
-            <a:r>
-              <a:rPr lang="en-US" sz="1000" dirty="0" smtClean="0"/>
-              <a:t>5: </a:t>
-            </a:r>
-            <a:r>
-              <a:rPr lang="en-US" sz="1000" dirty="0" smtClean="0"/>
-              <a:t>Run the NeoPixel Example </a:t>
+              <a:t>Step 5: Run the NeoPixel Example </a:t>
             </a:r>
             <a:r>
               <a:rPr lang="en-US" sz="1000" dirty="0" err="1" smtClean="0"/>
@@ -4625,7 +4619,7 @@
           <p:nvPr/>
         </p:nvPicPr>
         <p:blipFill>
-          <a:blip r:embed="rId7"/>
+          <a:blip r:embed="rId8"/>
           <a:stretch>
             <a:fillRect/>
           </a:stretch>
@@ -4649,7 +4643,7 @@
           <p:nvPr/>
         </p:nvPicPr>
         <p:blipFill>
-          <a:blip r:embed="rId8"/>
+          <a:blip r:embed="rId9"/>
           <a:stretch>
             <a:fillRect/>
           </a:stretch>
@@ -4672,8 +4666,8 @@
         </p:nvSpPr>
         <p:spPr>
           <a:xfrm>
-            <a:off x="3585440" y="7955104"/>
-            <a:ext cx="946875" cy="177527"/>
+            <a:off x="3585441" y="8001508"/>
+            <a:ext cx="834160" cy="131123"/>
           </a:xfrm>
           <a:prstGeom prst="ellipse">
             <a:avLst/>
@@ -4798,11 +4792,7 @@
             </a:r>
             <a:r>
               <a:rPr lang="en-US" sz="1000" dirty="0" smtClean="0"/>
-              <a:t>: </a:t>
-            </a:r>
-            <a:r>
-              <a:rPr lang="en-US" sz="1000" dirty="0" smtClean="0"/>
-              <a:t>Open the Moving Rainbow Labs</a:t>
+              <a:t>: Open the Moving Rainbow Labs</a:t>
             </a:r>
             <a:endParaRPr lang="en-US" sz="1000" dirty="0"/>
           </a:p>
@@ -4887,7 +4877,7 @@
         <p:spPr>
           <a:xfrm>
             <a:off x="412752" y="5685882"/>
-            <a:ext cx="4292221" cy="969667"/>
+            <a:ext cx="4235448" cy="1143413"/>
           </a:xfrm>
           <a:prstGeom prst="rect">
             <a:avLst/>
@@ -4923,8 +4913,8 @@
         </p:nvSpPr>
         <p:spPr>
           <a:xfrm>
-            <a:off x="468314" y="5597717"/>
-            <a:ext cx="3341686" cy="183093"/>
+            <a:off x="468313" y="5597717"/>
+            <a:ext cx="3755787" cy="183093"/>
           </a:xfrm>
           <a:prstGeom prst="roundRect">
             <a:avLst/>
@@ -4957,11 +4947,11 @@
           <a:p>
             <a:r>
               <a:rPr lang="en-US" sz="1000" dirty="0" smtClean="0"/>
-              <a:t>Step </a:t>
+              <a:t>Step 4: Set the Board to Nano and Port to </a:t>
             </a:r>
             <a:r>
               <a:rPr lang="en-US" sz="1000" dirty="0" smtClean="0"/>
-              <a:t>4: Set the Board to Nano and Port to CH340 </a:t>
+              <a:t>/dev/cu.wchusbserial1420</a:t>
             </a:r>
             <a:endParaRPr lang="en-US" sz="1000" dirty="0"/>
           </a:p>
@@ -4976,7 +4966,7 @@
           <p:nvPr/>
         </p:nvPicPr>
         <p:blipFill>
-          <a:blip r:embed="rId9"/>
+          <a:blip r:embed="rId10"/>
           <a:stretch>
             <a:fillRect/>
           </a:stretch>
@@ -4993,22 +4983,22 @@
       </p:pic>
       <p:pic>
         <p:nvPicPr>
-          <p:cNvPr id="6" name="Picture 5"/>
+          <p:cNvPr id="16" name="Picture 15"/>
           <p:cNvPicPr>
             <a:picLocks noChangeAspect="1"/>
           </p:cNvPicPr>
           <p:nvPr/>
         </p:nvPicPr>
         <p:blipFill>
-          <a:blip r:embed="rId10"/>
+          <a:blip r:embed="rId11"/>
           <a:stretch>
             <a:fillRect/>
           </a:stretch>
         </p:blipFill>
         <p:spPr>
           <a:xfrm>
-            <a:off x="2898714" y="5834446"/>
-            <a:ext cx="1633601" cy="736358"/>
+            <a:off x="2870201" y="5837308"/>
+            <a:ext cx="1695450" cy="940258"/>
           </a:xfrm>
           <a:prstGeom prst="rect">
             <a:avLst/>
@@ -5023,7 +5013,7 @@
         </p:nvSpPr>
         <p:spPr>
           <a:xfrm>
-            <a:off x="3733800" y="5867400"/>
+            <a:off x="3794918" y="5809147"/>
             <a:ext cx="798515" cy="609600"/>
           </a:xfrm>
           <a:prstGeom prst="rect">
@@ -6233,8 +6223,13 @@
               </a:pPr>
               <a:r>
                 <a:rPr lang="en-US" sz="1200" dirty="0" smtClean="0"/>
-                <a:t>Hook up LED circuit in series with 330 ohm resistor</a:t>
-              </a:r>
+                <a:t>Hook up LED circuit in series with 330 ohm </a:t>
+              </a:r>
+              <a:r>
+                <a:rPr lang="en-US" sz="1200" dirty="0" smtClean="0"/>
+                <a:t>resistor</a:t>
+              </a:r>
+              <a:endParaRPr lang="en-US" sz="1200" dirty="0" smtClean="0"/>
             </a:p>
             <a:p>
               <a:pPr marL="342900" indent="-342900">

</xml_diff>

<commit_message>
Added new documentation files
</commit_message>
<xml_diff>
--- a/guide/2017-HackDay.pptx
+++ b/guide/2017-HackDay.pptx
@@ -209,7 +209,7 @@
           <a:p>
             <a:fld id="{BEC7F16E-4C38-1E41-84AF-AA19D4DCBAA8}" type="datetimeFigureOut">
               <a:rPr lang="en-US" smtClean="0"/>
-              <a:t>10/27/17</a:t>
+              <a:t>9/25/18</a:t>
             </a:fld>
             <a:endParaRPr lang="en-US"/>
           </a:p>
@@ -742,7 +742,7 @@
           <a:p>
             <a:fld id="{3CA7CF7C-1FA5-40F9-B14A-8E1D58938A8E}" type="datetimeFigureOut">
               <a:rPr lang="en-US" smtClean="0"/>
-              <a:t>10/27/17</a:t>
+              <a:t>9/25/18</a:t>
             </a:fld>
             <a:endParaRPr lang="en-US"/>
           </a:p>
@@ -907,7 +907,7 @@
           <a:p>
             <a:fld id="{3CA7CF7C-1FA5-40F9-B14A-8E1D58938A8E}" type="datetimeFigureOut">
               <a:rPr lang="en-US" smtClean="0"/>
-              <a:t>10/27/17</a:t>
+              <a:t>9/25/18</a:t>
             </a:fld>
             <a:endParaRPr lang="en-US"/>
           </a:p>
@@ -1082,7 +1082,7 @@
           <a:p>
             <a:fld id="{3CA7CF7C-1FA5-40F9-B14A-8E1D58938A8E}" type="datetimeFigureOut">
               <a:rPr lang="en-US" smtClean="0"/>
-              <a:t>10/27/17</a:t>
+              <a:t>9/25/18</a:t>
             </a:fld>
             <a:endParaRPr lang="en-US"/>
           </a:p>
@@ -1247,7 +1247,7 @@
           <a:p>
             <a:fld id="{3CA7CF7C-1FA5-40F9-B14A-8E1D58938A8E}" type="datetimeFigureOut">
               <a:rPr lang="en-US" smtClean="0"/>
-              <a:t>10/27/17</a:t>
+              <a:t>9/25/18</a:t>
             </a:fld>
             <a:endParaRPr lang="en-US"/>
           </a:p>
@@ -1488,7 +1488,7 @@
           <a:p>
             <a:fld id="{3CA7CF7C-1FA5-40F9-B14A-8E1D58938A8E}" type="datetimeFigureOut">
               <a:rPr lang="en-US" smtClean="0"/>
-              <a:t>10/27/17</a:t>
+              <a:t>9/25/18</a:t>
             </a:fld>
             <a:endParaRPr lang="en-US"/>
           </a:p>
@@ -1771,7 +1771,7 @@
           <a:p>
             <a:fld id="{3CA7CF7C-1FA5-40F9-B14A-8E1D58938A8E}" type="datetimeFigureOut">
               <a:rPr lang="en-US" smtClean="0"/>
-              <a:t>10/27/17</a:t>
+              <a:t>9/25/18</a:t>
             </a:fld>
             <a:endParaRPr lang="en-US"/>
           </a:p>
@@ -2193,7 +2193,7 @@
           <a:p>
             <a:fld id="{3CA7CF7C-1FA5-40F9-B14A-8E1D58938A8E}" type="datetimeFigureOut">
               <a:rPr lang="en-US" smtClean="0"/>
-              <a:t>10/27/17</a:t>
+              <a:t>9/25/18</a:t>
             </a:fld>
             <a:endParaRPr lang="en-US"/>
           </a:p>
@@ -2306,7 +2306,7 @@
           <a:p>
             <a:fld id="{3CA7CF7C-1FA5-40F9-B14A-8E1D58938A8E}" type="datetimeFigureOut">
               <a:rPr lang="en-US" smtClean="0"/>
-              <a:t>10/27/17</a:t>
+              <a:t>9/25/18</a:t>
             </a:fld>
             <a:endParaRPr lang="en-US"/>
           </a:p>
@@ -2396,7 +2396,7 @@
           <a:p>
             <a:fld id="{3CA7CF7C-1FA5-40F9-B14A-8E1D58938A8E}" type="datetimeFigureOut">
               <a:rPr lang="en-US" smtClean="0"/>
-              <a:t>10/27/17</a:t>
+              <a:t>9/25/18</a:t>
             </a:fld>
             <a:endParaRPr lang="en-US"/>
           </a:p>
@@ -2668,7 +2668,7 @@
           <a:p>
             <a:fld id="{3CA7CF7C-1FA5-40F9-B14A-8E1D58938A8E}" type="datetimeFigureOut">
               <a:rPr lang="en-US" smtClean="0"/>
-              <a:t>10/27/17</a:t>
+              <a:t>9/25/18</a:t>
             </a:fld>
             <a:endParaRPr lang="en-US"/>
           </a:p>
@@ -2916,7 +2916,7 @@
           <a:p>
             <a:fld id="{3CA7CF7C-1FA5-40F9-B14A-8E1D58938A8E}" type="datetimeFigureOut">
               <a:rPr lang="en-US" smtClean="0"/>
-              <a:t>10/27/17</a:t>
+              <a:t>9/25/18</a:t>
             </a:fld>
             <a:endParaRPr lang="en-US"/>
           </a:p>
@@ -3124,7 +3124,7 @@
           <a:p>
             <a:fld id="{3CA7CF7C-1FA5-40F9-B14A-8E1D58938A8E}" type="datetimeFigureOut">
               <a:rPr lang="en-US" smtClean="0"/>
-              <a:t>10/27/17</a:t>
+              <a:t>9/25/18</a:t>
             </a:fld>
             <a:endParaRPr lang="en-US"/>
           </a:p>
@@ -3841,8 +3841,17 @@
               </a:pPr>
               <a:r>
                 <a:rPr lang="en-US" sz="1200" dirty="0" smtClean="0"/>
-                <a:t>330 Ohm Resistor</a:t>
-              </a:r>
+                <a:t>330 </a:t>
+              </a:r>
+              <a:r>
+                <a:rPr lang="en-US" sz="1200" dirty="0"/>
+                <a:t>o</a:t>
+              </a:r>
+              <a:r>
+                <a:rPr lang="en-US" sz="1200" dirty="0" smtClean="0"/>
+                <a:t>hm resistor</a:t>
+              </a:r>
+              <a:endParaRPr lang="en-US" sz="1200" dirty="0" smtClean="0"/>
             </a:p>
             <a:p>
               <a:pPr marL="228600" indent="-228600">
@@ -3851,7 +3860,11 @@
               </a:pPr>
               <a:r>
                 <a:rPr lang="en-US" sz="1200" dirty="0" smtClean="0"/>
-                <a:t>LED – max current 20ma</a:t>
+                <a:t>Red LED </a:t>
+              </a:r>
+              <a:r>
+                <a:rPr lang="en-US" sz="1200" dirty="0" smtClean="0"/>
+                <a:t>– max current 20ma</a:t>
               </a:r>
               <a:endParaRPr lang="en-US" sz="1200" dirty="0"/>
             </a:p>
@@ -3871,8 +3884,16 @@
                 <a:buAutoNum type="arabicPeriod"/>
               </a:pPr>
               <a:r>
+                <a:rPr lang="en-US" sz="1200" dirty="0"/>
+                <a:t>6</a:t>
+              </a:r>
+              <a:r>
                 <a:rPr lang="en-US" sz="1200" dirty="0" smtClean="0"/>
-                <a:t>30 pixel NeoPixel strip with GND (black), 5v (red) and data (yellow)</a:t>
+                <a:t>0 </a:t>
+              </a:r>
+              <a:r>
+                <a:rPr lang="en-US" sz="1200" dirty="0" smtClean="0"/>
+                <a:t>pixel NeoPixel strip with GND (black), 5v (red) and data (yellow)</a:t>
               </a:r>
             </a:p>
             <a:p>
@@ -3892,17 +3913,8 @@
               </a:pPr>
               <a:r>
                 <a:rPr lang="en-US" sz="1200" dirty="0" smtClean="0"/>
-                <a:t>AAA </a:t>
-              </a:r>
-              <a:r>
-                <a:rPr lang="en-US" sz="1200" dirty="0" smtClean="0"/>
-                <a:t>battery </a:t>
-              </a:r>
-              <a:r>
-                <a:rPr lang="en-US" sz="1200" dirty="0" smtClean="0"/>
-                <a:t>pack</a:t>
-              </a:r>
-              <a:endParaRPr lang="en-US" sz="1200" dirty="0" smtClean="0"/>
+                <a:t>AAA battery pack</a:t>
+              </a:r>
             </a:p>
             <a:p>
               <a:pPr marL="228600" indent="-228600">
@@ -4947,11 +4959,7 @@
           <a:p>
             <a:r>
               <a:rPr lang="en-US" sz="1000" dirty="0" smtClean="0"/>
-              <a:t>Step 4: Set the Board to Nano and Port to </a:t>
-            </a:r>
-            <a:r>
-              <a:rPr lang="en-US" sz="1000" dirty="0" smtClean="0"/>
-              <a:t>/dev/cu.wchusbserial1420</a:t>
+              <a:t>Step 4: Set the Board to Nano and Port to /dev/cu.wchusbserial1420</a:t>
             </a:r>
             <a:endParaRPr lang="en-US" sz="1000" dirty="0"/>
           </a:p>
@@ -5195,7 +5203,19 @@
                 <a:rPr lang="en-US" sz="1200" dirty="0" smtClean="0">
                   <a:latin typeface="Arial Narrow" pitchFamily="34" charset="0"/>
                 </a:rPr>
-                <a:t>#define NUMBER_PIXELS 30 /</a:t>
+                <a:t>#define NUMBER_PIXELS </a:t>
+              </a:r>
+              <a:r>
+                <a:rPr lang="en-US" sz="1200" dirty="0" smtClean="0">
+                  <a:latin typeface="Arial Narrow" pitchFamily="34" charset="0"/>
+                </a:rPr>
+                <a:t>60 </a:t>
+              </a:r>
+              <a:r>
+                <a:rPr lang="en-US" sz="1200" dirty="0" smtClean="0">
+                  <a:latin typeface="Arial Narrow" pitchFamily="34" charset="0"/>
+                </a:rPr>
+                <a:t>/</a:t>
               </a:r>
               <a:r>
                 <a:rPr lang="en-US" sz="1200" dirty="0">
@@ -6223,13 +6243,8 @@
               </a:pPr>
               <a:r>
                 <a:rPr lang="en-US" sz="1200" dirty="0" smtClean="0"/>
-                <a:t>Hook up LED circuit in series with 330 ohm </a:t>
-              </a:r>
-              <a:r>
-                <a:rPr lang="en-US" sz="1200" dirty="0" smtClean="0"/>
-                <a:t>resistor</a:t>
-              </a:r>
-              <a:endParaRPr lang="en-US" sz="1200" dirty="0" smtClean="0"/>
+                <a:t>Hook up LED circuit in series with 330 ohm resistor</a:t>
+              </a:r>
             </a:p>
             <a:p>
               <a:pPr marL="342900" indent="-342900">

</xml_diff>